<commit_message>
Update to mid term demo slides
</commit_message>
<xml_diff>
--- a/mid term demo/ACO-mid-term-presentation.pptx
+++ b/mid term demo/ACO-mid-term-presentation.pptx
@@ -15,7 +15,6 @@
     <p:sldId id="263" r:id="rId9"/>
     <p:sldId id="264" r:id="rId10"/>
     <p:sldId id="266" r:id="rId11"/>
-    <p:sldId id="265" r:id="rId12"/>
   </p:sldIdLst>
   <p:sldSz cx="9144000" cy="6858000" type="screen4x3"/>
   <p:notesSz cx="6858000" cy="9144000"/>
@@ -311,7 +310,7 @@
           <a:p>
             <a:fld id="{E6D9E052-7969-43DC-B3F6-1208616C43B4}" type="datetimeFigureOut">
               <a:rPr lang="en-GB" smtClean="0"/>
-              <a:t>11/03/2015</a:t>
+              <a:t>13/03/2015</a:t>
             </a:fld>
             <a:endParaRPr lang="en-GB"/>
           </a:p>
@@ -476,7 +475,7 @@
           <a:p>
             <a:fld id="{E6D9E052-7969-43DC-B3F6-1208616C43B4}" type="datetimeFigureOut">
               <a:rPr lang="en-GB" smtClean="0"/>
-              <a:t>11/03/2015</a:t>
+              <a:t>13/03/2015</a:t>
             </a:fld>
             <a:endParaRPr lang="en-GB"/>
           </a:p>
@@ -651,7 +650,7 @@
           <a:p>
             <a:fld id="{E6D9E052-7969-43DC-B3F6-1208616C43B4}" type="datetimeFigureOut">
               <a:rPr lang="en-GB" smtClean="0"/>
-              <a:t>11/03/2015</a:t>
+              <a:t>13/03/2015</a:t>
             </a:fld>
             <a:endParaRPr lang="en-GB"/>
           </a:p>
@@ -816,7 +815,7 @@
           <a:p>
             <a:fld id="{E6D9E052-7969-43DC-B3F6-1208616C43B4}" type="datetimeFigureOut">
               <a:rPr lang="en-GB" smtClean="0"/>
-              <a:t>11/03/2015</a:t>
+              <a:t>13/03/2015</a:t>
             </a:fld>
             <a:endParaRPr lang="en-GB"/>
           </a:p>
@@ -1057,7 +1056,7 @@
           <a:p>
             <a:fld id="{E6D9E052-7969-43DC-B3F6-1208616C43B4}" type="datetimeFigureOut">
               <a:rPr lang="en-GB" smtClean="0"/>
-              <a:t>11/03/2015</a:t>
+              <a:t>13/03/2015</a:t>
             </a:fld>
             <a:endParaRPr lang="en-GB"/>
           </a:p>
@@ -1340,7 +1339,7 @@
           <a:p>
             <a:fld id="{E6D9E052-7969-43DC-B3F6-1208616C43B4}" type="datetimeFigureOut">
               <a:rPr lang="en-GB" smtClean="0"/>
-              <a:t>11/03/2015</a:t>
+              <a:t>13/03/2015</a:t>
             </a:fld>
             <a:endParaRPr lang="en-GB"/>
           </a:p>
@@ -1769,7 +1768,7 @@
           <a:p>
             <a:fld id="{E6D9E052-7969-43DC-B3F6-1208616C43B4}" type="datetimeFigureOut">
               <a:rPr lang="en-GB" smtClean="0"/>
-              <a:t>11/03/2015</a:t>
+              <a:t>13/03/2015</a:t>
             </a:fld>
             <a:endParaRPr lang="en-GB"/>
           </a:p>
@@ -1882,7 +1881,7 @@
           <a:p>
             <a:fld id="{E6D9E052-7969-43DC-B3F6-1208616C43B4}" type="datetimeFigureOut">
               <a:rPr lang="en-GB" smtClean="0"/>
-              <a:t>11/03/2015</a:t>
+              <a:t>13/03/2015</a:t>
             </a:fld>
             <a:endParaRPr lang="en-GB"/>
           </a:p>
@@ -1972,7 +1971,7 @@
           <a:p>
             <a:fld id="{E6D9E052-7969-43DC-B3F6-1208616C43B4}" type="datetimeFigureOut">
               <a:rPr lang="en-GB" smtClean="0"/>
-              <a:t>11/03/2015</a:t>
+              <a:t>13/03/2015</a:t>
             </a:fld>
             <a:endParaRPr lang="en-GB"/>
           </a:p>
@@ -2161,7 +2160,7 @@
           <a:p>
             <a:fld id="{E6D9E052-7969-43DC-B3F6-1208616C43B4}" type="datetimeFigureOut">
               <a:rPr lang="en-GB" smtClean="0"/>
-              <a:t>11/03/2015</a:t>
+              <a:t>13/03/2015</a:t>
             </a:fld>
             <a:endParaRPr lang="en-GB"/>
           </a:p>
@@ -2479,7 +2478,7 @@
           <a:p>
             <a:fld id="{E6D9E052-7969-43DC-B3F6-1208616C43B4}" type="datetimeFigureOut">
               <a:rPr lang="en-GB" smtClean="0"/>
-              <a:t>11/03/2015</a:t>
+              <a:t>13/03/2015</a:t>
             </a:fld>
             <a:endParaRPr lang="en-GB"/>
           </a:p>
@@ -2858,7 +2857,7 @@
           <a:p>
             <a:fld id="{E6D9E052-7969-43DC-B3F6-1208616C43B4}" type="datetimeFigureOut">
               <a:rPr lang="en-GB" smtClean="0"/>
-              <a:t>11/03/2015</a:t>
+              <a:t>13/03/2015</a:t>
             </a:fld>
             <a:endParaRPr lang="en-GB"/>
           </a:p>
@@ -3307,78 +3306,78 @@
           <a:p>
             <a:r>
               <a:rPr lang="en-US" dirty="0" smtClean="0"/>
-              <a:t>Incorporate the text boxes to allow user define values</a:t>
-            </a:r>
-          </a:p>
-          <a:p>
-            <a:r>
-              <a:rPr lang="en-US" dirty="0" smtClean="0"/>
-              <a:t>Display how many ants are at each city</a:t>
-            </a:r>
-          </a:p>
-          <a:p>
-            <a:r>
-              <a:rPr lang="en-US" dirty="0" smtClean="0"/>
-              <a:t>Allows loading/saving of cities configurations </a:t>
+              <a:t>Display </a:t>
+            </a:r>
+            <a:r>
+              <a:rPr lang="en-US" dirty="0" smtClean="0"/>
+              <a:t>how many ants are at each </a:t>
+            </a:r>
+            <a:r>
+              <a:rPr lang="en-US" dirty="0" smtClean="0"/>
+              <a:t>city</a:t>
             </a:r>
           </a:p>
           <a:p>
             <a:pPr lvl="1"/>
             <a:r>
               <a:rPr lang="en-US" dirty="0" smtClean="0"/>
-              <a:t>Allows for the same problem to be demonstrated every time</a:t>
-            </a:r>
-          </a:p>
-          <a:p>
-            <a:r>
-              <a:rPr lang="en-US" dirty="0" smtClean="0"/>
-              <a:t>Display the best route and distance to the user in text form</a:t>
+              <a:t>Currently shows 1 ‘ant’ regardless</a:t>
+            </a:r>
+            <a:endParaRPr lang="en-US" dirty="0" smtClean="0"/>
+          </a:p>
+          <a:p>
+            <a:r>
+              <a:rPr lang="en-US" dirty="0" smtClean="0"/>
+              <a:t>Experiment </a:t>
+            </a:r>
+            <a:r>
+              <a:rPr lang="en-US" dirty="0" smtClean="0"/>
+              <a:t>with correct limits to add to text fields</a:t>
             </a:r>
             <a:endParaRPr lang="en-US" dirty="0"/>
           </a:p>
           <a:p>
             <a:r>
               <a:rPr lang="en-US" dirty="0" smtClean="0"/>
-              <a:t>Experiment with correct limits to add to text fields</a:t>
+              <a:t>Potentially add variations of the algorithm</a:t>
+            </a:r>
+          </a:p>
+          <a:p>
+            <a:pPr lvl="1"/>
+            <a:r>
+              <a:rPr lang="en-US" dirty="0" smtClean="0"/>
+              <a:t>Elitist ants, Min-Max system etc.</a:t>
             </a:r>
             <a:endParaRPr lang="en-US" dirty="0"/>
           </a:p>
           <a:p>
             <a:r>
               <a:rPr lang="en-US" dirty="0" smtClean="0"/>
-              <a:t>Potentially add variations of the algorithm</a:t>
-            </a:r>
-          </a:p>
-          <a:p>
-            <a:pPr lvl="1"/>
-            <a:r>
-              <a:rPr lang="en-US" dirty="0" smtClean="0"/>
-              <a:t>Elitist ants, Min-Max system etc.</a:t>
+              <a:t>Test the application thoroughly</a:t>
             </a:r>
             <a:endParaRPr lang="en-US" dirty="0"/>
           </a:p>
           <a:p>
             <a:r>
               <a:rPr lang="en-US" dirty="0" smtClean="0"/>
-              <a:t>Test the application thoroughly</a:t>
-            </a:r>
-            <a:endParaRPr lang="en-US" dirty="0"/>
-          </a:p>
-          <a:p>
-            <a:r>
-              <a:rPr lang="en-US" dirty="0" smtClean="0"/>
-              <a:t>Potentially set up an nest-food style of problem</a:t>
-            </a:r>
-          </a:p>
-          <a:p>
-            <a:r>
-              <a:rPr lang="en-US" dirty="0" smtClean="0"/>
-              <a:t>Let the user define the speed which the algorithm runs</a:t>
-            </a:r>
-            <a:endParaRPr lang="en-US" dirty="0"/>
-          </a:p>
-          <a:p>
-            <a:pPr lvl="1"/>
+              <a:t>Potentially set up an nest-food style of </a:t>
+            </a:r>
+            <a:r>
+              <a:rPr lang="en-US" dirty="0" smtClean="0"/>
+              <a:t>problem</a:t>
+            </a:r>
+          </a:p>
+          <a:p>
+            <a:r>
+              <a:rPr lang="en-US" dirty="0" smtClean="0"/>
+              <a:t>Potentially extend the application to visualise BCO as well</a:t>
+            </a:r>
+            <a:endParaRPr lang="en-US" dirty="0" smtClean="0"/>
+          </a:p>
+          <a:p>
+            <a:pPr marL="411480" lvl="1" indent="0">
+              <a:buNone/>
+            </a:pPr>
             <a:endParaRPr lang="en-GB" dirty="0"/>
           </a:p>
         </p:txBody>
@@ -3387,95 +3386,6 @@
     <p:extLst>
       <p:ext uri="{BB962C8B-B14F-4D97-AF65-F5344CB8AC3E}">
         <p14:creationId xmlns:p14="http://schemas.microsoft.com/office/powerpoint/2010/main" val="2473051165"/>
-      </p:ext>
-    </p:extLst>
-  </p:cSld>
-  <p:clrMapOvr>
-    <a:masterClrMapping/>
-  </p:clrMapOvr>
-</p:sld>
-</file>
-
-<file path=ppt/slides/slide11.xml><?xml version="1.0" encoding="utf-8"?>
-<p:sld xmlns:a="http://schemas.openxmlformats.org/drawingml/2006/main" xmlns:r="http://schemas.openxmlformats.org/officeDocument/2006/relationships" xmlns:p="http://schemas.openxmlformats.org/presentationml/2006/main">
-  <p:cSld>
-    <p:spTree>
-      <p:nvGrpSpPr>
-        <p:cNvPr id="1" name=""/>
-        <p:cNvGrpSpPr/>
-        <p:nvPr/>
-      </p:nvGrpSpPr>
-      <p:grpSpPr>
-        <a:xfrm>
-          <a:off x="0" y="0"/>
-          <a:ext cx="0" cy="0"/>
-          <a:chOff x="0" y="0"/>
-          <a:chExt cx="0" cy="0"/>
-        </a:xfrm>
-      </p:grpSpPr>
-      <p:sp>
-        <p:nvSpPr>
-          <p:cNvPr id="2" name="Title 1"/>
-          <p:cNvSpPr>
-            <a:spLocks noGrp="1"/>
-          </p:cNvSpPr>
-          <p:nvPr>
-            <p:ph type="title"/>
-          </p:nvPr>
-        </p:nvSpPr>
-        <p:spPr/>
-        <p:txBody>
-          <a:bodyPr/>
-          <a:lstStyle/>
-          <a:p>
-            <a:r>
-              <a:rPr lang="en-US" dirty="0" smtClean="0"/>
-              <a:t>Questions?</a:t>
-            </a:r>
-            <a:endParaRPr lang="en-GB" dirty="0"/>
-          </a:p>
-        </p:txBody>
-      </p:sp>
-      <p:sp>
-        <p:nvSpPr>
-          <p:cNvPr id="3" name="Content Placeholder 2"/>
-          <p:cNvSpPr>
-            <a:spLocks noGrp="1"/>
-          </p:cNvSpPr>
-          <p:nvPr>
-            <p:ph idx="1"/>
-          </p:nvPr>
-        </p:nvSpPr>
-        <p:spPr/>
-        <p:txBody>
-          <a:bodyPr>
-            <a:normAutofit/>
-          </a:bodyPr>
-          <a:lstStyle/>
-          <a:p>
-            <a:pPr algn="ctr"/>
-            <a:endParaRPr lang="en-US" sz="4000" dirty="0" smtClean="0"/>
-          </a:p>
-          <a:p>
-            <a:pPr algn="ctr"/>
-            <a:endParaRPr lang="en-US" sz="4000" dirty="0"/>
-          </a:p>
-          <a:p>
-            <a:pPr marL="114300" indent="0" algn="ctr">
-              <a:buNone/>
-            </a:pPr>
-            <a:r>
-              <a:rPr lang="en-US" sz="4000" dirty="0" smtClean="0"/>
-              <a:t>Thank you for listening, if you have any questions I will gladly answer</a:t>
-            </a:r>
-            <a:endParaRPr lang="en-GB" sz="4000" dirty="0"/>
-          </a:p>
-        </p:txBody>
-      </p:sp>
-    </p:spTree>
-    <p:extLst>
-      <p:ext uri="{BB962C8B-B14F-4D97-AF65-F5344CB8AC3E}">
-        <p14:creationId xmlns:p14="http://schemas.microsoft.com/office/powerpoint/2010/main" val="1803473255"/>
       </p:ext>
     </p:extLst>
   </p:cSld>
@@ -3519,7 +3429,7 @@
           <a:p>
             <a:r>
               <a:rPr lang="en-US" dirty="0" smtClean="0"/>
-              <a:t>What is the Project?</a:t>
+              <a:t>Aims of the Project</a:t>
             </a:r>
             <a:endParaRPr lang="en-GB" dirty="0"/>
           </a:p>
@@ -3537,7 +3447,9 @@
         </p:nvSpPr>
         <p:spPr/>
         <p:txBody>
-          <a:bodyPr/>
+          <a:bodyPr>
+            <a:normAutofit lnSpcReduction="10000"/>
+          </a:bodyPr>
           <a:lstStyle/>
           <a:p>
             <a:r>
@@ -3554,7 +3466,15 @@
           <a:p>
             <a:r>
               <a:rPr lang="en-US" dirty="0" smtClean="0"/>
-              <a:t>To be used in an education environment</a:t>
+              <a:t>To be used in an </a:t>
+            </a:r>
+            <a:r>
+              <a:rPr lang="en-US" dirty="0" smtClean="0"/>
+              <a:t>educational </a:t>
+            </a:r>
+            <a:r>
+              <a:rPr lang="en-US" dirty="0" smtClean="0"/>
+              <a:t>environment</a:t>
             </a:r>
           </a:p>
           <a:p>
@@ -3580,22 +3500,54 @@
             <a:pPr lvl="1"/>
             <a:r>
               <a:rPr lang="en-US" dirty="0" smtClean="0"/>
-              <a:t>Number of cities/ants</a:t>
+              <a:t>Number of </a:t>
+            </a:r>
+            <a:r>
+              <a:rPr lang="en-US" dirty="0" smtClean="0"/>
+              <a:t>cities</a:t>
             </a:r>
           </a:p>
           <a:p>
             <a:pPr lvl="1"/>
             <a:r>
               <a:rPr lang="en-US" dirty="0" smtClean="0"/>
-              <a:t>Alpha/beta values</a:t>
-            </a:r>
+              <a:t>Number of ants</a:t>
+            </a:r>
+            <a:endParaRPr lang="en-US" dirty="0" smtClean="0"/>
           </a:p>
           <a:p>
             <a:pPr lvl="1"/>
             <a:r>
               <a:rPr lang="en-US" dirty="0" smtClean="0"/>
-              <a:t>Etc.</a:t>
-            </a:r>
+              <a:t>Alpha value</a:t>
+            </a:r>
+          </a:p>
+          <a:p>
+            <a:pPr lvl="1"/>
+            <a:r>
+              <a:rPr lang="en-US" dirty="0" smtClean="0"/>
+              <a:t>Beta value</a:t>
+            </a:r>
+          </a:p>
+          <a:p>
+            <a:pPr lvl="1"/>
+            <a:r>
+              <a:rPr lang="en-US" dirty="0" smtClean="0"/>
+              <a:t>Decay rate</a:t>
+            </a:r>
+          </a:p>
+          <a:p>
+            <a:pPr lvl="1"/>
+            <a:r>
+              <a:rPr lang="en-US" dirty="0" err="1" smtClean="0"/>
+              <a:t>etc</a:t>
+            </a:r>
+            <a:endParaRPr lang="en-US" dirty="0" smtClean="0"/>
+          </a:p>
+          <a:p>
+            <a:pPr marL="411480" lvl="1" indent="0">
+              <a:buNone/>
+            </a:pPr>
             <a:endParaRPr lang="en-US" dirty="0"/>
           </a:p>
         </p:txBody>
@@ -3833,9 +3785,250 @@
           </a:p>
         </p:txBody>
       </p:sp>
+      <p:sp>
+        <p:nvSpPr>
+          <p:cNvPr id="6" name="Content Placeholder 2"/>
+          <p:cNvSpPr txBox="1">
+            <a:spLocks/>
+          </p:cNvSpPr>
+          <p:nvPr/>
+        </p:nvSpPr>
+        <p:spPr>
+          <a:xfrm>
+            <a:off x="609600" y="3933056"/>
+            <a:ext cx="7620000" cy="2376264"/>
+          </a:xfrm>
+          <a:prstGeom prst="rect">
+            <a:avLst/>
+          </a:prstGeom>
+        </p:spPr>
+        <p:txBody>
+          <a:bodyPr vert="horz" lIns="91440" tIns="45720" rIns="91440" bIns="45720" rtlCol="0">
+            <a:normAutofit/>
+          </a:bodyPr>
+          <a:lstStyle>
+            <a:lvl1pPr marL="342900" indent="-228600" algn="l" defTabSz="914400" rtl="0" eaLnBrk="1" latinLnBrk="0" hangingPunct="1">
+              <a:spcBef>
+                <a:spcPct val="20000"/>
+              </a:spcBef>
+              <a:buClr>
+                <a:schemeClr val="accent1"/>
+              </a:buClr>
+              <a:buFont typeface="Arial" pitchFamily="34" charset="0"/>
+              <a:buChar char="•"/>
+              <a:defRPr sz="2200" kern="1200">
+                <a:solidFill>
+                  <a:schemeClr val="tx1"/>
+                </a:solidFill>
+                <a:latin typeface="+mn-lt"/>
+                <a:ea typeface="+mn-ea"/>
+                <a:cs typeface="+mn-cs"/>
+              </a:defRPr>
+            </a:lvl1pPr>
+            <a:lvl2pPr marL="640080" indent="-228600" algn="l" defTabSz="914400" rtl="0" eaLnBrk="1" latinLnBrk="0" hangingPunct="1">
+              <a:spcBef>
+                <a:spcPct val="20000"/>
+              </a:spcBef>
+              <a:buClr>
+                <a:schemeClr val="accent2"/>
+              </a:buClr>
+              <a:buFont typeface="Arial" pitchFamily="34" charset="0"/>
+              <a:buChar char="•"/>
+              <a:defRPr sz="2000" kern="1200">
+                <a:solidFill>
+                  <a:schemeClr val="tx1"/>
+                </a:solidFill>
+                <a:latin typeface="+mn-lt"/>
+                <a:ea typeface="+mn-ea"/>
+                <a:cs typeface="+mn-cs"/>
+              </a:defRPr>
+            </a:lvl2pPr>
+            <a:lvl3pPr marL="1005840" indent="-228600" algn="l" defTabSz="914400" rtl="0" eaLnBrk="1" latinLnBrk="0" hangingPunct="1">
+              <a:spcBef>
+                <a:spcPct val="20000"/>
+              </a:spcBef>
+              <a:buClr>
+                <a:schemeClr val="accent3"/>
+              </a:buClr>
+              <a:buFont typeface="Arial" pitchFamily="34" charset="0"/>
+              <a:buChar char="•"/>
+              <a:defRPr sz="1800" kern="1200">
+                <a:solidFill>
+                  <a:schemeClr val="tx1"/>
+                </a:solidFill>
+                <a:latin typeface="+mn-lt"/>
+                <a:ea typeface="+mn-ea"/>
+                <a:cs typeface="+mn-cs"/>
+              </a:defRPr>
+            </a:lvl3pPr>
+            <a:lvl4pPr marL="1280160" indent="-228600" algn="l" defTabSz="914400" rtl="0" eaLnBrk="1" latinLnBrk="0" hangingPunct="1">
+              <a:spcBef>
+                <a:spcPct val="20000"/>
+              </a:spcBef>
+              <a:buClr>
+                <a:schemeClr val="accent4"/>
+              </a:buClr>
+              <a:buFont typeface="Arial" pitchFamily="34" charset="0"/>
+              <a:buChar char="•"/>
+              <a:defRPr sz="1600" kern="1200">
+                <a:solidFill>
+                  <a:schemeClr val="tx1"/>
+                </a:solidFill>
+                <a:latin typeface="+mn-lt"/>
+                <a:ea typeface="+mn-ea"/>
+                <a:cs typeface="+mn-cs"/>
+              </a:defRPr>
+            </a:lvl4pPr>
+            <a:lvl5pPr marL="1554480" indent="-228600" algn="l" defTabSz="914400" rtl="0" eaLnBrk="1" latinLnBrk="0" hangingPunct="1">
+              <a:spcBef>
+                <a:spcPct val="20000"/>
+              </a:spcBef>
+              <a:buClr>
+                <a:schemeClr val="accent5"/>
+              </a:buClr>
+              <a:buFont typeface="Arial" pitchFamily="34" charset="0"/>
+              <a:buChar char="•"/>
+              <a:defRPr sz="1400" kern="1200" baseline="0">
+                <a:solidFill>
+                  <a:schemeClr val="tx1"/>
+                </a:solidFill>
+                <a:latin typeface="+mn-lt"/>
+                <a:ea typeface="+mn-ea"/>
+                <a:cs typeface="+mn-cs"/>
+              </a:defRPr>
+            </a:lvl5pPr>
+            <a:lvl6pPr marL="1737360" indent="-182880" algn="l" defTabSz="914400" rtl="0" eaLnBrk="1" latinLnBrk="0" hangingPunct="1">
+              <a:spcBef>
+                <a:spcPct val="20000"/>
+              </a:spcBef>
+              <a:buClr>
+                <a:schemeClr val="accent1"/>
+              </a:buClr>
+              <a:buFont typeface="Arial" pitchFamily="34" charset="0"/>
+              <a:buChar char="•"/>
+              <a:defRPr sz="1400" kern="1200" baseline="0">
+                <a:solidFill>
+                  <a:schemeClr val="tx1"/>
+                </a:solidFill>
+                <a:latin typeface="+mn-lt"/>
+                <a:ea typeface="+mn-ea"/>
+                <a:cs typeface="+mn-cs"/>
+              </a:defRPr>
+            </a:lvl6pPr>
+            <a:lvl7pPr marL="1920240" indent="-182880" algn="l" defTabSz="914400" rtl="0" eaLnBrk="1" latinLnBrk="0" hangingPunct="1">
+              <a:spcBef>
+                <a:spcPct val="20000"/>
+              </a:spcBef>
+              <a:buClr>
+                <a:schemeClr val="accent2"/>
+              </a:buClr>
+              <a:buFont typeface="Arial" pitchFamily="34" charset="0"/>
+              <a:buChar char="•"/>
+              <a:defRPr sz="1400" kern="1200">
+                <a:solidFill>
+                  <a:schemeClr val="tx1"/>
+                </a:solidFill>
+                <a:latin typeface="+mn-lt"/>
+                <a:ea typeface="+mn-ea"/>
+                <a:cs typeface="+mn-cs"/>
+              </a:defRPr>
+            </a:lvl7pPr>
+            <a:lvl8pPr marL="2103120" indent="-182880" algn="l" defTabSz="914400" rtl="0" eaLnBrk="1" latinLnBrk="0" hangingPunct="1">
+              <a:spcBef>
+                <a:spcPct val="20000"/>
+              </a:spcBef>
+              <a:buClr>
+                <a:schemeClr val="accent3"/>
+              </a:buClr>
+              <a:buFont typeface="Arial" pitchFamily="34" charset="0"/>
+              <a:buChar char="•"/>
+              <a:defRPr sz="1400" kern="1200">
+                <a:solidFill>
+                  <a:schemeClr val="tx1"/>
+                </a:solidFill>
+                <a:latin typeface="+mn-lt"/>
+                <a:ea typeface="+mn-ea"/>
+                <a:cs typeface="+mn-cs"/>
+              </a:defRPr>
+            </a:lvl8pPr>
+            <a:lvl9pPr marL="2286000" indent="-182880" algn="l" defTabSz="914400" rtl="0" eaLnBrk="1" latinLnBrk="0" hangingPunct="1">
+              <a:spcBef>
+                <a:spcPct val="20000"/>
+              </a:spcBef>
+              <a:buClr>
+                <a:schemeClr val="accent4"/>
+              </a:buClr>
+              <a:buFont typeface="Arial" pitchFamily="34" charset="0"/>
+              <a:buChar char="•"/>
+              <a:defRPr sz="1400" kern="1200">
+                <a:solidFill>
+                  <a:schemeClr val="tx1"/>
+                </a:solidFill>
+                <a:latin typeface="+mn-lt"/>
+                <a:ea typeface="+mn-ea"/>
+                <a:cs typeface="+mn-cs"/>
+              </a:defRPr>
+            </a:lvl9pPr>
+          </a:lstStyle>
+          <a:p>
+            <a:r>
+              <a:rPr lang="el-GR" dirty="0" smtClean="0"/>
+              <a:t>α</a:t>
+            </a:r>
+            <a:r>
+              <a:rPr lang="en-US" dirty="0" smtClean="0"/>
+              <a:t>: Meta heuristic value relating to the favoring of pheromone</a:t>
+            </a:r>
+          </a:p>
+          <a:p>
+            <a:r>
+              <a:rPr lang="el-GR" dirty="0" smtClean="0"/>
+              <a:t>β</a:t>
+            </a:r>
+            <a:r>
+              <a:rPr lang="en-US" dirty="0" smtClean="0"/>
+              <a:t>: </a:t>
+            </a:r>
+            <a:r>
+              <a:rPr lang="en-US" dirty="0" smtClean="0"/>
+              <a:t>Meta </a:t>
+            </a:r>
+            <a:r>
+              <a:rPr lang="en-US" dirty="0"/>
+              <a:t>heuristic value relating to the favoring of </a:t>
+            </a:r>
+            <a:r>
+              <a:rPr lang="en-US" dirty="0" smtClean="0"/>
+              <a:t>pheromone</a:t>
+            </a:r>
+          </a:p>
+          <a:p>
+            <a:r>
+              <a:rPr lang="en-US" dirty="0" smtClean="0"/>
+              <a:t>η: 1/distance </a:t>
+            </a:r>
+            <a:r>
+              <a:rPr lang="en-US" dirty="0" smtClean="0"/>
+              <a:t>from current to node </a:t>
+            </a:r>
+            <a:r>
+              <a:rPr lang="en-US" dirty="0" err="1" smtClean="0"/>
+              <a:t>xy</a:t>
+            </a:r>
+            <a:r>
+              <a:rPr lang="en-US" dirty="0" smtClean="0"/>
+              <a:t> </a:t>
+            </a:r>
+            <a:endParaRPr lang="en-GB" dirty="0" smtClean="0"/>
+          </a:p>
+          <a:p>
+            <a:endParaRPr lang="en-US" dirty="0" smtClean="0"/>
+          </a:p>
+        </p:txBody>
+      </p:sp>
       <p:pic>
         <p:nvPicPr>
-          <p:cNvPr id="4" name="Picture 3"/>
+          <p:cNvPr id="5" name="Picture 4"/>
           <p:cNvPicPr>
             <a:picLocks noChangeAspect="1"/>
           </p:cNvPicPr>
@@ -3855,258 +4048,14 @@
         </p:blipFill>
         <p:spPr>
           <a:xfrm>
-            <a:off x="2220257" y="2631436"/>
-            <a:ext cx="3066827" cy="1099828"/>
+            <a:off x="2051720" y="2214345"/>
+            <a:ext cx="3888432" cy="1718711"/>
           </a:xfrm>
           <a:prstGeom prst="rect">
             <a:avLst/>
           </a:prstGeom>
         </p:spPr>
       </p:pic>
-      <p:sp>
-        <p:nvSpPr>
-          <p:cNvPr id="6" name="Content Placeholder 2"/>
-          <p:cNvSpPr txBox="1">
-            <a:spLocks/>
-          </p:cNvSpPr>
-          <p:nvPr/>
-        </p:nvSpPr>
-        <p:spPr>
-          <a:xfrm>
-            <a:off x="609600" y="3933056"/>
-            <a:ext cx="7620000" cy="2376264"/>
-          </a:xfrm>
-          <a:prstGeom prst="rect">
-            <a:avLst/>
-          </a:prstGeom>
-        </p:spPr>
-        <p:txBody>
-          <a:bodyPr vert="horz" lIns="91440" tIns="45720" rIns="91440" bIns="45720" rtlCol="0">
-            <a:normAutofit/>
-          </a:bodyPr>
-          <a:lstStyle>
-            <a:lvl1pPr marL="342900" indent="-228600" algn="l" defTabSz="914400" rtl="0" eaLnBrk="1" latinLnBrk="0" hangingPunct="1">
-              <a:spcBef>
-                <a:spcPct val="20000"/>
-              </a:spcBef>
-              <a:buClr>
-                <a:schemeClr val="accent1"/>
-              </a:buClr>
-              <a:buFont typeface="Arial" pitchFamily="34" charset="0"/>
-              <a:buChar char="•"/>
-              <a:defRPr sz="2200" kern="1200">
-                <a:solidFill>
-                  <a:schemeClr val="tx1"/>
-                </a:solidFill>
-                <a:latin typeface="+mn-lt"/>
-                <a:ea typeface="+mn-ea"/>
-                <a:cs typeface="+mn-cs"/>
-              </a:defRPr>
-            </a:lvl1pPr>
-            <a:lvl2pPr marL="640080" indent="-228600" algn="l" defTabSz="914400" rtl="0" eaLnBrk="1" latinLnBrk="0" hangingPunct="1">
-              <a:spcBef>
-                <a:spcPct val="20000"/>
-              </a:spcBef>
-              <a:buClr>
-                <a:schemeClr val="accent2"/>
-              </a:buClr>
-              <a:buFont typeface="Arial" pitchFamily="34" charset="0"/>
-              <a:buChar char="•"/>
-              <a:defRPr sz="2000" kern="1200">
-                <a:solidFill>
-                  <a:schemeClr val="tx1"/>
-                </a:solidFill>
-                <a:latin typeface="+mn-lt"/>
-                <a:ea typeface="+mn-ea"/>
-                <a:cs typeface="+mn-cs"/>
-              </a:defRPr>
-            </a:lvl2pPr>
-            <a:lvl3pPr marL="1005840" indent="-228600" algn="l" defTabSz="914400" rtl="0" eaLnBrk="1" latinLnBrk="0" hangingPunct="1">
-              <a:spcBef>
-                <a:spcPct val="20000"/>
-              </a:spcBef>
-              <a:buClr>
-                <a:schemeClr val="accent3"/>
-              </a:buClr>
-              <a:buFont typeface="Arial" pitchFamily="34" charset="0"/>
-              <a:buChar char="•"/>
-              <a:defRPr sz="1800" kern="1200">
-                <a:solidFill>
-                  <a:schemeClr val="tx1"/>
-                </a:solidFill>
-                <a:latin typeface="+mn-lt"/>
-                <a:ea typeface="+mn-ea"/>
-                <a:cs typeface="+mn-cs"/>
-              </a:defRPr>
-            </a:lvl3pPr>
-            <a:lvl4pPr marL="1280160" indent="-228600" algn="l" defTabSz="914400" rtl="0" eaLnBrk="1" latinLnBrk="0" hangingPunct="1">
-              <a:spcBef>
-                <a:spcPct val="20000"/>
-              </a:spcBef>
-              <a:buClr>
-                <a:schemeClr val="accent4"/>
-              </a:buClr>
-              <a:buFont typeface="Arial" pitchFamily="34" charset="0"/>
-              <a:buChar char="•"/>
-              <a:defRPr sz="1600" kern="1200">
-                <a:solidFill>
-                  <a:schemeClr val="tx1"/>
-                </a:solidFill>
-                <a:latin typeface="+mn-lt"/>
-                <a:ea typeface="+mn-ea"/>
-                <a:cs typeface="+mn-cs"/>
-              </a:defRPr>
-            </a:lvl4pPr>
-            <a:lvl5pPr marL="1554480" indent="-228600" algn="l" defTabSz="914400" rtl="0" eaLnBrk="1" latinLnBrk="0" hangingPunct="1">
-              <a:spcBef>
-                <a:spcPct val="20000"/>
-              </a:spcBef>
-              <a:buClr>
-                <a:schemeClr val="accent5"/>
-              </a:buClr>
-              <a:buFont typeface="Arial" pitchFamily="34" charset="0"/>
-              <a:buChar char="•"/>
-              <a:defRPr sz="1400" kern="1200" baseline="0">
-                <a:solidFill>
-                  <a:schemeClr val="tx1"/>
-                </a:solidFill>
-                <a:latin typeface="+mn-lt"/>
-                <a:ea typeface="+mn-ea"/>
-                <a:cs typeface="+mn-cs"/>
-              </a:defRPr>
-            </a:lvl5pPr>
-            <a:lvl6pPr marL="1737360" indent="-182880" algn="l" defTabSz="914400" rtl="0" eaLnBrk="1" latinLnBrk="0" hangingPunct="1">
-              <a:spcBef>
-                <a:spcPct val="20000"/>
-              </a:spcBef>
-              <a:buClr>
-                <a:schemeClr val="accent1"/>
-              </a:buClr>
-              <a:buFont typeface="Arial" pitchFamily="34" charset="0"/>
-              <a:buChar char="•"/>
-              <a:defRPr sz="1400" kern="1200" baseline="0">
-                <a:solidFill>
-                  <a:schemeClr val="tx1"/>
-                </a:solidFill>
-                <a:latin typeface="+mn-lt"/>
-                <a:ea typeface="+mn-ea"/>
-                <a:cs typeface="+mn-cs"/>
-              </a:defRPr>
-            </a:lvl6pPr>
-            <a:lvl7pPr marL="1920240" indent="-182880" algn="l" defTabSz="914400" rtl="0" eaLnBrk="1" latinLnBrk="0" hangingPunct="1">
-              <a:spcBef>
-                <a:spcPct val="20000"/>
-              </a:spcBef>
-              <a:buClr>
-                <a:schemeClr val="accent2"/>
-              </a:buClr>
-              <a:buFont typeface="Arial" pitchFamily="34" charset="0"/>
-              <a:buChar char="•"/>
-              <a:defRPr sz="1400" kern="1200">
-                <a:solidFill>
-                  <a:schemeClr val="tx1"/>
-                </a:solidFill>
-                <a:latin typeface="+mn-lt"/>
-                <a:ea typeface="+mn-ea"/>
-                <a:cs typeface="+mn-cs"/>
-              </a:defRPr>
-            </a:lvl7pPr>
-            <a:lvl8pPr marL="2103120" indent="-182880" algn="l" defTabSz="914400" rtl="0" eaLnBrk="1" latinLnBrk="0" hangingPunct="1">
-              <a:spcBef>
-                <a:spcPct val="20000"/>
-              </a:spcBef>
-              <a:buClr>
-                <a:schemeClr val="accent3"/>
-              </a:buClr>
-              <a:buFont typeface="Arial" pitchFamily="34" charset="0"/>
-              <a:buChar char="•"/>
-              <a:defRPr sz="1400" kern="1200">
-                <a:solidFill>
-                  <a:schemeClr val="tx1"/>
-                </a:solidFill>
-                <a:latin typeface="+mn-lt"/>
-                <a:ea typeface="+mn-ea"/>
-                <a:cs typeface="+mn-cs"/>
-              </a:defRPr>
-            </a:lvl8pPr>
-            <a:lvl9pPr marL="2286000" indent="-182880" algn="l" defTabSz="914400" rtl="0" eaLnBrk="1" latinLnBrk="0" hangingPunct="1">
-              <a:spcBef>
-                <a:spcPct val="20000"/>
-              </a:spcBef>
-              <a:buClr>
-                <a:schemeClr val="accent4"/>
-              </a:buClr>
-              <a:buFont typeface="Arial" pitchFamily="34" charset="0"/>
-              <a:buChar char="•"/>
-              <a:defRPr sz="1400" kern="1200">
-                <a:solidFill>
-                  <a:schemeClr val="tx1"/>
-                </a:solidFill>
-                <a:latin typeface="+mn-lt"/>
-                <a:ea typeface="+mn-ea"/>
-                <a:cs typeface="+mn-cs"/>
-              </a:defRPr>
-            </a:lvl9pPr>
-          </a:lstStyle>
-          <a:p>
-            <a:r>
-              <a:rPr lang="el-GR" dirty="0" smtClean="0"/>
-              <a:t>α</a:t>
-            </a:r>
-            <a:endParaRPr lang="en-US" dirty="0" smtClean="0"/>
-          </a:p>
-          <a:p>
-            <a:pPr lvl="1"/>
-            <a:r>
-              <a:rPr lang="en-US" dirty="0" smtClean="0"/>
-              <a:t>Meta heuristic value relating to the favoring of pheromone</a:t>
-            </a:r>
-          </a:p>
-          <a:p>
-            <a:r>
-              <a:rPr lang="el-GR" dirty="0" smtClean="0"/>
-              <a:t>β</a:t>
-            </a:r>
-            <a:endParaRPr lang="en-US" dirty="0" smtClean="0"/>
-          </a:p>
-          <a:p>
-            <a:pPr lvl="1"/>
-            <a:r>
-              <a:rPr lang="en-US" dirty="0" smtClean="0"/>
-              <a:t>Meta </a:t>
-            </a:r>
-            <a:r>
-              <a:rPr lang="en-US" dirty="0"/>
-              <a:t>heuristic value relating to the favoring of </a:t>
-            </a:r>
-            <a:r>
-              <a:rPr lang="en-US" dirty="0" smtClean="0"/>
-              <a:t>pheromone</a:t>
-            </a:r>
-          </a:p>
-          <a:p>
-            <a:r>
-              <a:rPr lang="en-US" dirty="0" smtClean="0"/>
-              <a:t>η</a:t>
-            </a:r>
-          </a:p>
-          <a:p>
-            <a:pPr lvl="1"/>
-            <a:r>
-              <a:rPr lang="en-US" dirty="0" smtClean="0"/>
-              <a:t>1/distance from current to node </a:t>
-            </a:r>
-            <a:r>
-              <a:rPr lang="en-US" dirty="0" err="1" smtClean="0"/>
-              <a:t>xy</a:t>
-            </a:r>
-            <a:endParaRPr lang="en-GB" dirty="0" smtClean="0"/>
-          </a:p>
-          <a:p>
-            <a:endParaRPr lang="en-US" dirty="0" smtClean="0"/>
-          </a:p>
-        </p:txBody>
-      </p:sp>
     </p:spTree>
     <p:extLst>
       <p:ext uri="{BB962C8B-B14F-4D97-AF65-F5344CB8AC3E}">
@@ -4194,9 +4143,219 @@
           </a:p>
         </p:txBody>
       </p:sp>
+      <p:sp>
+        <p:nvSpPr>
+          <p:cNvPr id="6" name="Content Placeholder 2"/>
+          <p:cNvSpPr txBox="1">
+            <a:spLocks/>
+          </p:cNvSpPr>
+          <p:nvPr/>
+        </p:nvSpPr>
+        <p:spPr>
+          <a:xfrm>
+            <a:off x="609600" y="4797152"/>
+            <a:ext cx="7620000" cy="1252736"/>
+          </a:xfrm>
+          <a:prstGeom prst="rect">
+            <a:avLst/>
+          </a:prstGeom>
+        </p:spPr>
+        <p:txBody>
+          <a:bodyPr vert="horz" lIns="91440" tIns="45720" rIns="91440" bIns="45720" rtlCol="0">
+            <a:normAutofit/>
+          </a:bodyPr>
+          <a:lstStyle>
+            <a:lvl1pPr marL="342900" indent="-228600" algn="l" defTabSz="914400" rtl="0" eaLnBrk="1" latinLnBrk="0" hangingPunct="1">
+              <a:spcBef>
+                <a:spcPct val="20000"/>
+              </a:spcBef>
+              <a:buClr>
+                <a:schemeClr val="accent1"/>
+              </a:buClr>
+              <a:buFont typeface="Arial" pitchFamily="34" charset="0"/>
+              <a:buChar char="•"/>
+              <a:defRPr sz="2200" kern="1200">
+                <a:solidFill>
+                  <a:schemeClr val="tx1"/>
+                </a:solidFill>
+                <a:latin typeface="+mn-lt"/>
+                <a:ea typeface="+mn-ea"/>
+                <a:cs typeface="+mn-cs"/>
+              </a:defRPr>
+            </a:lvl1pPr>
+            <a:lvl2pPr marL="640080" indent="-228600" algn="l" defTabSz="914400" rtl="0" eaLnBrk="1" latinLnBrk="0" hangingPunct="1">
+              <a:spcBef>
+                <a:spcPct val="20000"/>
+              </a:spcBef>
+              <a:buClr>
+                <a:schemeClr val="accent2"/>
+              </a:buClr>
+              <a:buFont typeface="Arial" pitchFamily="34" charset="0"/>
+              <a:buChar char="•"/>
+              <a:defRPr sz="2000" kern="1200">
+                <a:solidFill>
+                  <a:schemeClr val="tx1"/>
+                </a:solidFill>
+                <a:latin typeface="+mn-lt"/>
+                <a:ea typeface="+mn-ea"/>
+                <a:cs typeface="+mn-cs"/>
+              </a:defRPr>
+            </a:lvl2pPr>
+            <a:lvl3pPr marL="1005840" indent="-228600" algn="l" defTabSz="914400" rtl="0" eaLnBrk="1" latinLnBrk="0" hangingPunct="1">
+              <a:spcBef>
+                <a:spcPct val="20000"/>
+              </a:spcBef>
+              <a:buClr>
+                <a:schemeClr val="accent3"/>
+              </a:buClr>
+              <a:buFont typeface="Arial" pitchFamily="34" charset="0"/>
+              <a:buChar char="•"/>
+              <a:defRPr sz="1800" kern="1200">
+                <a:solidFill>
+                  <a:schemeClr val="tx1"/>
+                </a:solidFill>
+                <a:latin typeface="+mn-lt"/>
+                <a:ea typeface="+mn-ea"/>
+                <a:cs typeface="+mn-cs"/>
+              </a:defRPr>
+            </a:lvl3pPr>
+            <a:lvl4pPr marL="1280160" indent="-228600" algn="l" defTabSz="914400" rtl="0" eaLnBrk="1" latinLnBrk="0" hangingPunct="1">
+              <a:spcBef>
+                <a:spcPct val="20000"/>
+              </a:spcBef>
+              <a:buClr>
+                <a:schemeClr val="accent4"/>
+              </a:buClr>
+              <a:buFont typeface="Arial" pitchFamily="34" charset="0"/>
+              <a:buChar char="•"/>
+              <a:defRPr sz="1600" kern="1200">
+                <a:solidFill>
+                  <a:schemeClr val="tx1"/>
+                </a:solidFill>
+                <a:latin typeface="+mn-lt"/>
+                <a:ea typeface="+mn-ea"/>
+                <a:cs typeface="+mn-cs"/>
+              </a:defRPr>
+            </a:lvl4pPr>
+            <a:lvl5pPr marL="1554480" indent="-228600" algn="l" defTabSz="914400" rtl="0" eaLnBrk="1" latinLnBrk="0" hangingPunct="1">
+              <a:spcBef>
+                <a:spcPct val="20000"/>
+              </a:spcBef>
+              <a:buClr>
+                <a:schemeClr val="accent5"/>
+              </a:buClr>
+              <a:buFont typeface="Arial" pitchFamily="34" charset="0"/>
+              <a:buChar char="•"/>
+              <a:defRPr sz="1400" kern="1200" baseline="0">
+                <a:solidFill>
+                  <a:schemeClr val="tx1"/>
+                </a:solidFill>
+                <a:latin typeface="+mn-lt"/>
+                <a:ea typeface="+mn-ea"/>
+                <a:cs typeface="+mn-cs"/>
+              </a:defRPr>
+            </a:lvl5pPr>
+            <a:lvl6pPr marL="1737360" indent="-182880" algn="l" defTabSz="914400" rtl="0" eaLnBrk="1" latinLnBrk="0" hangingPunct="1">
+              <a:spcBef>
+                <a:spcPct val="20000"/>
+              </a:spcBef>
+              <a:buClr>
+                <a:schemeClr val="accent1"/>
+              </a:buClr>
+              <a:buFont typeface="Arial" pitchFamily="34" charset="0"/>
+              <a:buChar char="•"/>
+              <a:defRPr sz="1400" kern="1200" baseline="0">
+                <a:solidFill>
+                  <a:schemeClr val="tx1"/>
+                </a:solidFill>
+                <a:latin typeface="+mn-lt"/>
+                <a:ea typeface="+mn-ea"/>
+                <a:cs typeface="+mn-cs"/>
+              </a:defRPr>
+            </a:lvl6pPr>
+            <a:lvl7pPr marL="1920240" indent="-182880" algn="l" defTabSz="914400" rtl="0" eaLnBrk="1" latinLnBrk="0" hangingPunct="1">
+              <a:spcBef>
+                <a:spcPct val="20000"/>
+              </a:spcBef>
+              <a:buClr>
+                <a:schemeClr val="accent2"/>
+              </a:buClr>
+              <a:buFont typeface="Arial" pitchFamily="34" charset="0"/>
+              <a:buChar char="•"/>
+              <a:defRPr sz="1400" kern="1200">
+                <a:solidFill>
+                  <a:schemeClr val="tx1"/>
+                </a:solidFill>
+                <a:latin typeface="+mn-lt"/>
+                <a:ea typeface="+mn-ea"/>
+                <a:cs typeface="+mn-cs"/>
+              </a:defRPr>
+            </a:lvl7pPr>
+            <a:lvl8pPr marL="2103120" indent="-182880" algn="l" defTabSz="914400" rtl="0" eaLnBrk="1" latinLnBrk="0" hangingPunct="1">
+              <a:spcBef>
+                <a:spcPct val="20000"/>
+              </a:spcBef>
+              <a:buClr>
+                <a:schemeClr val="accent3"/>
+              </a:buClr>
+              <a:buFont typeface="Arial" pitchFamily="34" charset="0"/>
+              <a:buChar char="•"/>
+              <a:defRPr sz="1400" kern="1200">
+                <a:solidFill>
+                  <a:schemeClr val="tx1"/>
+                </a:solidFill>
+                <a:latin typeface="+mn-lt"/>
+                <a:ea typeface="+mn-ea"/>
+                <a:cs typeface="+mn-cs"/>
+              </a:defRPr>
+            </a:lvl8pPr>
+            <a:lvl9pPr marL="2286000" indent="-182880" algn="l" defTabSz="914400" rtl="0" eaLnBrk="1" latinLnBrk="0" hangingPunct="1">
+              <a:spcBef>
+                <a:spcPct val="20000"/>
+              </a:spcBef>
+              <a:buClr>
+                <a:schemeClr val="accent4"/>
+              </a:buClr>
+              <a:buFont typeface="Arial" pitchFamily="34" charset="0"/>
+              <a:buChar char="•"/>
+              <a:defRPr sz="1400" kern="1200">
+                <a:solidFill>
+                  <a:schemeClr val="tx1"/>
+                </a:solidFill>
+                <a:latin typeface="+mn-lt"/>
+                <a:ea typeface="+mn-ea"/>
+                <a:cs typeface="+mn-cs"/>
+              </a:defRPr>
+            </a:lvl9pPr>
+          </a:lstStyle>
+          <a:p>
+            <a:r>
+              <a:rPr lang="en-US" dirty="0" smtClean="0"/>
+              <a:t>This correctly factors in decay and allows for any ant moving through node </a:t>
+            </a:r>
+            <a:r>
+              <a:rPr lang="en-US" dirty="0" err="1" smtClean="0"/>
+              <a:t>xy</a:t>
+            </a:r>
+            <a:r>
+              <a:rPr lang="en-US" dirty="0" smtClean="0"/>
+              <a:t> to add to the pheromone concentration at node </a:t>
+            </a:r>
+            <a:r>
+              <a:rPr lang="en-US" dirty="0" err="1" smtClean="0"/>
+              <a:t>xy</a:t>
+            </a:r>
+            <a:r>
+              <a:rPr lang="en-US" dirty="0" smtClean="0"/>
+              <a:t> </a:t>
+            </a:r>
+            <a:endParaRPr lang="en-GB" dirty="0"/>
+          </a:p>
+        </p:txBody>
+      </p:sp>
       <p:pic>
         <p:nvPicPr>
-          <p:cNvPr id="4" name="Picture 3"/>
+          <p:cNvPr id="7" name="Picture 6"/>
           <p:cNvPicPr>
             <a:picLocks noChangeAspect="1"/>
           </p:cNvPicPr>
@@ -4216,8 +4375,8 @@
         </p:blipFill>
         <p:spPr>
           <a:xfrm>
-            <a:off x="1331640" y="3861048"/>
-            <a:ext cx="5347865" cy="574353"/>
+            <a:off x="1331640" y="2727367"/>
+            <a:ext cx="5580112" cy="1030809"/>
           </a:xfrm>
           <a:prstGeom prst="rect">
             <a:avLst/>
@@ -4226,14 +4385,14 @@
       </p:pic>
       <p:pic>
         <p:nvPicPr>
-          <p:cNvPr id="5" name="Picture 4"/>
+          <p:cNvPr id="8" name="Picture 7"/>
           <p:cNvPicPr>
             <a:picLocks noChangeAspect="1"/>
           </p:cNvPicPr>
           <p:nvPr/>
         </p:nvPicPr>
         <p:blipFill>
-          <a:blip r:embed="rId3">
+          <a:blip r:embed="rId3" cstate="print">
             <a:extLst>
               <a:ext uri="{28A0092B-C50C-407E-A947-70E740481C1C}">
                 <a14:useLocalDpi xmlns:a14="http://schemas.microsoft.com/office/drawing/2010/main" val="0"/>
@@ -4246,224 +4405,14 @@
         </p:blipFill>
         <p:spPr>
           <a:xfrm>
-            <a:off x="2339752" y="3068960"/>
-            <a:ext cx="3684818" cy="483865"/>
+            <a:off x="1326152" y="3682526"/>
+            <a:ext cx="6516216" cy="1127089"/>
           </a:xfrm>
           <a:prstGeom prst="rect">
             <a:avLst/>
           </a:prstGeom>
         </p:spPr>
       </p:pic>
-      <p:sp>
-        <p:nvSpPr>
-          <p:cNvPr id="6" name="Content Placeholder 2"/>
-          <p:cNvSpPr txBox="1">
-            <a:spLocks/>
-          </p:cNvSpPr>
-          <p:nvPr/>
-        </p:nvSpPr>
-        <p:spPr>
-          <a:xfrm>
-            <a:off x="609600" y="4797152"/>
-            <a:ext cx="7620000" cy="1252736"/>
-          </a:xfrm>
-          <a:prstGeom prst="rect">
-            <a:avLst/>
-          </a:prstGeom>
-        </p:spPr>
-        <p:txBody>
-          <a:bodyPr vert="horz" lIns="91440" tIns="45720" rIns="91440" bIns="45720" rtlCol="0">
-            <a:normAutofit/>
-          </a:bodyPr>
-          <a:lstStyle>
-            <a:lvl1pPr marL="342900" indent="-228600" algn="l" defTabSz="914400" rtl="0" eaLnBrk="1" latinLnBrk="0" hangingPunct="1">
-              <a:spcBef>
-                <a:spcPct val="20000"/>
-              </a:spcBef>
-              <a:buClr>
-                <a:schemeClr val="accent1"/>
-              </a:buClr>
-              <a:buFont typeface="Arial" pitchFamily="34" charset="0"/>
-              <a:buChar char="•"/>
-              <a:defRPr sz="2200" kern="1200">
-                <a:solidFill>
-                  <a:schemeClr val="tx1"/>
-                </a:solidFill>
-                <a:latin typeface="+mn-lt"/>
-                <a:ea typeface="+mn-ea"/>
-                <a:cs typeface="+mn-cs"/>
-              </a:defRPr>
-            </a:lvl1pPr>
-            <a:lvl2pPr marL="640080" indent="-228600" algn="l" defTabSz="914400" rtl="0" eaLnBrk="1" latinLnBrk="0" hangingPunct="1">
-              <a:spcBef>
-                <a:spcPct val="20000"/>
-              </a:spcBef>
-              <a:buClr>
-                <a:schemeClr val="accent2"/>
-              </a:buClr>
-              <a:buFont typeface="Arial" pitchFamily="34" charset="0"/>
-              <a:buChar char="•"/>
-              <a:defRPr sz="2000" kern="1200">
-                <a:solidFill>
-                  <a:schemeClr val="tx1"/>
-                </a:solidFill>
-                <a:latin typeface="+mn-lt"/>
-                <a:ea typeface="+mn-ea"/>
-                <a:cs typeface="+mn-cs"/>
-              </a:defRPr>
-            </a:lvl2pPr>
-            <a:lvl3pPr marL="1005840" indent="-228600" algn="l" defTabSz="914400" rtl="0" eaLnBrk="1" latinLnBrk="0" hangingPunct="1">
-              <a:spcBef>
-                <a:spcPct val="20000"/>
-              </a:spcBef>
-              <a:buClr>
-                <a:schemeClr val="accent3"/>
-              </a:buClr>
-              <a:buFont typeface="Arial" pitchFamily="34" charset="0"/>
-              <a:buChar char="•"/>
-              <a:defRPr sz="1800" kern="1200">
-                <a:solidFill>
-                  <a:schemeClr val="tx1"/>
-                </a:solidFill>
-                <a:latin typeface="+mn-lt"/>
-                <a:ea typeface="+mn-ea"/>
-                <a:cs typeface="+mn-cs"/>
-              </a:defRPr>
-            </a:lvl3pPr>
-            <a:lvl4pPr marL="1280160" indent="-228600" algn="l" defTabSz="914400" rtl="0" eaLnBrk="1" latinLnBrk="0" hangingPunct="1">
-              <a:spcBef>
-                <a:spcPct val="20000"/>
-              </a:spcBef>
-              <a:buClr>
-                <a:schemeClr val="accent4"/>
-              </a:buClr>
-              <a:buFont typeface="Arial" pitchFamily="34" charset="0"/>
-              <a:buChar char="•"/>
-              <a:defRPr sz="1600" kern="1200">
-                <a:solidFill>
-                  <a:schemeClr val="tx1"/>
-                </a:solidFill>
-                <a:latin typeface="+mn-lt"/>
-                <a:ea typeface="+mn-ea"/>
-                <a:cs typeface="+mn-cs"/>
-              </a:defRPr>
-            </a:lvl4pPr>
-            <a:lvl5pPr marL="1554480" indent="-228600" algn="l" defTabSz="914400" rtl="0" eaLnBrk="1" latinLnBrk="0" hangingPunct="1">
-              <a:spcBef>
-                <a:spcPct val="20000"/>
-              </a:spcBef>
-              <a:buClr>
-                <a:schemeClr val="accent5"/>
-              </a:buClr>
-              <a:buFont typeface="Arial" pitchFamily="34" charset="0"/>
-              <a:buChar char="•"/>
-              <a:defRPr sz="1400" kern="1200" baseline="0">
-                <a:solidFill>
-                  <a:schemeClr val="tx1"/>
-                </a:solidFill>
-                <a:latin typeface="+mn-lt"/>
-                <a:ea typeface="+mn-ea"/>
-                <a:cs typeface="+mn-cs"/>
-              </a:defRPr>
-            </a:lvl5pPr>
-            <a:lvl6pPr marL="1737360" indent="-182880" algn="l" defTabSz="914400" rtl="0" eaLnBrk="1" latinLnBrk="0" hangingPunct="1">
-              <a:spcBef>
-                <a:spcPct val="20000"/>
-              </a:spcBef>
-              <a:buClr>
-                <a:schemeClr val="accent1"/>
-              </a:buClr>
-              <a:buFont typeface="Arial" pitchFamily="34" charset="0"/>
-              <a:buChar char="•"/>
-              <a:defRPr sz="1400" kern="1200" baseline="0">
-                <a:solidFill>
-                  <a:schemeClr val="tx1"/>
-                </a:solidFill>
-                <a:latin typeface="+mn-lt"/>
-                <a:ea typeface="+mn-ea"/>
-                <a:cs typeface="+mn-cs"/>
-              </a:defRPr>
-            </a:lvl6pPr>
-            <a:lvl7pPr marL="1920240" indent="-182880" algn="l" defTabSz="914400" rtl="0" eaLnBrk="1" latinLnBrk="0" hangingPunct="1">
-              <a:spcBef>
-                <a:spcPct val="20000"/>
-              </a:spcBef>
-              <a:buClr>
-                <a:schemeClr val="accent2"/>
-              </a:buClr>
-              <a:buFont typeface="Arial" pitchFamily="34" charset="0"/>
-              <a:buChar char="•"/>
-              <a:defRPr sz="1400" kern="1200">
-                <a:solidFill>
-                  <a:schemeClr val="tx1"/>
-                </a:solidFill>
-                <a:latin typeface="+mn-lt"/>
-                <a:ea typeface="+mn-ea"/>
-                <a:cs typeface="+mn-cs"/>
-              </a:defRPr>
-            </a:lvl7pPr>
-            <a:lvl8pPr marL="2103120" indent="-182880" algn="l" defTabSz="914400" rtl="0" eaLnBrk="1" latinLnBrk="0" hangingPunct="1">
-              <a:spcBef>
-                <a:spcPct val="20000"/>
-              </a:spcBef>
-              <a:buClr>
-                <a:schemeClr val="accent3"/>
-              </a:buClr>
-              <a:buFont typeface="Arial" pitchFamily="34" charset="0"/>
-              <a:buChar char="•"/>
-              <a:defRPr sz="1400" kern="1200">
-                <a:solidFill>
-                  <a:schemeClr val="tx1"/>
-                </a:solidFill>
-                <a:latin typeface="+mn-lt"/>
-                <a:ea typeface="+mn-ea"/>
-                <a:cs typeface="+mn-cs"/>
-              </a:defRPr>
-            </a:lvl8pPr>
-            <a:lvl9pPr marL="2286000" indent="-182880" algn="l" defTabSz="914400" rtl="0" eaLnBrk="1" latinLnBrk="0" hangingPunct="1">
-              <a:spcBef>
-                <a:spcPct val="20000"/>
-              </a:spcBef>
-              <a:buClr>
-                <a:schemeClr val="accent4"/>
-              </a:buClr>
-              <a:buFont typeface="Arial" pitchFamily="34" charset="0"/>
-              <a:buChar char="•"/>
-              <a:defRPr sz="1400" kern="1200">
-                <a:solidFill>
-                  <a:schemeClr val="tx1"/>
-                </a:solidFill>
-                <a:latin typeface="+mn-lt"/>
-                <a:ea typeface="+mn-ea"/>
-                <a:cs typeface="+mn-cs"/>
-              </a:defRPr>
-            </a:lvl9pPr>
-          </a:lstStyle>
-          <a:p>
-            <a:r>
-              <a:rPr lang="en-US" dirty="0" smtClean="0"/>
-              <a:t>This correctly factors in decay and allows for any ant moving through node </a:t>
-            </a:r>
-            <a:r>
-              <a:rPr lang="en-US" dirty="0" err="1" smtClean="0"/>
-              <a:t>xy</a:t>
-            </a:r>
-            <a:r>
-              <a:rPr lang="en-US" dirty="0" smtClean="0"/>
-              <a:t> to add to the pheromone concentration at node </a:t>
-            </a:r>
-            <a:r>
-              <a:rPr lang="en-US" dirty="0" err="1" smtClean="0"/>
-              <a:t>xy</a:t>
-            </a:r>
-            <a:r>
-              <a:rPr lang="en-US" dirty="0" smtClean="0"/>
-              <a:t> </a:t>
-            </a:r>
-            <a:endParaRPr lang="en-GB" dirty="0"/>
-          </a:p>
-        </p:txBody>
-      </p:sp>
     </p:spTree>
     <p:extLst>
       <p:ext uri="{BB962C8B-B14F-4D97-AF65-F5344CB8AC3E}">
@@ -4511,7 +4460,15 @@
           <a:p>
             <a:r>
               <a:rPr lang="en-US" dirty="0" smtClean="0"/>
-              <a:t>Technical issues</a:t>
+              <a:t>Technical </a:t>
+            </a:r>
+            <a:r>
+              <a:rPr lang="en-US" dirty="0" smtClean="0"/>
+              <a:t>Implem</a:t>
+            </a:r>
+            <a:r>
+              <a:rPr lang="en-US" dirty="0" smtClean="0"/>
+              <a:t>entation</a:t>
             </a:r>
             <a:endParaRPr lang="en-GB" dirty="0"/>
           </a:p>
@@ -4658,7 +4615,11 @@
           <a:p>
             <a:r>
               <a:rPr lang="en-US" dirty="0" smtClean="0"/>
-              <a:t>Technical issues(2)</a:t>
+              <a:t>Technical </a:t>
+            </a:r>
+            <a:r>
+              <a:rPr lang="en-US" dirty="0" smtClean="0"/>
+              <a:t>Challenges</a:t>
             </a:r>
             <a:endParaRPr lang="en-GB" dirty="0"/>
           </a:p>
@@ -4696,7 +4657,15 @@
             <a:pPr lvl="1"/>
             <a:r>
               <a:rPr lang="en-US" dirty="0" smtClean="0"/>
-              <a:t>Allows updated to the view without it ‘freezing up’</a:t>
+              <a:t>Allows </a:t>
+            </a:r>
+            <a:r>
+              <a:rPr lang="en-US" dirty="0" smtClean="0"/>
+              <a:t>updates of </a:t>
+            </a:r>
+            <a:r>
+              <a:rPr lang="en-US" dirty="0" smtClean="0"/>
+              <a:t>the view without it ‘freezing up’</a:t>
             </a:r>
             <a:endParaRPr lang="en-GB" dirty="0" smtClean="0"/>
           </a:p>
@@ -4730,22 +4699,34 @@
             <a:pPr lvl="2"/>
             <a:r>
               <a:rPr lang="en-US" dirty="0" smtClean="0"/>
-              <a:t>Given the x /y of the start and finish</a:t>
+              <a:t>Given the x /y </a:t>
+            </a:r>
+            <a:r>
+              <a:rPr lang="en-US" dirty="0" smtClean="0"/>
+              <a:t>co-ordinate of </a:t>
+            </a:r>
+            <a:r>
+              <a:rPr lang="en-US" dirty="0" smtClean="0"/>
+              <a:t>the start and finish</a:t>
             </a:r>
           </a:p>
           <a:p>
             <a:pPr lvl="2"/>
             <a:r>
               <a:rPr lang="en-US" dirty="0" smtClean="0"/>
-              <a:t>Linear interpolation can be used to get the value of any </a:t>
-            </a:r>
-            <a:r>
-              <a:rPr lang="en-US" dirty="0" err="1" smtClean="0"/>
-              <a:t>xy</a:t>
-            </a:r>
-            <a:r>
-              <a:rPr lang="en-US" dirty="0" smtClean="0"/>
-              <a:t> on the path between these two points</a:t>
+              <a:t>get </a:t>
+            </a:r>
+            <a:r>
+              <a:rPr lang="en-US" dirty="0" smtClean="0"/>
+              <a:t>the value of any </a:t>
+            </a:r>
+            <a:r>
+              <a:rPr lang="en-US" dirty="0"/>
+              <a:t>x/y co-ordinate </a:t>
+            </a:r>
+            <a:r>
+              <a:rPr lang="en-US" dirty="0" smtClean="0"/>
+              <a:t>on the path between these two points</a:t>
             </a:r>
           </a:p>
           <a:p>
@@ -4756,19 +4737,43 @@
             </a:r>
             <a:r>
               <a:rPr lang="en-GB" dirty="0"/>
-              <a:t>*(1-mu</a:t>
+              <a:t>*(</a:t>
             </a:r>
             <a:r>
               <a:rPr lang="en-GB" dirty="0" smtClean="0"/>
-              <a:t>)+vlaue2*mu);</a:t>
+              <a:t>1-</a:t>
+            </a:r>
+            <a:r>
+              <a:rPr lang="el-GR" dirty="0" smtClean="0"/>
+              <a:t>μ</a:t>
+            </a:r>
+            <a:r>
+              <a:rPr lang="en-GB" dirty="0" smtClean="0"/>
+              <a:t>)+value2*</a:t>
+            </a:r>
+            <a:r>
+              <a:rPr lang="el-GR" dirty="0"/>
+              <a:t> μ</a:t>
+            </a:r>
+            <a:r>
+              <a:rPr lang="en-GB" dirty="0" smtClean="0"/>
+              <a:t>);</a:t>
             </a:r>
             <a:endParaRPr lang="en-US" dirty="0" smtClean="0"/>
           </a:p>
           <a:p>
             <a:pPr lvl="3"/>
             <a:r>
-              <a:rPr lang="en-US" dirty="0" smtClean="0"/>
-              <a:t>Value1/2 is the X or Y value (</a:t>
+              <a:rPr lang="en-US" dirty="0"/>
+              <a:t>v</a:t>
+            </a:r>
+            <a:r>
+              <a:rPr lang="en-US" dirty="0" smtClean="0"/>
+              <a:t>alue1/2 </a:t>
+            </a:r>
+            <a:r>
+              <a:rPr lang="en-US" dirty="0" smtClean="0"/>
+              <a:t>is the X or Y value (</a:t>
             </a:r>
             <a:r>
               <a:rPr lang="en-US" dirty="0" err="1" smtClean="0"/>
@@ -4782,8 +4787,16 @@
           <a:p>
             <a:pPr lvl="3"/>
             <a:r>
-              <a:rPr lang="en-US" dirty="0" smtClean="0"/>
-              <a:t>Mu is how far on that path you want (</a:t>
+              <a:rPr lang="el-GR" dirty="0"/>
+              <a:t>μ</a:t>
+            </a:r>
+            <a:r>
+              <a:rPr lang="en-US" dirty="0" smtClean="0"/>
+              <a:t> </a:t>
+            </a:r>
+            <a:r>
+              <a:rPr lang="en-US" dirty="0" smtClean="0"/>
+              <a:t>is how far on that path you want (</a:t>
             </a:r>
             <a:r>
               <a:rPr lang="en-US" dirty="0" err="1" smtClean="0"/>
@@ -4791,7 +4804,19 @@
             </a:r>
             <a:r>
               <a:rPr lang="en-US" dirty="0" smtClean="0"/>
-              <a:t> mu 0.5 = half way between the points)</a:t>
+              <a:t> </a:t>
+            </a:r>
+            <a:r>
+              <a:rPr lang="el-GR" dirty="0"/>
+              <a:t>μ</a:t>
+            </a:r>
+            <a:r>
+              <a:rPr lang="en-US" dirty="0" smtClean="0"/>
+              <a:t> </a:t>
+            </a:r>
+            <a:r>
+              <a:rPr lang="en-US" dirty="0" smtClean="0"/>
+              <a:t>0.5 = half way between the points)</a:t>
             </a:r>
           </a:p>
           <a:p>
@@ -4913,7 +4938,11 @@
             <a:pPr lvl="3"/>
             <a:r>
               <a:rPr lang="en-US" dirty="0" smtClean="0"/>
-              <a:t>Linear interpolate these two locations to show the ant moving</a:t>
+              <a:t>Linearly </a:t>
+            </a:r>
+            <a:r>
+              <a:rPr lang="en-US" dirty="0" smtClean="0"/>
+              <a:t>interpolate these two locations to show the ant moving</a:t>
             </a:r>
           </a:p>
           <a:p>
@@ -5407,7 +5436,11 @@
           <a:p>
             <a:r>
               <a:rPr lang="en-US" dirty="0" smtClean="0"/>
-              <a:t>Demos	</a:t>
+              <a:t>Demonstration</a:t>
+            </a:r>
+            <a:r>
+              <a:rPr lang="en-US" dirty="0" smtClean="0"/>
+              <a:t>	</a:t>
             </a:r>
             <a:endParaRPr lang="en-GB" dirty="0"/>
           </a:p>
@@ -5430,71 +5463,63 @@
           <a:p>
             <a:r>
               <a:rPr lang="en-US" dirty="0" smtClean="0"/>
-              <a:t>3 </a:t>
-            </a:r>
-            <a:r>
-              <a:rPr lang="en-US" dirty="0" smtClean="0"/>
-              <a:t>demos (all 1 iteration):</a:t>
-            </a:r>
-            <a:endParaRPr lang="en-US" dirty="0" smtClean="0"/>
-          </a:p>
-          <a:p>
-            <a:r>
-              <a:rPr lang="en-US" dirty="0" smtClean="0"/>
-              <a:t>Demo 1: 10 cities 1 ant (slowed down)</a:t>
-            </a:r>
-          </a:p>
-          <a:p>
-            <a:r>
-              <a:rPr lang="en-US" dirty="0" smtClean="0"/>
-              <a:t>Demo 2: 10 cities 20 ants</a:t>
-            </a:r>
-          </a:p>
-          <a:p>
-            <a:r>
-              <a:rPr lang="en-US" dirty="0" smtClean="0"/>
-              <a:t>Demo 3: 20 cities 200 ants (sped up to show it solves</a:t>
-            </a:r>
-            <a:r>
-              <a:rPr lang="en-US" dirty="0" smtClean="0"/>
-              <a:t>)</a:t>
-            </a:r>
-          </a:p>
-          <a:p>
-            <a:endParaRPr lang="en-US" dirty="0"/>
-          </a:p>
-          <a:p>
-            <a:r>
-              <a:rPr lang="en-US" dirty="0" smtClean="0"/>
-              <a:t>Iterations demo</a:t>
-            </a:r>
-          </a:p>
-          <a:p>
-            <a:r>
-              <a:rPr lang="en-US" dirty="0" smtClean="0"/>
-              <a:t>Demo 1: 10 cities, 5 ants, 1 iteration</a:t>
-            </a:r>
-          </a:p>
-          <a:p>
-            <a:r>
-              <a:rPr lang="en-US" dirty="0" smtClean="0"/>
-              <a:t>Demo 2: 10 cities, 5 ants, 10 iterations</a:t>
-            </a:r>
-          </a:p>
-          <a:p>
-            <a:r>
-              <a:rPr lang="en-US" dirty="0" smtClean="0"/>
-              <a:t>Demo 3: 10 cities, 5 ants, 25 iterations</a:t>
-            </a:r>
-          </a:p>
-          <a:p>
-            <a:r>
-              <a:rPr lang="en-US" dirty="0" smtClean="0"/>
-              <a:t>All of the iteration demos are sped up for demo purposes</a:t>
-            </a:r>
-            <a:r>
-              <a:rPr lang="en-US" dirty="0" smtClean="0"/>
-              <a:t> </a:t>
+              <a:t>Current features:</a:t>
+            </a:r>
+          </a:p>
+          <a:p>
+            <a:pPr lvl="1"/>
+            <a:r>
+              <a:rPr lang="en-US" dirty="0" smtClean="0"/>
+              <a:t>load configurations from a file</a:t>
+            </a:r>
+          </a:p>
+          <a:p>
+            <a:pPr lvl="1"/>
+            <a:r>
+              <a:rPr lang="en-US" dirty="0" smtClean="0"/>
+              <a:t>Save configurations to a file</a:t>
+            </a:r>
+          </a:p>
+          <a:p>
+            <a:pPr lvl="1"/>
+            <a:r>
+              <a:rPr lang="en-US" dirty="0" smtClean="0"/>
+              <a:t>Set the speed</a:t>
+            </a:r>
+          </a:p>
+          <a:p>
+            <a:pPr lvl="1"/>
+            <a:r>
+              <a:rPr lang="en-US" dirty="0" smtClean="0"/>
+              <a:t>Modify algorithm parameters</a:t>
+            </a:r>
+          </a:p>
+          <a:p>
+            <a:pPr lvl="1"/>
+            <a:r>
+              <a:rPr lang="en-US" dirty="0" smtClean="0"/>
+              <a:t>Error checking on all fields</a:t>
+            </a:r>
+          </a:p>
+          <a:p>
+            <a:pPr lvl="1"/>
+            <a:r>
+              <a:rPr lang="en-US" dirty="0" smtClean="0"/>
+              <a:t>Display the best route and distance</a:t>
+            </a:r>
+          </a:p>
+          <a:p>
+            <a:pPr lvl="1"/>
+            <a:r>
+              <a:rPr lang="en-US" dirty="0" smtClean="0"/>
+              <a:t>See the ants move</a:t>
+            </a:r>
+          </a:p>
+          <a:p>
+            <a:pPr lvl="1"/>
+            <a:r>
+              <a:rPr lang="en-US" dirty="0" smtClean="0"/>
+              <a:t>Visualise pheromone</a:t>
             </a:r>
             <a:endParaRPr lang="en-GB" dirty="0"/>
           </a:p>

</xml_diff>

<commit_message>
updated city viewer to correctly model 'dead' ants
</commit_message>
<xml_diff>
--- a/mid term demo/ACO-mid-term-presentation.pptx
+++ b/mid term demo/ACO-mid-term-presentation.pptx
@@ -8,14 +8,15 @@
     <p:sldId id="256" r:id="rId2"/>
     <p:sldId id="257" r:id="rId3"/>
     <p:sldId id="258" r:id="rId4"/>
-    <p:sldId id="259" r:id="rId5"/>
-    <p:sldId id="260" r:id="rId6"/>
-    <p:sldId id="261" r:id="rId7"/>
-    <p:sldId id="262" r:id="rId8"/>
-    <p:sldId id="263" r:id="rId9"/>
-    <p:sldId id="264" r:id="rId10"/>
-    <p:sldId id="266" r:id="rId11"/>
-    <p:sldId id="265" r:id="rId12"/>
+    <p:sldId id="267" r:id="rId5"/>
+    <p:sldId id="268" r:id="rId6"/>
+    <p:sldId id="259" r:id="rId7"/>
+    <p:sldId id="260" r:id="rId8"/>
+    <p:sldId id="261" r:id="rId9"/>
+    <p:sldId id="262" r:id="rId10"/>
+    <p:sldId id="263" r:id="rId11"/>
+    <p:sldId id="266" r:id="rId12"/>
+    <p:sldId id="264" r:id="rId13"/>
   </p:sldIdLst>
   <p:sldSz cx="9144000" cy="6858000" type="screen4x3"/>
   <p:notesSz cx="6858000" cy="9144000"/>
@@ -311,7 +312,7 @@
           <a:p>
             <a:fld id="{E6D9E052-7969-43DC-B3F6-1208616C43B4}" type="datetimeFigureOut">
               <a:rPr lang="en-GB" smtClean="0"/>
-              <a:t>11/03/2015</a:t>
+              <a:t>13/03/2015</a:t>
             </a:fld>
             <a:endParaRPr lang="en-GB"/>
           </a:p>
@@ -476,7 +477,7 @@
           <a:p>
             <a:fld id="{E6D9E052-7969-43DC-B3F6-1208616C43B4}" type="datetimeFigureOut">
               <a:rPr lang="en-GB" smtClean="0"/>
-              <a:t>11/03/2015</a:t>
+              <a:t>13/03/2015</a:t>
             </a:fld>
             <a:endParaRPr lang="en-GB"/>
           </a:p>
@@ -651,7 +652,7 @@
           <a:p>
             <a:fld id="{E6D9E052-7969-43DC-B3F6-1208616C43B4}" type="datetimeFigureOut">
               <a:rPr lang="en-GB" smtClean="0"/>
-              <a:t>11/03/2015</a:t>
+              <a:t>13/03/2015</a:t>
             </a:fld>
             <a:endParaRPr lang="en-GB"/>
           </a:p>
@@ -816,7 +817,7 @@
           <a:p>
             <a:fld id="{E6D9E052-7969-43DC-B3F6-1208616C43B4}" type="datetimeFigureOut">
               <a:rPr lang="en-GB" smtClean="0"/>
-              <a:t>11/03/2015</a:t>
+              <a:t>13/03/2015</a:t>
             </a:fld>
             <a:endParaRPr lang="en-GB"/>
           </a:p>
@@ -1057,7 +1058,7 @@
           <a:p>
             <a:fld id="{E6D9E052-7969-43DC-B3F6-1208616C43B4}" type="datetimeFigureOut">
               <a:rPr lang="en-GB" smtClean="0"/>
-              <a:t>11/03/2015</a:t>
+              <a:t>13/03/2015</a:t>
             </a:fld>
             <a:endParaRPr lang="en-GB"/>
           </a:p>
@@ -1340,7 +1341,7 @@
           <a:p>
             <a:fld id="{E6D9E052-7969-43DC-B3F6-1208616C43B4}" type="datetimeFigureOut">
               <a:rPr lang="en-GB" smtClean="0"/>
-              <a:t>11/03/2015</a:t>
+              <a:t>13/03/2015</a:t>
             </a:fld>
             <a:endParaRPr lang="en-GB"/>
           </a:p>
@@ -1769,7 +1770,7 @@
           <a:p>
             <a:fld id="{E6D9E052-7969-43DC-B3F6-1208616C43B4}" type="datetimeFigureOut">
               <a:rPr lang="en-GB" smtClean="0"/>
-              <a:t>11/03/2015</a:t>
+              <a:t>13/03/2015</a:t>
             </a:fld>
             <a:endParaRPr lang="en-GB"/>
           </a:p>
@@ -1882,7 +1883,7 @@
           <a:p>
             <a:fld id="{E6D9E052-7969-43DC-B3F6-1208616C43B4}" type="datetimeFigureOut">
               <a:rPr lang="en-GB" smtClean="0"/>
-              <a:t>11/03/2015</a:t>
+              <a:t>13/03/2015</a:t>
             </a:fld>
             <a:endParaRPr lang="en-GB"/>
           </a:p>
@@ -1972,7 +1973,7 @@
           <a:p>
             <a:fld id="{E6D9E052-7969-43DC-B3F6-1208616C43B4}" type="datetimeFigureOut">
               <a:rPr lang="en-GB" smtClean="0"/>
-              <a:t>11/03/2015</a:t>
+              <a:t>13/03/2015</a:t>
             </a:fld>
             <a:endParaRPr lang="en-GB"/>
           </a:p>
@@ -2161,7 +2162,7 @@
           <a:p>
             <a:fld id="{E6D9E052-7969-43DC-B3F6-1208616C43B4}" type="datetimeFigureOut">
               <a:rPr lang="en-GB" smtClean="0"/>
-              <a:t>11/03/2015</a:t>
+              <a:t>13/03/2015</a:t>
             </a:fld>
             <a:endParaRPr lang="en-GB"/>
           </a:p>
@@ -2479,7 +2480,7 @@
           <a:p>
             <a:fld id="{E6D9E052-7969-43DC-B3F6-1208616C43B4}" type="datetimeFigureOut">
               <a:rPr lang="en-GB" smtClean="0"/>
-              <a:t>11/03/2015</a:t>
+              <a:t>13/03/2015</a:t>
             </a:fld>
             <a:endParaRPr lang="en-GB"/>
           </a:p>
@@ -2858,7 +2859,7 @@
           <a:p>
             <a:fld id="{E6D9E052-7969-43DC-B3F6-1208616C43B4}" type="datetimeFigureOut">
               <a:rPr lang="en-GB" smtClean="0"/>
-              <a:t>11/03/2015</a:t>
+              <a:t>13/03/2015</a:t>
             </a:fld>
             <a:endParaRPr lang="en-GB"/>
           </a:p>
@@ -3284,7 +3285,7 @@
           <a:p>
             <a:r>
               <a:rPr lang="en-US" dirty="0" smtClean="0"/>
-              <a:t>Future work	</a:t>
+              <a:t>Current algorithm</a:t>
             </a:r>
             <a:endParaRPr lang="en-GB" dirty="0"/>
           </a:p>
@@ -3300,93 +3301,503 @@
             <p:ph idx="1"/>
           </p:nvPr>
         </p:nvSpPr>
-        <p:spPr/>
-        <p:txBody>
-          <a:bodyPr/>
-          <a:lstStyle/>
-          <a:p>
-            <a:r>
-              <a:rPr lang="en-US" dirty="0" smtClean="0"/>
-              <a:t>Incorporate the text boxes to allow user define values</a:t>
-            </a:r>
-          </a:p>
-          <a:p>
-            <a:r>
-              <a:rPr lang="en-US" dirty="0" smtClean="0"/>
-              <a:t>Display how many ants are at each city</a:t>
-            </a:r>
-          </a:p>
-          <a:p>
-            <a:r>
-              <a:rPr lang="en-US" dirty="0" smtClean="0"/>
-              <a:t>Allows loading/saving of cities configurations </a:t>
+        <p:spPr>
+          <a:xfrm>
+            <a:off x="457200" y="1600200"/>
+            <a:ext cx="7620000" cy="4205064"/>
+          </a:xfrm>
+        </p:spPr>
+        <p:txBody>
+          <a:bodyPr/>
+          <a:lstStyle/>
+          <a:p>
+            <a:r>
+              <a:rPr lang="en-US" dirty="0" smtClean="0"/>
+              <a:t>To update the view to reflect the current state</a:t>
+            </a:r>
+          </a:p>
+          <a:p>
+            <a:r>
+              <a:rPr lang="en-US" dirty="0" smtClean="0"/>
+              <a:t>For every ant(agent)</a:t>
             </a:r>
           </a:p>
           <a:p>
             <a:pPr lvl="1"/>
             <a:r>
               <a:rPr lang="en-US" dirty="0" smtClean="0"/>
-              <a:t>Allows for the same problem to be demonstrated every time</a:t>
-            </a:r>
-          </a:p>
-          <a:p>
-            <a:r>
-              <a:rPr lang="en-US" dirty="0" smtClean="0"/>
-              <a:t>Display the best route and distance to the user in text form</a:t>
+              <a:t>Draw the ant at their current location</a:t>
+            </a:r>
+          </a:p>
+          <a:p>
+            <a:pPr lvl="1"/>
+            <a:r>
+              <a:rPr lang="en-US" dirty="0" smtClean="0"/>
+              <a:t>If they aren’t finished, move them</a:t>
+            </a:r>
+          </a:p>
+          <a:p>
+            <a:pPr lvl="2"/>
+            <a:r>
+              <a:rPr lang="en-US" dirty="0" smtClean="0"/>
+              <a:t>During this move, get their current X and the destination</a:t>
+            </a:r>
+          </a:p>
+          <a:p>
+            <a:pPr lvl="3"/>
+            <a:r>
+              <a:rPr lang="en-US" dirty="0" smtClean="0"/>
+              <a:t>Linearly interpolate these two locations to show the ant moving</a:t>
+            </a:r>
+          </a:p>
+          <a:p>
+            <a:pPr lvl="3"/>
+            <a:r>
+              <a:rPr lang="en-US" dirty="0" smtClean="0"/>
+              <a:t>Update pheromone</a:t>
+            </a:r>
+          </a:p>
+          <a:p>
+            <a:pPr lvl="2"/>
+            <a:r>
+              <a:rPr lang="en-US" dirty="0" smtClean="0"/>
+              <a:t>If the ant has the current best path, set its path as best</a:t>
+            </a:r>
+          </a:p>
+          <a:p>
+            <a:pPr lvl="3"/>
+            <a:r>
+              <a:rPr lang="en-US" dirty="0" smtClean="0"/>
+              <a:t>Loop through the cities visited in order and draw a line between them</a:t>
+            </a:r>
+          </a:p>
+          <a:p>
+            <a:pPr lvl="3"/>
+            <a:r>
+              <a:rPr lang="en-US" dirty="0" smtClean="0"/>
+              <a:t>paint the updated pheromone</a:t>
             </a:r>
             <a:endParaRPr lang="en-US" dirty="0"/>
           </a:p>
           <a:p>
-            <a:r>
-              <a:rPr lang="en-US" dirty="0" smtClean="0"/>
-              <a:t>Experiment with correct limits to add to text fields</a:t>
+            <a:pPr lvl="1"/>
+            <a:r>
+              <a:rPr lang="en-US" dirty="0" smtClean="0"/>
+              <a:t>Once all ants have finished</a:t>
             </a:r>
             <a:endParaRPr lang="en-US" dirty="0"/>
           </a:p>
           <a:p>
-            <a:r>
-              <a:rPr lang="en-US" dirty="0" smtClean="0"/>
-              <a:t>Potentially add variations of the algorithm</a:t>
-            </a:r>
-          </a:p>
-          <a:p>
-            <a:pPr lvl="1"/>
-            <a:r>
-              <a:rPr lang="en-US" dirty="0" smtClean="0"/>
-              <a:t>Elitist ants, Min-Max system etc.</a:t>
+            <a:pPr lvl="2"/>
+            <a:r>
+              <a:rPr lang="en-US" dirty="0" smtClean="0"/>
+              <a:t>Remove all pheromone trails and only show the best path</a:t>
             </a:r>
             <a:endParaRPr lang="en-US" dirty="0"/>
           </a:p>
           <a:p>
-            <a:r>
-              <a:rPr lang="en-US" dirty="0" smtClean="0"/>
-              <a:t>Test the application thoroughly</a:t>
-            </a:r>
-            <a:endParaRPr lang="en-US" dirty="0"/>
-          </a:p>
-          <a:p>
-            <a:r>
-              <a:rPr lang="en-US" dirty="0" smtClean="0"/>
-              <a:t>Potentially set up an nest-food style of problem</a:t>
-            </a:r>
-          </a:p>
-          <a:p>
-            <a:r>
-              <a:rPr lang="en-US" dirty="0" smtClean="0"/>
-              <a:t>Let the user define the speed which the algorithm runs</a:t>
-            </a:r>
-            <a:endParaRPr lang="en-US" dirty="0"/>
-          </a:p>
-          <a:p>
-            <a:pPr lvl="1"/>
-            <a:endParaRPr lang="en-GB" dirty="0"/>
+            <a:pPr marL="1051560" lvl="3" indent="0">
+              <a:buNone/>
+            </a:pPr>
+            <a:endParaRPr lang="en-US" i="1" dirty="0" smtClean="0"/>
+          </a:p>
+        </p:txBody>
+      </p:sp>
+      <p:sp>
+        <p:nvSpPr>
+          <p:cNvPr id="4" name="Content Placeholder 2"/>
+          <p:cNvSpPr txBox="1">
+            <a:spLocks/>
+          </p:cNvSpPr>
+          <p:nvPr/>
+        </p:nvSpPr>
+        <p:spPr>
+          <a:xfrm>
+            <a:off x="535815" y="5980161"/>
+            <a:ext cx="7272808" cy="892696"/>
+          </a:xfrm>
+          <a:prstGeom prst="rect">
+            <a:avLst/>
+          </a:prstGeom>
+        </p:spPr>
+        <p:txBody>
+          <a:bodyPr vert="horz" lIns="91440" tIns="45720" rIns="91440" bIns="45720" rtlCol="0">
+            <a:normAutofit/>
+          </a:bodyPr>
+          <a:lstStyle>
+            <a:lvl1pPr marL="342900" indent="-228600" algn="l" defTabSz="914400" rtl="0" eaLnBrk="1" latinLnBrk="0" hangingPunct="1">
+              <a:spcBef>
+                <a:spcPct val="20000"/>
+              </a:spcBef>
+              <a:buClr>
+                <a:schemeClr val="accent1"/>
+              </a:buClr>
+              <a:buFont typeface="Arial" pitchFamily="34" charset="0"/>
+              <a:buChar char="•"/>
+              <a:defRPr sz="2200" kern="1200">
+                <a:solidFill>
+                  <a:schemeClr val="tx1"/>
+                </a:solidFill>
+                <a:latin typeface="+mn-lt"/>
+                <a:ea typeface="+mn-ea"/>
+                <a:cs typeface="+mn-cs"/>
+              </a:defRPr>
+            </a:lvl1pPr>
+            <a:lvl2pPr marL="640080" indent="-228600" algn="l" defTabSz="914400" rtl="0" eaLnBrk="1" latinLnBrk="0" hangingPunct="1">
+              <a:spcBef>
+                <a:spcPct val="20000"/>
+              </a:spcBef>
+              <a:buClr>
+                <a:schemeClr val="accent2"/>
+              </a:buClr>
+              <a:buFont typeface="Arial" pitchFamily="34" charset="0"/>
+              <a:buChar char="•"/>
+              <a:defRPr sz="2000" kern="1200">
+                <a:solidFill>
+                  <a:schemeClr val="tx1"/>
+                </a:solidFill>
+                <a:latin typeface="+mn-lt"/>
+                <a:ea typeface="+mn-ea"/>
+                <a:cs typeface="+mn-cs"/>
+              </a:defRPr>
+            </a:lvl2pPr>
+            <a:lvl3pPr marL="1005840" indent="-228600" algn="l" defTabSz="914400" rtl="0" eaLnBrk="1" latinLnBrk="0" hangingPunct="1">
+              <a:spcBef>
+                <a:spcPct val="20000"/>
+              </a:spcBef>
+              <a:buClr>
+                <a:schemeClr val="accent3"/>
+              </a:buClr>
+              <a:buFont typeface="Arial" pitchFamily="34" charset="0"/>
+              <a:buChar char="•"/>
+              <a:defRPr sz="1800" kern="1200">
+                <a:solidFill>
+                  <a:schemeClr val="tx1"/>
+                </a:solidFill>
+                <a:latin typeface="+mn-lt"/>
+                <a:ea typeface="+mn-ea"/>
+                <a:cs typeface="+mn-cs"/>
+              </a:defRPr>
+            </a:lvl3pPr>
+            <a:lvl4pPr marL="1280160" indent="-228600" algn="l" defTabSz="914400" rtl="0" eaLnBrk="1" latinLnBrk="0" hangingPunct="1">
+              <a:spcBef>
+                <a:spcPct val="20000"/>
+              </a:spcBef>
+              <a:buClr>
+                <a:schemeClr val="accent4"/>
+              </a:buClr>
+              <a:buFont typeface="Arial" pitchFamily="34" charset="0"/>
+              <a:buChar char="•"/>
+              <a:defRPr sz="1600" kern="1200">
+                <a:solidFill>
+                  <a:schemeClr val="tx1"/>
+                </a:solidFill>
+                <a:latin typeface="+mn-lt"/>
+                <a:ea typeface="+mn-ea"/>
+                <a:cs typeface="+mn-cs"/>
+              </a:defRPr>
+            </a:lvl4pPr>
+            <a:lvl5pPr marL="1554480" indent="-228600" algn="l" defTabSz="914400" rtl="0" eaLnBrk="1" latinLnBrk="0" hangingPunct="1">
+              <a:spcBef>
+                <a:spcPct val="20000"/>
+              </a:spcBef>
+              <a:buClr>
+                <a:schemeClr val="accent5"/>
+              </a:buClr>
+              <a:buFont typeface="Arial" pitchFamily="34" charset="0"/>
+              <a:buChar char="•"/>
+              <a:defRPr sz="1400" kern="1200" baseline="0">
+                <a:solidFill>
+                  <a:schemeClr val="tx1"/>
+                </a:solidFill>
+                <a:latin typeface="+mn-lt"/>
+                <a:ea typeface="+mn-ea"/>
+                <a:cs typeface="+mn-cs"/>
+              </a:defRPr>
+            </a:lvl5pPr>
+            <a:lvl6pPr marL="1737360" indent="-182880" algn="l" defTabSz="914400" rtl="0" eaLnBrk="1" latinLnBrk="0" hangingPunct="1">
+              <a:spcBef>
+                <a:spcPct val="20000"/>
+              </a:spcBef>
+              <a:buClr>
+                <a:schemeClr val="accent1"/>
+              </a:buClr>
+              <a:buFont typeface="Arial" pitchFamily="34" charset="0"/>
+              <a:buChar char="•"/>
+              <a:defRPr sz="1400" kern="1200" baseline="0">
+                <a:solidFill>
+                  <a:schemeClr val="tx1"/>
+                </a:solidFill>
+                <a:latin typeface="+mn-lt"/>
+                <a:ea typeface="+mn-ea"/>
+                <a:cs typeface="+mn-cs"/>
+              </a:defRPr>
+            </a:lvl6pPr>
+            <a:lvl7pPr marL="1920240" indent="-182880" algn="l" defTabSz="914400" rtl="0" eaLnBrk="1" latinLnBrk="0" hangingPunct="1">
+              <a:spcBef>
+                <a:spcPct val="20000"/>
+              </a:spcBef>
+              <a:buClr>
+                <a:schemeClr val="accent2"/>
+              </a:buClr>
+              <a:buFont typeface="Arial" pitchFamily="34" charset="0"/>
+              <a:buChar char="•"/>
+              <a:defRPr sz="1400" kern="1200">
+                <a:solidFill>
+                  <a:schemeClr val="tx1"/>
+                </a:solidFill>
+                <a:latin typeface="+mn-lt"/>
+                <a:ea typeface="+mn-ea"/>
+                <a:cs typeface="+mn-cs"/>
+              </a:defRPr>
+            </a:lvl7pPr>
+            <a:lvl8pPr marL="2103120" indent="-182880" algn="l" defTabSz="914400" rtl="0" eaLnBrk="1" latinLnBrk="0" hangingPunct="1">
+              <a:spcBef>
+                <a:spcPct val="20000"/>
+              </a:spcBef>
+              <a:buClr>
+                <a:schemeClr val="accent3"/>
+              </a:buClr>
+              <a:buFont typeface="Arial" pitchFamily="34" charset="0"/>
+              <a:buChar char="•"/>
+              <a:defRPr sz="1400" kern="1200">
+                <a:solidFill>
+                  <a:schemeClr val="tx1"/>
+                </a:solidFill>
+                <a:latin typeface="+mn-lt"/>
+                <a:ea typeface="+mn-ea"/>
+                <a:cs typeface="+mn-cs"/>
+              </a:defRPr>
+            </a:lvl8pPr>
+            <a:lvl9pPr marL="2286000" indent="-182880" algn="l" defTabSz="914400" rtl="0" eaLnBrk="1" latinLnBrk="0" hangingPunct="1">
+              <a:spcBef>
+                <a:spcPct val="20000"/>
+              </a:spcBef>
+              <a:buClr>
+                <a:schemeClr val="accent4"/>
+              </a:buClr>
+              <a:buFont typeface="Arial" pitchFamily="34" charset="0"/>
+              <a:buChar char="•"/>
+              <a:defRPr sz="1400" kern="1200">
+                <a:solidFill>
+                  <a:schemeClr val="tx1"/>
+                </a:solidFill>
+                <a:latin typeface="+mn-lt"/>
+                <a:ea typeface="+mn-ea"/>
+                <a:cs typeface="+mn-cs"/>
+              </a:defRPr>
+            </a:lvl9pPr>
+          </a:lstStyle>
+          <a:p>
+            <a:pPr marL="1051560" lvl="3" indent="0">
+              <a:buNone/>
+            </a:pPr>
+            <a:endParaRPr lang="en-US" i="1" dirty="0" smtClean="0"/>
+          </a:p>
+        </p:txBody>
+      </p:sp>
+      <p:sp>
+        <p:nvSpPr>
+          <p:cNvPr id="5" name="Content Placeholder 2"/>
+          <p:cNvSpPr txBox="1">
+            <a:spLocks/>
+          </p:cNvSpPr>
+          <p:nvPr/>
+        </p:nvSpPr>
+        <p:spPr>
+          <a:xfrm>
+            <a:off x="535815" y="5877272"/>
+            <a:ext cx="7010172" cy="868321"/>
+          </a:xfrm>
+          <a:prstGeom prst="rect">
+            <a:avLst/>
+          </a:prstGeom>
+        </p:spPr>
+        <p:txBody>
+          <a:bodyPr vert="horz" lIns="91440" tIns="45720" rIns="91440" bIns="45720" rtlCol="0">
+            <a:normAutofit/>
+          </a:bodyPr>
+          <a:lstStyle>
+            <a:lvl1pPr marL="342900" indent="-228600" algn="l" defTabSz="914400" rtl="0" eaLnBrk="1" latinLnBrk="0" hangingPunct="1">
+              <a:spcBef>
+                <a:spcPct val="20000"/>
+              </a:spcBef>
+              <a:buClr>
+                <a:schemeClr val="accent1"/>
+              </a:buClr>
+              <a:buFont typeface="Arial" pitchFamily="34" charset="0"/>
+              <a:buChar char="•"/>
+              <a:defRPr sz="2200" kern="1200">
+                <a:solidFill>
+                  <a:schemeClr val="tx1"/>
+                </a:solidFill>
+                <a:latin typeface="+mn-lt"/>
+                <a:ea typeface="+mn-ea"/>
+                <a:cs typeface="+mn-cs"/>
+              </a:defRPr>
+            </a:lvl1pPr>
+            <a:lvl2pPr marL="640080" indent="-228600" algn="l" defTabSz="914400" rtl="0" eaLnBrk="1" latinLnBrk="0" hangingPunct="1">
+              <a:spcBef>
+                <a:spcPct val="20000"/>
+              </a:spcBef>
+              <a:buClr>
+                <a:schemeClr val="accent2"/>
+              </a:buClr>
+              <a:buFont typeface="Arial" pitchFamily="34" charset="0"/>
+              <a:buChar char="•"/>
+              <a:defRPr sz="2000" kern="1200">
+                <a:solidFill>
+                  <a:schemeClr val="tx1"/>
+                </a:solidFill>
+                <a:latin typeface="+mn-lt"/>
+                <a:ea typeface="+mn-ea"/>
+                <a:cs typeface="+mn-cs"/>
+              </a:defRPr>
+            </a:lvl2pPr>
+            <a:lvl3pPr marL="1005840" indent="-228600" algn="l" defTabSz="914400" rtl="0" eaLnBrk="1" latinLnBrk="0" hangingPunct="1">
+              <a:spcBef>
+                <a:spcPct val="20000"/>
+              </a:spcBef>
+              <a:buClr>
+                <a:schemeClr val="accent3"/>
+              </a:buClr>
+              <a:buFont typeface="Arial" pitchFamily="34" charset="0"/>
+              <a:buChar char="•"/>
+              <a:defRPr sz="1800" kern="1200">
+                <a:solidFill>
+                  <a:schemeClr val="tx1"/>
+                </a:solidFill>
+                <a:latin typeface="+mn-lt"/>
+                <a:ea typeface="+mn-ea"/>
+                <a:cs typeface="+mn-cs"/>
+              </a:defRPr>
+            </a:lvl3pPr>
+            <a:lvl4pPr marL="1280160" indent="-228600" algn="l" defTabSz="914400" rtl="0" eaLnBrk="1" latinLnBrk="0" hangingPunct="1">
+              <a:spcBef>
+                <a:spcPct val="20000"/>
+              </a:spcBef>
+              <a:buClr>
+                <a:schemeClr val="accent4"/>
+              </a:buClr>
+              <a:buFont typeface="Arial" pitchFamily="34" charset="0"/>
+              <a:buChar char="•"/>
+              <a:defRPr sz="1600" kern="1200">
+                <a:solidFill>
+                  <a:schemeClr val="tx1"/>
+                </a:solidFill>
+                <a:latin typeface="+mn-lt"/>
+                <a:ea typeface="+mn-ea"/>
+                <a:cs typeface="+mn-cs"/>
+              </a:defRPr>
+            </a:lvl4pPr>
+            <a:lvl5pPr marL="1554480" indent="-228600" algn="l" defTabSz="914400" rtl="0" eaLnBrk="1" latinLnBrk="0" hangingPunct="1">
+              <a:spcBef>
+                <a:spcPct val="20000"/>
+              </a:spcBef>
+              <a:buClr>
+                <a:schemeClr val="accent5"/>
+              </a:buClr>
+              <a:buFont typeface="Arial" pitchFamily="34" charset="0"/>
+              <a:buChar char="•"/>
+              <a:defRPr sz="1400" kern="1200" baseline="0">
+                <a:solidFill>
+                  <a:schemeClr val="tx1"/>
+                </a:solidFill>
+                <a:latin typeface="+mn-lt"/>
+                <a:ea typeface="+mn-ea"/>
+                <a:cs typeface="+mn-cs"/>
+              </a:defRPr>
+            </a:lvl5pPr>
+            <a:lvl6pPr marL="1737360" indent="-182880" algn="l" defTabSz="914400" rtl="0" eaLnBrk="1" latinLnBrk="0" hangingPunct="1">
+              <a:spcBef>
+                <a:spcPct val="20000"/>
+              </a:spcBef>
+              <a:buClr>
+                <a:schemeClr val="accent1"/>
+              </a:buClr>
+              <a:buFont typeface="Arial" pitchFamily="34" charset="0"/>
+              <a:buChar char="•"/>
+              <a:defRPr sz="1400" kern="1200" baseline="0">
+                <a:solidFill>
+                  <a:schemeClr val="tx1"/>
+                </a:solidFill>
+                <a:latin typeface="+mn-lt"/>
+                <a:ea typeface="+mn-ea"/>
+                <a:cs typeface="+mn-cs"/>
+              </a:defRPr>
+            </a:lvl6pPr>
+            <a:lvl7pPr marL="1920240" indent="-182880" algn="l" defTabSz="914400" rtl="0" eaLnBrk="1" latinLnBrk="0" hangingPunct="1">
+              <a:spcBef>
+                <a:spcPct val="20000"/>
+              </a:spcBef>
+              <a:buClr>
+                <a:schemeClr val="accent2"/>
+              </a:buClr>
+              <a:buFont typeface="Arial" pitchFamily="34" charset="0"/>
+              <a:buChar char="•"/>
+              <a:defRPr sz="1400" kern="1200">
+                <a:solidFill>
+                  <a:schemeClr val="tx1"/>
+                </a:solidFill>
+                <a:latin typeface="+mn-lt"/>
+                <a:ea typeface="+mn-ea"/>
+                <a:cs typeface="+mn-cs"/>
+              </a:defRPr>
+            </a:lvl7pPr>
+            <a:lvl8pPr marL="2103120" indent="-182880" algn="l" defTabSz="914400" rtl="0" eaLnBrk="1" latinLnBrk="0" hangingPunct="1">
+              <a:spcBef>
+                <a:spcPct val="20000"/>
+              </a:spcBef>
+              <a:buClr>
+                <a:schemeClr val="accent3"/>
+              </a:buClr>
+              <a:buFont typeface="Arial" pitchFamily="34" charset="0"/>
+              <a:buChar char="•"/>
+              <a:defRPr sz="1400" kern="1200">
+                <a:solidFill>
+                  <a:schemeClr val="tx1"/>
+                </a:solidFill>
+                <a:latin typeface="+mn-lt"/>
+                <a:ea typeface="+mn-ea"/>
+                <a:cs typeface="+mn-cs"/>
+              </a:defRPr>
+            </a:lvl8pPr>
+            <a:lvl9pPr marL="2286000" indent="-182880" algn="l" defTabSz="914400" rtl="0" eaLnBrk="1" latinLnBrk="0" hangingPunct="1">
+              <a:spcBef>
+                <a:spcPct val="20000"/>
+              </a:spcBef>
+              <a:buClr>
+                <a:schemeClr val="accent4"/>
+              </a:buClr>
+              <a:buFont typeface="Arial" pitchFamily="34" charset="0"/>
+              <a:buChar char="•"/>
+              <a:defRPr sz="1400" kern="1200">
+                <a:solidFill>
+                  <a:schemeClr val="tx1"/>
+                </a:solidFill>
+                <a:latin typeface="+mn-lt"/>
+                <a:ea typeface="+mn-ea"/>
+                <a:cs typeface="+mn-cs"/>
+              </a:defRPr>
+            </a:lvl9pPr>
+          </a:lstStyle>
+          <a:p>
+            <a:r>
+              <a:rPr lang="en-US" dirty="0" smtClean="0"/>
+              <a:t>This is the general form there are other </a:t>
+            </a:r>
+            <a:r>
+              <a:rPr lang="en-GB" dirty="0" smtClean="0"/>
+              <a:t>intricacies</a:t>
+            </a:r>
+            <a:endParaRPr lang="en-US" dirty="0" smtClean="0"/>
           </a:p>
         </p:txBody>
       </p:sp>
     </p:spTree>
     <p:extLst>
       <p:ext uri="{BB962C8B-B14F-4D97-AF65-F5344CB8AC3E}">
-        <p14:creationId xmlns:p14="http://schemas.microsoft.com/office/powerpoint/2010/main" val="2473051165"/>
+        <p14:creationId xmlns:p14="http://schemas.microsoft.com/office/powerpoint/2010/main" val="3748626934"/>
       </p:ext>
     </p:extLst>
   </p:cSld>
@@ -3430,7 +3841,7 @@
           <a:p>
             <a:r>
               <a:rPr lang="en-US" dirty="0" smtClean="0"/>
-              <a:t>Questions?</a:t>
+              <a:t>Future work	</a:t>
             </a:r>
             <a:endParaRPr lang="en-GB" dirty="0"/>
           </a:p>
@@ -3448,34 +3859,205 @@
         </p:nvSpPr>
         <p:spPr/>
         <p:txBody>
-          <a:bodyPr>
-            <a:normAutofit/>
-          </a:bodyPr>
-          <a:lstStyle/>
-          <a:p>
-            <a:pPr algn="ctr"/>
-            <a:endParaRPr lang="en-US" sz="4000" dirty="0" smtClean="0"/>
-          </a:p>
-          <a:p>
-            <a:pPr algn="ctr"/>
-            <a:endParaRPr lang="en-US" sz="4000" dirty="0"/>
-          </a:p>
-          <a:p>
-            <a:pPr marL="114300" indent="0" algn="ctr">
+          <a:bodyPr/>
+          <a:lstStyle/>
+          <a:p>
+            <a:r>
+              <a:rPr lang="en-US" dirty="0" smtClean="0"/>
+              <a:t>Display how many ants are at each city</a:t>
+            </a:r>
+          </a:p>
+          <a:p>
+            <a:pPr lvl="1"/>
+            <a:r>
+              <a:rPr lang="en-US" dirty="0" smtClean="0"/>
+              <a:t>Currently shows 1 ‘ant’ regardless</a:t>
+            </a:r>
+          </a:p>
+          <a:p>
+            <a:r>
+              <a:rPr lang="en-US" dirty="0" smtClean="0"/>
+              <a:t>Experiment with correct limits to add to text fields</a:t>
+            </a:r>
+            <a:endParaRPr lang="en-US" dirty="0"/>
+          </a:p>
+          <a:p>
+            <a:r>
+              <a:rPr lang="en-US" dirty="0" smtClean="0"/>
+              <a:t>Potentially add variations of the algorithm</a:t>
+            </a:r>
+          </a:p>
+          <a:p>
+            <a:pPr lvl="1"/>
+            <a:r>
+              <a:rPr lang="en-US" dirty="0" smtClean="0"/>
+              <a:t>Elitist ants, Min-Max system etc.</a:t>
+            </a:r>
+            <a:endParaRPr lang="en-US" dirty="0"/>
+          </a:p>
+          <a:p>
+            <a:r>
+              <a:rPr lang="en-US" dirty="0" smtClean="0"/>
+              <a:t>Test the application thoroughly</a:t>
+            </a:r>
+            <a:endParaRPr lang="en-US" dirty="0"/>
+          </a:p>
+          <a:p>
+            <a:r>
+              <a:rPr lang="en-US" dirty="0" smtClean="0"/>
+              <a:t>Potentially set up an nest-food style of problem</a:t>
+            </a:r>
+          </a:p>
+          <a:p>
+            <a:r>
+              <a:rPr lang="en-US" dirty="0" smtClean="0"/>
+              <a:t>Potentially extend the application to visualise BCO as well</a:t>
+            </a:r>
+          </a:p>
+          <a:p>
+            <a:pPr marL="411480" lvl="1" indent="0">
               <a:buNone/>
             </a:pPr>
-            <a:r>
-              <a:rPr lang="en-US" sz="4000" dirty="0" smtClean="0"/>
-              <a:t>Thank you for listening, if you have any questions I will gladly answer</a:t>
-            </a:r>
-            <a:endParaRPr lang="en-GB" sz="4000" dirty="0"/>
+            <a:endParaRPr lang="en-GB" dirty="0"/>
           </a:p>
         </p:txBody>
       </p:sp>
     </p:spTree>
     <p:extLst>
       <p:ext uri="{BB962C8B-B14F-4D97-AF65-F5344CB8AC3E}">
-        <p14:creationId xmlns:p14="http://schemas.microsoft.com/office/powerpoint/2010/main" val="1803473255"/>
+        <p14:creationId xmlns:p14="http://schemas.microsoft.com/office/powerpoint/2010/main" val="2473051165"/>
+      </p:ext>
+    </p:extLst>
+  </p:cSld>
+  <p:clrMapOvr>
+    <a:masterClrMapping/>
+  </p:clrMapOvr>
+</p:sld>
+</file>
+
+<file path=ppt/slides/slide12.xml><?xml version="1.0" encoding="utf-8"?>
+<p:sld xmlns:a="http://schemas.openxmlformats.org/drawingml/2006/main" xmlns:r="http://schemas.openxmlformats.org/officeDocument/2006/relationships" xmlns:p="http://schemas.openxmlformats.org/presentationml/2006/main">
+  <p:cSld>
+    <p:spTree>
+      <p:nvGrpSpPr>
+        <p:cNvPr id="1" name=""/>
+        <p:cNvGrpSpPr/>
+        <p:nvPr/>
+      </p:nvGrpSpPr>
+      <p:grpSpPr>
+        <a:xfrm>
+          <a:off x="0" y="0"/>
+          <a:ext cx="0" cy="0"/>
+          <a:chOff x="0" y="0"/>
+          <a:chExt cx="0" cy="0"/>
+        </a:xfrm>
+      </p:grpSpPr>
+      <p:sp>
+        <p:nvSpPr>
+          <p:cNvPr id="2" name="Title 1"/>
+          <p:cNvSpPr>
+            <a:spLocks noGrp="1"/>
+          </p:cNvSpPr>
+          <p:nvPr>
+            <p:ph type="title"/>
+          </p:nvPr>
+        </p:nvSpPr>
+        <p:spPr/>
+        <p:txBody>
+          <a:bodyPr/>
+          <a:lstStyle/>
+          <a:p>
+            <a:r>
+              <a:rPr lang="en-US" dirty="0" smtClean="0"/>
+              <a:t>Demonstration	</a:t>
+            </a:r>
+            <a:endParaRPr lang="en-GB" dirty="0"/>
+          </a:p>
+        </p:txBody>
+      </p:sp>
+      <p:sp>
+        <p:nvSpPr>
+          <p:cNvPr id="3" name="Content Placeholder 2"/>
+          <p:cNvSpPr>
+            <a:spLocks noGrp="1"/>
+          </p:cNvSpPr>
+          <p:nvPr>
+            <p:ph idx="1"/>
+          </p:nvPr>
+        </p:nvSpPr>
+        <p:spPr/>
+        <p:txBody>
+          <a:bodyPr/>
+          <a:lstStyle/>
+          <a:p>
+            <a:r>
+              <a:rPr lang="en-US" dirty="0" smtClean="0"/>
+              <a:t>Current features:</a:t>
+            </a:r>
+          </a:p>
+          <a:p>
+            <a:pPr lvl="1"/>
+            <a:r>
+              <a:rPr lang="en-US" dirty="0" smtClean="0"/>
+              <a:t>load configurations from a file</a:t>
+            </a:r>
+          </a:p>
+          <a:p>
+            <a:pPr lvl="1"/>
+            <a:r>
+              <a:rPr lang="en-US" dirty="0" smtClean="0"/>
+              <a:t>Save configurations to a file</a:t>
+            </a:r>
+          </a:p>
+          <a:p>
+            <a:pPr lvl="1"/>
+            <a:r>
+              <a:rPr lang="en-US" dirty="0" smtClean="0"/>
+              <a:t>Set the speed</a:t>
+            </a:r>
+          </a:p>
+          <a:p>
+            <a:pPr lvl="1"/>
+            <a:r>
+              <a:rPr lang="en-US" dirty="0" smtClean="0"/>
+              <a:t>Modify algorithm parameters</a:t>
+            </a:r>
+          </a:p>
+          <a:p>
+            <a:pPr lvl="1"/>
+            <a:r>
+              <a:rPr lang="en-US" dirty="0" smtClean="0"/>
+              <a:t>Error checking on all fields</a:t>
+            </a:r>
+          </a:p>
+          <a:p>
+            <a:pPr lvl="1"/>
+            <a:r>
+              <a:rPr lang="en-US" dirty="0" smtClean="0"/>
+              <a:t>Display the best route and distance</a:t>
+            </a:r>
+          </a:p>
+          <a:p>
+            <a:pPr lvl="1"/>
+            <a:r>
+              <a:rPr lang="en-US" dirty="0" smtClean="0"/>
+              <a:t>See the ants move</a:t>
+            </a:r>
+          </a:p>
+          <a:p>
+            <a:pPr lvl="1"/>
+            <a:r>
+              <a:rPr lang="en-US" dirty="0" smtClean="0"/>
+              <a:t>Visualise pheromone</a:t>
+            </a:r>
+            <a:endParaRPr lang="en-GB" dirty="0"/>
+          </a:p>
+        </p:txBody>
+      </p:sp>
+    </p:spTree>
+    <p:extLst>
+      <p:ext uri="{BB962C8B-B14F-4D97-AF65-F5344CB8AC3E}">
+        <p14:creationId xmlns:p14="http://schemas.microsoft.com/office/powerpoint/2010/main" val="3952263693"/>
       </p:ext>
     </p:extLst>
   </p:cSld>
@@ -3519,7 +4101,7 @@
           <a:p>
             <a:r>
               <a:rPr lang="en-US" dirty="0" smtClean="0"/>
-              <a:t>What is the Project?</a:t>
+              <a:t>Aims of the Project</a:t>
             </a:r>
             <a:endParaRPr lang="en-GB" dirty="0"/>
           </a:p>
@@ -3537,7 +4119,9 @@
         </p:nvSpPr>
         <p:spPr/>
         <p:txBody>
-          <a:bodyPr/>
+          <a:bodyPr>
+            <a:normAutofit lnSpcReduction="10000"/>
+          </a:bodyPr>
           <a:lstStyle/>
           <a:p>
             <a:r>
@@ -3554,7 +4138,7 @@
           <a:p>
             <a:r>
               <a:rPr lang="en-US" dirty="0" smtClean="0"/>
-              <a:t>To be used in an education environment</a:t>
+              <a:t>To be used in an educational environment</a:t>
             </a:r>
           </a:p>
           <a:p>
@@ -3580,22 +4164,49 @@
             <a:pPr lvl="1"/>
             <a:r>
               <a:rPr lang="en-US" dirty="0" smtClean="0"/>
-              <a:t>Number of cities/ants</a:t>
+              <a:t>Number of cities</a:t>
             </a:r>
           </a:p>
           <a:p>
             <a:pPr lvl="1"/>
             <a:r>
               <a:rPr lang="en-US" dirty="0" smtClean="0"/>
-              <a:t>Alpha/beta values</a:t>
+              <a:t>Number of ants</a:t>
             </a:r>
           </a:p>
           <a:p>
             <a:pPr lvl="1"/>
             <a:r>
               <a:rPr lang="en-US" dirty="0" smtClean="0"/>
-              <a:t>Etc.</a:t>
-            </a:r>
+              <a:t>Alpha value</a:t>
+            </a:r>
+          </a:p>
+          <a:p>
+            <a:pPr lvl="1"/>
+            <a:r>
+              <a:rPr lang="en-US" dirty="0" smtClean="0"/>
+              <a:t>Beta value</a:t>
+            </a:r>
+          </a:p>
+          <a:p>
+            <a:pPr lvl="1"/>
+            <a:r>
+              <a:rPr lang="en-US" dirty="0" smtClean="0"/>
+              <a:t>Decay rate</a:t>
+            </a:r>
+          </a:p>
+          <a:p>
+            <a:pPr lvl="1"/>
+            <a:r>
+              <a:rPr lang="en-US" dirty="0" err="1" smtClean="0"/>
+              <a:t>etc</a:t>
+            </a:r>
+            <a:endParaRPr lang="en-US" dirty="0" smtClean="0"/>
+          </a:p>
+          <a:p>
+            <a:pPr marL="411480" lvl="1" indent="0">
+              <a:buNone/>
+            </a:pPr>
             <a:endParaRPr lang="en-US" dirty="0"/>
           </a:p>
         </p:txBody>
@@ -3779,67 +4390,15 @@
           <a:chExt cx="0" cy="0"/>
         </a:xfrm>
       </p:grpSpPr>
-      <p:sp>
-        <p:nvSpPr>
-          <p:cNvPr id="2" name="Title 1"/>
-          <p:cNvSpPr>
-            <a:spLocks noGrp="1"/>
-          </p:cNvSpPr>
-          <p:nvPr>
-            <p:ph type="title"/>
-          </p:nvPr>
-        </p:nvSpPr>
-        <p:spPr/>
-        <p:txBody>
-          <a:bodyPr/>
-          <a:lstStyle/>
-          <a:p>
-            <a:r>
-              <a:rPr lang="en-US" dirty="0" smtClean="0"/>
-              <a:t>Probabilistic property</a:t>
-            </a:r>
-            <a:endParaRPr lang="en-GB" dirty="0"/>
-          </a:p>
-        </p:txBody>
-      </p:sp>
-      <p:sp>
-        <p:nvSpPr>
-          <p:cNvPr id="3" name="Content Placeholder 2"/>
-          <p:cNvSpPr>
-            <a:spLocks noGrp="1"/>
-          </p:cNvSpPr>
-          <p:nvPr>
-            <p:ph idx="1"/>
-          </p:nvPr>
-        </p:nvSpPr>
-        <p:spPr>
-          <a:xfrm>
-            <a:off x="457200" y="1600200"/>
-            <a:ext cx="7620000" cy="820688"/>
-          </a:xfrm>
-        </p:spPr>
-        <p:txBody>
-          <a:bodyPr/>
-          <a:lstStyle/>
-          <a:p>
-            <a:r>
-              <a:rPr lang="en-US" dirty="0" smtClean="0"/>
-              <a:t>An agents next location is calculated using the following probability:</a:t>
-            </a:r>
-            <a:endParaRPr lang="en-GB" dirty="0" smtClean="0"/>
-          </a:p>
-          <a:p>
-            <a:endParaRPr lang="en-US" dirty="0" smtClean="0"/>
-          </a:p>
-        </p:txBody>
-      </p:sp>
       <p:pic>
         <p:nvPicPr>
-          <p:cNvPr id="4" name="Picture 3"/>
+          <p:cNvPr id="4" name="Content Placeholder 3"/>
           <p:cNvPicPr>
-            <a:picLocks noChangeAspect="1"/>
+            <a:picLocks noGrp="1" noChangeAspect="1"/>
           </p:cNvPicPr>
-          <p:nvPr/>
+          <p:nvPr>
+            <p:ph idx="1"/>
+          </p:nvPr>
         </p:nvPicPr>
         <p:blipFill>
           <a:blip r:embed="rId2">
@@ -3855,262 +4414,48 @@
         </p:blipFill>
         <p:spPr>
           <a:xfrm>
-            <a:off x="2220257" y="2631436"/>
-            <a:ext cx="3066827" cy="1099828"/>
+            <a:off x="1259632" y="332656"/>
+            <a:ext cx="6014785" cy="5112568"/>
+          </a:xfrm>
+        </p:spPr>
+      </p:pic>
+      <p:sp>
+        <p:nvSpPr>
+          <p:cNvPr id="5" name="TextBox 4"/>
+          <p:cNvSpPr txBox="1"/>
+          <p:nvPr/>
+        </p:nvSpPr>
+        <p:spPr>
+          <a:xfrm>
+            <a:off x="611560" y="6093296"/>
+            <a:ext cx="6984776" cy="276999"/>
           </a:xfrm>
           <a:prstGeom prst="rect">
             <a:avLst/>
           </a:prstGeom>
+          <a:noFill/>
         </p:spPr>
-      </p:pic>
-      <p:sp>
-        <p:nvSpPr>
-          <p:cNvPr id="6" name="Content Placeholder 2"/>
-          <p:cNvSpPr txBox="1">
-            <a:spLocks/>
-          </p:cNvSpPr>
-          <p:nvPr/>
-        </p:nvSpPr>
-        <p:spPr>
-          <a:xfrm>
-            <a:off x="609600" y="3933056"/>
-            <a:ext cx="7620000" cy="2376264"/>
-          </a:xfrm>
-          <a:prstGeom prst="rect">
-            <a:avLst/>
-          </a:prstGeom>
-        </p:spPr>
-        <p:txBody>
-          <a:bodyPr vert="horz" lIns="91440" tIns="45720" rIns="91440" bIns="45720" rtlCol="0">
-            <a:normAutofit/>
+        <p:txBody>
+          <a:bodyPr wrap="square" rtlCol="0">
+            <a:spAutoFit/>
           </a:bodyPr>
-          <a:lstStyle>
-            <a:lvl1pPr marL="342900" indent="-228600" algn="l" defTabSz="914400" rtl="0" eaLnBrk="1" latinLnBrk="0" hangingPunct="1">
-              <a:spcBef>
-                <a:spcPct val="20000"/>
-              </a:spcBef>
-              <a:buClr>
-                <a:schemeClr val="accent1"/>
-              </a:buClr>
-              <a:buFont typeface="Arial" pitchFamily="34" charset="0"/>
-              <a:buChar char="•"/>
-              <a:defRPr sz="2200" kern="1200">
-                <a:solidFill>
-                  <a:schemeClr val="tx1"/>
-                </a:solidFill>
-                <a:latin typeface="+mn-lt"/>
-                <a:ea typeface="+mn-ea"/>
-                <a:cs typeface="+mn-cs"/>
-              </a:defRPr>
-            </a:lvl1pPr>
-            <a:lvl2pPr marL="640080" indent="-228600" algn="l" defTabSz="914400" rtl="0" eaLnBrk="1" latinLnBrk="0" hangingPunct="1">
-              <a:spcBef>
-                <a:spcPct val="20000"/>
-              </a:spcBef>
-              <a:buClr>
-                <a:schemeClr val="accent2"/>
-              </a:buClr>
-              <a:buFont typeface="Arial" pitchFamily="34" charset="0"/>
-              <a:buChar char="•"/>
-              <a:defRPr sz="2000" kern="1200">
-                <a:solidFill>
-                  <a:schemeClr val="tx1"/>
-                </a:solidFill>
-                <a:latin typeface="+mn-lt"/>
-                <a:ea typeface="+mn-ea"/>
-                <a:cs typeface="+mn-cs"/>
-              </a:defRPr>
-            </a:lvl2pPr>
-            <a:lvl3pPr marL="1005840" indent="-228600" algn="l" defTabSz="914400" rtl="0" eaLnBrk="1" latinLnBrk="0" hangingPunct="1">
-              <a:spcBef>
-                <a:spcPct val="20000"/>
-              </a:spcBef>
-              <a:buClr>
-                <a:schemeClr val="accent3"/>
-              </a:buClr>
-              <a:buFont typeface="Arial" pitchFamily="34" charset="0"/>
-              <a:buChar char="•"/>
-              <a:defRPr sz="1800" kern="1200">
-                <a:solidFill>
-                  <a:schemeClr val="tx1"/>
-                </a:solidFill>
-                <a:latin typeface="+mn-lt"/>
-                <a:ea typeface="+mn-ea"/>
-                <a:cs typeface="+mn-cs"/>
-              </a:defRPr>
-            </a:lvl3pPr>
-            <a:lvl4pPr marL="1280160" indent="-228600" algn="l" defTabSz="914400" rtl="0" eaLnBrk="1" latinLnBrk="0" hangingPunct="1">
-              <a:spcBef>
-                <a:spcPct val="20000"/>
-              </a:spcBef>
-              <a:buClr>
-                <a:schemeClr val="accent4"/>
-              </a:buClr>
-              <a:buFont typeface="Arial" pitchFamily="34" charset="0"/>
-              <a:buChar char="•"/>
-              <a:defRPr sz="1600" kern="1200">
-                <a:solidFill>
-                  <a:schemeClr val="tx1"/>
-                </a:solidFill>
-                <a:latin typeface="+mn-lt"/>
-                <a:ea typeface="+mn-ea"/>
-                <a:cs typeface="+mn-cs"/>
-              </a:defRPr>
-            </a:lvl4pPr>
-            <a:lvl5pPr marL="1554480" indent="-228600" algn="l" defTabSz="914400" rtl="0" eaLnBrk="1" latinLnBrk="0" hangingPunct="1">
-              <a:spcBef>
-                <a:spcPct val="20000"/>
-              </a:spcBef>
-              <a:buClr>
-                <a:schemeClr val="accent5"/>
-              </a:buClr>
-              <a:buFont typeface="Arial" pitchFamily="34" charset="0"/>
-              <a:buChar char="•"/>
-              <a:defRPr sz="1400" kern="1200" baseline="0">
-                <a:solidFill>
-                  <a:schemeClr val="tx1"/>
-                </a:solidFill>
-                <a:latin typeface="+mn-lt"/>
-                <a:ea typeface="+mn-ea"/>
-                <a:cs typeface="+mn-cs"/>
-              </a:defRPr>
-            </a:lvl5pPr>
-            <a:lvl6pPr marL="1737360" indent="-182880" algn="l" defTabSz="914400" rtl="0" eaLnBrk="1" latinLnBrk="0" hangingPunct="1">
-              <a:spcBef>
-                <a:spcPct val="20000"/>
-              </a:spcBef>
-              <a:buClr>
-                <a:schemeClr val="accent1"/>
-              </a:buClr>
-              <a:buFont typeface="Arial" pitchFamily="34" charset="0"/>
-              <a:buChar char="•"/>
-              <a:defRPr sz="1400" kern="1200" baseline="0">
-                <a:solidFill>
-                  <a:schemeClr val="tx1"/>
-                </a:solidFill>
-                <a:latin typeface="+mn-lt"/>
-                <a:ea typeface="+mn-ea"/>
-                <a:cs typeface="+mn-cs"/>
-              </a:defRPr>
-            </a:lvl6pPr>
-            <a:lvl7pPr marL="1920240" indent="-182880" algn="l" defTabSz="914400" rtl="0" eaLnBrk="1" latinLnBrk="0" hangingPunct="1">
-              <a:spcBef>
-                <a:spcPct val="20000"/>
-              </a:spcBef>
-              <a:buClr>
-                <a:schemeClr val="accent2"/>
-              </a:buClr>
-              <a:buFont typeface="Arial" pitchFamily="34" charset="0"/>
-              <a:buChar char="•"/>
-              <a:defRPr sz="1400" kern="1200">
-                <a:solidFill>
-                  <a:schemeClr val="tx1"/>
-                </a:solidFill>
-                <a:latin typeface="+mn-lt"/>
-                <a:ea typeface="+mn-ea"/>
-                <a:cs typeface="+mn-cs"/>
-              </a:defRPr>
-            </a:lvl7pPr>
-            <a:lvl8pPr marL="2103120" indent="-182880" algn="l" defTabSz="914400" rtl="0" eaLnBrk="1" latinLnBrk="0" hangingPunct="1">
-              <a:spcBef>
-                <a:spcPct val="20000"/>
-              </a:spcBef>
-              <a:buClr>
-                <a:schemeClr val="accent3"/>
-              </a:buClr>
-              <a:buFont typeface="Arial" pitchFamily="34" charset="0"/>
-              <a:buChar char="•"/>
-              <a:defRPr sz="1400" kern="1200">
-                <a:solidFill>
-                  <a:schemeClr val="tx1"/>
-                </a:solidFill>
-                <a:latin typeface="+mn-lt"/>
-                <a:ea typeface="+mn-ea"/>
-                <a:cs typeface="+mn-cs"/>
-              </a:defRPr>
-            </a:lvl8pPr>
-            <a:lvl9pPr marL="2286000" indent="-182880" algn="l" defTabSz="914400" rtl="0" eaLnBrk="1" latinLnBrk="0" hangingPunct="1">
-              <a:spcBef>
-                <a:spcPct val="20000"/>
-              </a:spcBef>
-              <a:buClr>
-                <a:schemeClr val="accent4"/>
-              </a:buClr>
-              <a:buFont typeface="Arial" pitchFamily="34" charset="0"/>
-              <a:buChar char="•"/>
-              <a:defRPr sz="1400" kern="1200">
-                <a:solidFill>
-                  <a:schemeClr val="tx1"/>
-                </a:solidFill>
-                <a:latin typeface="+mn-lt"/>
-                <a:ea typeface="+mn-ea"/>
-                <a:cs typeface="+mn-cs"/>
-              </a:defRPr>
-            </a:lvl9pPr>
-          </a:lstStyle>
-          <a:p>
-            <a:r>
-              <a:rPr lang="el-GR" dirty="0" smtClean="0"/>
-              <a:t>α</a:t>
-            </a:r>
-            <a:endParaRPr lang="en-US" dirty="0" smtClean="0"/>
-          </a:p>
-          <a:p>
-            <a:pPr lvl="1"/>
-            <a:r>
-              <a:rPr lang="en-US" dirty="0" smtClean="0"/>
-              <a:t>Meta heuristic value relating to the favoring of pheromone</a:t>
-            </a:r>
-          </a:p>
-          <a:p>
-            <a:r>
-              <a:rPr lang="el-GR" dirty="0" smtClean="0"/>
-              <a:t>β</a:t>
-            </a:r>
-            <a:endParaRPr lang="en-US" dirty="0" smtClean="0"/>
-          </a:p>
-          <a:p>
-            <a:pPr lvl="1"/>
-            <a:r>
-              <a:rPr lang="en-US" dirty="0" smtClean="0"/>
-              <a:t>Meta </a:t>
-            </a:r>
-            <a:r>
-              <a:rPr lang="en-US" dirty="0"/>
-              <a:t>heuristic value relating to the favoring of </a:t>
-            </a:r>
-            <a:r>
-              <a:rPr lang="en-US" dirty="0" smtClean="0"/>
-              <a:t>pheromone</a:t>
-            </a:r>
-          </a:p>
-          <a:p>
-            <a:r>
-              <a:rPr lang="en-US" dirty="0" smtClean="0"/>
-              <a:t>η</a:t>
-            </a:r>
-          </a:p>
-          <a:p>
-            <a:pPr lvl="1"/>
-            <a:r>
-              <a:rPr lang="en-US" dirty="0" smtClean="0"/>
-              <a:t>1/distance from current to node </a:t>
-            </a:r>
-            <a:r>
-              <a:rPr lang="en-US" dirty="0" err="1" smtClean="0"/>
-              <a:t>xy</a:t>
-            </a:r>
-            <a:endParaRPr lang="en-GB" dirty="0" smtClean="0"/>
-          </a:p>
-          <a:p>
-            <a:endParaRPr lang="en-US" dirty="0" smtClean="0"/>
+          <a:lstStyle/>
+          <a:p>
+            <a:r>
+              <a:rPr lang="en-GB" sz="1200" dirty="0" smtClean="0"/>
+              <a:t>Image: http</a:t>
+            </a:r>
+            <a:r>
+              <a:rPr lang="en-GB" sz="1200" dirty="0"/>
+              <a:t>://s158.photobucket.com/user/OnlyObvious/media/ants/Aco_branches_svg_800_Notes.jpg.html</a:t>
+            </a:r>
           </a:p>
         </p:txBody>
       </p:sp>
     </p:spTree>
     <p:extLst>
       <p:ext uri="{BB962C8B-B14F-4D97-AF65-F5344CB8AC3E}">
-        <p14:creationId xmlns:p14="http://schemas.microsoft.com/office/powerpoint/2010/main" val="1606708163"/>
+        <p14:creationId xmlns:p14="http://schemas.microsoft.com/office/powerpoint/2010/main" val="1967816789"/>
       </p:ext>
     </p:extLst>
   </p:cSld>
@@ -4137,70 +4482,15 @@
           <a:chExt cx="0" cy="0"/>
         </a:xfrm>
       </p:grpSpPr>
-      <p:sp>
-        <p:nvSpPr>
-          <p:cNvPr id="2" name="Title 1"/>
-          <p:cNvSpPr>
-            <a:spLocks noGrp="1"/>
-          </p:cNvSpPr>
-          <p:nvPr>
-            <p:ph type="title"/>
-          </p:nvPr>
-        </p:nvSpPr>
-        <p:spPr/>
-        <p:txBody>
-          <a:bodyPr/>
-          <a:lstStyle/>
-          <a:p>
-            <a:r>
-              <a:rPr lang="en-US" dirty="0" smtClean="0"/>
-              <a:t>Pheromone deposit</a:t>
-            </a:r>
-            <a:endParaRPr lang="en-GB" dirty="0"/>
-          </a:p>
-        </p:txBody>
-      </p:sp>
-      <p:sp>
-        <p:nvSpPr>
-          <p:cNvPr id="3" name="Content Placeholder 2"/>
-          <p:cNvSpPr>
-            <a:spLocks noGrp="1"/>
-          </p:cNvSpPr>
-          <p:nvPr>
-            <p:ph idx="1"/>
-          </p:nvPr>
-        </p:nvSpPr>
-        <p:spPr>
-          <a:xfrm>
-            <a:off x="457200" y="1600200"/>
-            <a:ext cx="7620000" cy="1252736"/>
-          </a:xfrm>
-        </p:spPr>
-        <p:txBody>
-          <a:bodyPr/>
-          <a:lstStyle/>
-          <a:p>
-            <a:r>
-              <a:rPr lang="en-US" dirty="0" smtClean="0"/>
-              <a:t>The pheromone trails are updated as the agents traverse the graph</a:t>
-            </a:r>
-          </a:p>
-          <a:p>
-            <a:r>
-              <a:rPr lang="en-US" dirty="0" smtClean="0"/>
-              <a:t>The equation to model this behavior is:</a:t>
-            </a:r>
-            <a:endParaRPr lang="en-GB" dirty="0"/>
-          </a:p>
-        </p:txBody>
-      </p:sp>
       <p:pic>
         <p:nvPicPr>
-          <p:cNvPr id="4" name="Picture 3"/>
+          <p:cNvPr id="4" name="Content Placeholder 3"/>
           <p:cNvPicPr>
-            <a:picLocks noChangeAspect="1"/>
+            <a:picLocks noGrp="1" noChangeAspect="1"/>
           </p:cNvPicPr>
-          <p:nvPr/>
+          <p:nvPr>
+            <p:ph idx="1"/>
+          </p:nvPr>
         </p:nvPicPr>
         <p:blipFill>
           <a:blip r:embed="rId2">
@@ -4216,258 +4506,44 @@
         </p:blipFill>
         <p:spPr>
           <a:xfrm>
-            <a:off x="1331640" y="3861048"/>
-            <a:ext cx="5347865" cy="574353"/>
+            <a:off x="251520" y="1196752"/>
+            <a:ext cx="7830277" cy="2936354"/>
+          </a:xfrm>
+        </p:spPr>
+      </p:pic>
+      <p:sp>
+        <p:nvSpPr>
+          <p:cNvPr id="5" name="TextBox 4"/>
+          <p:cNvSpPr txBox="1"/>
+          <p:nvPr/>
+        </p:nvSpPr>
+        <p:spPr>
+          <a:xfrm>
+            <a:off x="539552" y="6093296"/>
+            <a:ext cx="7056784" cy="276999"/>
           </a:xfrm>
           <a:prstGeom prst="rect">
             <a:avLst/>
           </a:prstGeom>
+          <a:noFill/>
         </p:spPr>
-      </p:pic>
-      <p:pic>
-        <p:nvPicPr>
-          <p:cNvPr id="5" name="Picture 4"/>
-          <p:cNvPicPr>
-            <a:picLocks noChangeAspect="1"/>
-          </p:cNvPicPr>
-          <p:nvPr/>
-        </p:nvPicPr>
-        <p:blipFill>
-          <a:blip r:embed="rId3">
-            <a:extLst>
-              <a:ext uri="{28A0092B-C50C-407E-A947-70E740481C1C}">
-                <a14:useLocalDpi xmlns:a14="http://schemas.microsoft.com/office/drawing/2010/main" val="0"/>
-              </a:ext>
-            </a:extLst>
-          </a:blip>
-          <a:stretch>
-            <a:fillRect/>
-          </a:stretch>
-        </p:blipFill>
-        <p:spPr>
-          <a:xfrm>
-            <a:off x="2339752" y="3068960"/>
-            <a:ext cx="3684818" cy="483865"/>
-          </a:xfrm>
-          <a:prstGeom prst="rect">
-            <a:avLst/>
-          </a:prstGeom>
-        </p:spPr>
-      </p:pic>
-      <p:sp>
-        <p:nvSpPr>
-          <p:cNvPr id="6" name="Content Placeholder 2"/>
-          <p:cNvSpPr txBox="1">
-            <a:spLocks/>
-          </p:cNvSpPr>
-          <p:nvPr/>
-        </p:nvSpPr>
-        <p:spPr>
-          <a:xfrm>
-            <a:off x="609600" y="4797152"/>
-            <a:ext cx="7620000" cy="1252736"/>
-          </a:xfrm>
-          <a:prstGeom prst="rect">
-            <a:avLst/>
-          </a:prstGeom>
-        </p:spPr>
-        <p:txBody>
-          <a:bodyPr vert="horz" lIns="91440" tIns="45720" rIns="91440" bIns="45720" rtlCol="0">
-            <a:normAutofit/>
+        <p:txBody>
+          <a:bodyPr wrap="square" rtlCol="0">
+            <a:spAutoFit/>
           </a:bodyPr>
-          <a:lstStyle>
-            <a:lvl1pPr marL="342900" indent="-228600" algn="l" defTabSz="914400" rtl="0" eaLnBrk="1" latinLnBrk="0" hangingPunct="1">
-              <a:spcBef>
-                <a:spcPct val="20000"/>
-              </a:spcBef>
-              <a:buClr>
-                <a:schemeClr val="accent1"/>
-              </a:buClr>
-              <a:buFont typeface="Arial" pitchFamily="34" charset="0"/>
-              <a:buChar char="•"/>
-              <a:defRPr sz="2200" kern="1200">
-                <a:solidFill>
-                  <a:schemeClr val="tx1"/>
-                </a:solidFill>
-                <a:latin typeface="+mn-lt"/>
-                <a:ea typeface="+mn-ea"/>
-                <a:cs typeface="+mn-cs"/>
-              </a:defRPr>
-            </a:lvl1pPr>
-            <a:lvl2pPr marL="640080" indent="-228600" algn="l" defTabSz="914400" rtl="0" eaLnBrk="1" latinLnBrk="0" hangingPunct="1">
-              <a:spcBef>
-                <a:spcPct val="20000"/>
-              </a:spcBef>
-              <a:buClr>
-                <a:schemeClr val="accent2"/>
-              </a:buClr>
-              <a:buFont typeface="Arial" pitchFamily="34" charset="0"/>
-              <a:buChar char="•"/>
-              <a:defRPr sz="2000" kern="1200">
-                <a:solidFill>
-                  <a:schemeClr val="tx1"/>
-                </a:solidFill>
-                <a:latin typeface="+mn-lt"/>
-                <a:ea typeface="+mn-ea"/>
-                <a:cs typeface="+mn-cs"/>
-              </a:defRPr>
-            </a:lvl2pPr>
-            <a:lvl3pPr marL="1005840" indent="-228600" algn="l" defTabSz="914400" rtl="0" eaLnBrk="1" latinLnBrk="0" hangingPunct="1">
-              <a:spcBef>
-                <a:spcPct val="20000"/>
-              </a:spcBef>
-              <a:buClr>
-                <a:schemeClr val="accent3"/>
-              </a:buClr>
-              <a:buFont typeface="Arial" pitchFamily="34" charset="0"/>
-              <a:buChar char="•"/>
-              <a:defRPr sz="1800" kern="1200">
-                <a:solidFill>
-                  <a:schemeClr val="tx1"/>
-                </a:solidFill>
-                <a:latin typeface="+mn-lt"/>
-                <a:ea typeface="+mn-ea"/>
-                <a:cs typeface="+mn-cs"/>
-              </a:defRPr>
-            </a:lvl3pPr>
-            <a:lvl4pPr marL="1280160" indent="-228600" algn="l" defTabSz="914400" rtl="0" eaLnBrk="1" latinLnBrk="0" hangingPunct="1">
-              <a:spcBef>
-                <a:spcPct val="20000"/>
-              </a:spcBef>
-              <a:buClr>
-                <a:schemeClr val="accent4"/>
-              </a:buClr>
-              <a:buFont typeface="Arial" pitchFamily="34" charset="0"/>
-              <a:buChar char="•"/>
-              <a:defRPr sz="1600" kern="1200">
-                <a:solidFill>
-                  <a:schemeClr val="tx1"/>
-                </a:solidFill>
-                <a:latin typeface="+mn-lt"/>
-                <a:ea typeface="+mn-ea"/>
-                <a:cs typeface="+mn-cs"/>
-              </a:defRPr>
-            </a:lvl4pPr>
-            <a:lvl5pPr marL="1554480" indent="-228600" algn="l" defTabSz="914400" rtl="0" eaLnBrk="1" latinLnBrk="0" hangingPunct="1">
-              <a:spcBef>
-                <a:spcPct val="20000"/>
-              </a:spcBef>
-              <a:buClr>
-                <a:schemeClr val="accent5"/>
-              </a:buClr>
-              <a:buFont typeface="Arial" pitchFamily="34" charset="0"/>
-              <a:buChar char="•"/>
-              <a:defRPr sz="1400" kern="1200" baseline="0">
-                <a:solidFill>
-                  <a:schemeClr val="tx1"/>
-                </a:solidFill>
-                <a:latin typeface="+mn-lt"/>
-                <a:ea typeface="+mn-ea"/>
-                <a:cs typeface="+mn-cs"/>
-              </a:defRPr>
-            </a:lvl5pPr>
-            <a:lvl6pPr marL="1737360" indent="-182880" algn="l" defTabSz="914400" rtl="0" eaLnBrk="1" latinLnBrk="0" hangingPunct="1">
-              <a:spcBef>
-                <a:spcPct val="20000"/>
-              </a:spcBef>
-              <a:buClr>
-                <a:schemeClr val="accent1"/>
-              </a:buClr>
-              <a:buFont typeface="Arial" pitchFamily="34" charset="0"/>
-              <a:buChar char="•"/>
-              <a:defRPr sz="1400" kern="1200" baseline="0">
-                <a:solidFill>
-                  <a:schemeClr val="tx1"/>
-                </a:solidFill>
-                <a:latin typeface="+mn-lt"/>
-                <a:ea typeface="+mn-ea"/>
-                <a:cs typeface="+mn-cs"/>
-              </a:defRPr>
-            </a:lvl6pPr>
-            <a:lvl7pPr marL="1920240" indent="-182880" algn="l" defTabSz="914400" rtl="0" eaLnBrk="1" latinLnBrk="0" hangingPunct="1">
-              <a:spcBef>
-                <a:spcPct val="20000"/>
-              </a:spcBef>
-              <a:buClr>
-                <a:schemeClr val="accent2"/>
-              </a:buClr>
-              <a:buFont typeface="Arial" pitchFamily="34" charset="0"/>
-              <a:buChar char="•"/>
-              <a:defRPr sz="1400" kern="1200">
-                <a:solidFill>
-                  <a:schemeClr val="tx1"/>
-                </a:solidFill>
-                <a:latin typeface="+mn-lt"/>
-                <a:ea typeface="+mn-ea"/>
-                <a:cs typeface="+mn-cs"/>
-              </a:defRPr>
-            </a:lvl7pPr>
-            <a:lvl8pPr marL="2103120" indent="-182880" algn="l" defTabSz="914400" rtl="0" eaLnBrk="1" latinLnBrk="0" hangingPunct="1">
-              <a:spcBef>
-                <a:spcPct val="20000"/>
-              </a:spcBef>
-              <a:buClr>
-                <a:schemeClr val="accent3"/>
-              </a:buClr>
-              <a:buFont typeface="Arial" pitchFamily="34" charset="0"/>
-              <a:buChar char="•"/>
-              <a:defRPr sz="1400" kern="1200">
-                <a:solidFill>
-                  <a:schemeClr val="tx1"/>
-                </a:solidFill>
-                <a:latin typeface="+mn-lt"/>
-                <a:ea typeface="+mn-ea"/>
-                <a:cs typeface="+mn-cs"/>
-              </a:defRPr>
-            </a:lvl8pPr>
-            <a:lvl9pPr marL="2286000" indent="-182880" algn="l" defTabSz="914400" rtl="0" eaLnBrk="1" latinLnBrk="0" hangingPunct="1">
-              <a:spcBef>
-                <a:spcPct val="20000"/>
-              </a:spcBef>
-              <a:buClr>
-                <a:schemeClr val="accent4"/>
-              </a:buClr>
-              <a:buFont typeface="Arial" pitchFamily="34" charset="0"/>
-              <a:buChar char="•"/>
-              <a:defRPr sz="1400" kern="1200">
-                <a:solidFill>
-                  <a:schemeClr val="tx1"/>
-                </a:solidFill>
-                <a:latin typeface="+mn-lt"/>
-                <a:ea typeface="+mn-ea"/>
-                <a:cs typeface="+mn-cs"/>
-              </a:defRPr>
-            </a:lvl9pPr>
-          </a:lstStyle>
-          <a:p>
-            <a:r>
-              <a:rPr lang="en-US" dirty="0" smtClean="0"/>
-              <a:t>This correctly factors in decay and allows for any ant moving through node </a:t>
-            </a:r>
-            <a:r>
-              <a:rPr lang="en-US" dirty="0" err="1" smtClean="0"/>
-              <a:t>xy</a:t>
-            </a:r>
-            <a:r>
-              <a:rPr lang="en-US" dirty="0" smtClean="0"/>
-              <a:t> to add to the pheromone concentration at node </a:t>
-            </a:r>
-            <a:r>
-              <a:rPr lang="en-US" dirty="0" err="1" smtClean="0"/>
-              <a:t>xy</a:t>
-            </a:r>
-            <a:r>
-              <a:rPr lang="en-US" dirty="0" smtClean="0"/>
-              <a:t> </a:t>
-            </a:r>
-            <a:endParaRPr lang="en-GB" dirty="0"/>
+          <a:lstStyle/>
+          <a:p>
+            <a:r>
+              <a:rPr lang="en-GB" sz="1200" dirty="0"/>
+              <a:t>Image: http://upload.wikimedia.org/wikipedia/commons/thumb/2/2a/Aco_TSP.svg/1280px-Aco_TSP.svg.png</a:t>
+            </a:r>
           </a:p>
         </p:txBody>
       </p:sp>
     </p:spTree>
     <p:extLst>
       <p:ext uri="{BB962C8B-B14F-4D97-AF65-F5344CB8AC3E}">
-        <p14:creationId xmlns:p14="http://schemas.microsoft.com/office/powerpoint/2010/main" val="841121288"/>
+        <p14:creationId xmlns:p14="http://schemas.microsoft.com/office/powerpoint/2010/main" val="781109128"/>
       </p:ext>
     </p:extLst>
   </p:cSld>
@@ -4511,7 +4587,7 @@
           <a:p>
             <a:r>
               <a:rPr lang="en-US" dirty="0" smtClean="0"/>
-              <a:t>Technical issues</a:t>
+              <a:t>Probabilistic property</a:t>
             </a:r>
             <a:endParaRPr lang="en-GB" dirty="0"/>
           </a:p>
@@ -4527,94 +4603,295 @@
             <p:ph idx="1"/>
           </p:nvPr>
         </p:nvSpPr>
-        <p:spPr/>
-        <p:txBody>
-          <a:bodyPr/>
-          <a:lstStyle/>
-          <a:p>
-            <a:r>
-              <a:rPr lang="en-US" dirty="0" smtClean="0"/>
-              <a:t>Implemented in Java and its Swing packages</a:t>
-            </a:r>
-          </a:p>
-          <a:p>
-            <a:pPr lvl="1"/>
-            <a:r>
-              <a:rPr lang="en-US" dirty="0" smtClean="0"/>
-              <a:t>Cross-platform</a:t>
-            </a:r>
-          </a:p>
-          <a:p>
-            <a:pPr lvl="1"/>
-            <a:r>
-              <a:rPr lang="en-US" dirty="0" smtClean="0"/>
-              <a:t>JUnit tests</a:t>
-            </a:r>
-          </a:p>
-          <a:p>
-            <a:pPr lvl="1"/>
-            <a:endParaRPr lang="en-US" dirty="0"/>
-          </a:p>
-          <a:p>
-            <a:r>
-              <a:rPr lang="en-US" dirty="0" smtClean="0"/>
-              <a:t>Visualising the algorithm is difficult</a:t>
-            </a:r>
-            <a:endParaRPr lang="en-US" dirty="0"/>
-          </a:p>
-          <a:p>
-            <a:pPr lvl="1"/>
-            <a:r>
-              <a:rPr lang="en-US" dirty="0" smtClean="0"/>
-              <a:t>Easy to implement, difficult to visualise</a:t>
-            </a:r>
-            <a:endParaRPr lang="en-US" dirty="0"/>
-          </a:p>
-          <a:p>
-            <a:pPr lvl="2"/>
-            <a:r>
-              <a:rPr lang="en-US" dirty="0" smtClean="0"/>
-              <a:t>Showing pheromone levels to the user</a:t>
-            </a:r>
-            <a:endParaRPr lang="en-US" dirty="0"/>
-          </a:p>
-          <a:p>
-            <a:pPr lvl="2"/>
-            <a:r>
-              <a:rPr lang="en-US" dirty="0" smtClean="0"/>
-              <a:t>Showing the agents moving</a:t>
-            </a:r>
-          </a:p>
-          <a:p>
-            <a:pPr lvl="2"/>
-            <a:r>
-              <a:rPr lang="en-US" dirty="0" smtClean="0"/>
-              <a:t>Show the best route</a:t>
-            </a:r>
-          </a:p>
-          <a:p>
-            <a:pPr lvl="2"/>
-            <a:endParaRPr lang="en-US" dirty="0"/>
-          </a:p>
-          <a:p>
-            <a:r>
-              <a:rPr lang="en-US" dirty="0" smtClean="0"/>
-              <a:t>Do all this in a reasonable time</a:t>
-            </a:r>
-            <a:endParaRPr lang="en-US" dirty="0"/>
-          </a:p>
-          <a:p>
-            <a:pPr marL="411480" lvl="1" indent="0">
-              <a:buNone/>
-            </a:pPr>
+        <p:spPr>
+          <a:xfrm>
+            <a:off x="457200" y="1600200"/>
+            <a:ext cx="7620000" cy="820688"/>
+          </a:xfrm>
+        </p:spPr>
+        <p:txBody>
+          <a:bodyPr/>
+          <a:lstStyle/>
+          <a:p>
+            <a:r>
+              <a:rPr lang="en-US" dirty="0" smtClean="0"/>
+              <a:t>An agents next location is calculated using the following probability:</a:t>
+            </a:r>
+            <a:endParaRPr lang="en-GB" dirty="0" smtClean="0"/>
+          </a:p>
+          <a:p>
             <a:endParaRPr lang="en-US" dirty="0" smtClean="0"/>
           </a:p>
         </p:txBody>
       </p:sp>
+      <p:sp>
+        <p:nvSpPr>
+          <p:cNvPr id="6" name="Content Placeholder 2"/>
+          <p:cNvSpPr txBox="1">
+            <a:spLocks/>
+          </p:cNvSpPr>
+          <p:nvPr/>
+        </p:nvSpPr>
+        <p:spPr>
+          <a:xfrm>
+            <a:off x="609600" y="3933056"/>
+            <a:ext cx="7620000" cy="2376264"/>
+          </a:xfrm>
+          <a:prstGeom prst="rect">
+            <a:avLst/>
+          </a:prstGeom>
+        </p:spPr>
+        <p:txBody>
+          <a:bodyPr vert="horz" lIns="91440" tIns="45720" rIns="91440" bIns="45720" rtlCol="0">
+            <a:normAutofit/>
+          </a:bodyPr>
+          <a:lstStyle>
+            <a:lvl1pPr marL="342900" indent="-228600" algn="l" defTabSz="914400" rtl="0" eaLnBrk="1" latinLnBrk="0" hangingPunct="1">
+              <a:spcBef>
+                <a:spcPct val="20000"/>
+              </a:spcBef>
+              <a:buClr>
+                <a:schemeClr val="accent1"/>
+              </a:buClr>
+              <a:buFont typeface="Arial" pitchFamily="34" charset="0"/>
+              <a:buChar char="•"/>
+              <a:defRPr sz="2200" kern="1200">
+                <a:solidFill>
+                  <a:schemeClr val="tx1"/>
+                </a:solidFill>
+                <a:latin typeface="+mn-lt"/>
+                <a:ea typeface="+mn-ea"/>
+                <a:cs typeface="+mn-cs"/>
+              </a:defRPr>
+            </a:lvl1pPr>
+            <a:lvl2pPr marL="640080" indent="-228600" algn="l" defTabSz="914400" rtl="0" eaLnBrk="1" latinLnBrk="0" hangingPunct="1">
+              <a:spcBef>
+                <a:spcPct val="20000"/>
+              </a:spcBef>
+              <a:buClr>
+                <a:schemeClr val="accent2"/>
+              </a:buClr>
+              <a:buFont typeface="Arial" pitchFamily="34" charset="0"/>
+              <a:buChar char="•"/>
+              <a:defRPr sz="2000" kern="1200">
+                <a:solidFill>
+                  <a:schemeClr val="tx1"/>
+                </a:solidFill>
+                <a:latin typeface="+mn-lt"/>
+                <a:ea typeface="+mn-ea"/>
+                <a:cs typeface="+mn-cs"/>
+              </a:defRPr>
+            </a:lvl2pPr>
+            <a:lvl3pPr marL="1005840" indent="-228600" algn="l" defTabSz="914400" rtl="0" eaLnBrk="1" latinLnBrk="0" hangingPunct="1">
+              <a:spcBef>
+                <a:spcPct val="20000"/>
+              </a:spcBef>
+              <a:buClr>
+                <a:schemeClr val="accent3"/>
+              </a:buClr>
+              <a:buFont typeface="Arial" pitchFamily="34" charset="0"/>
+              <a:buChar char="•"/>
+              <a:defRPr sz="1800" kern="1200">
+                <a:solidFill>
+                  <a:schemeClr val="tx1"/>
+                </a:solidFill>
+                <a:latin typeface="+mn-lt"/>
+                <a:ea typeface="+mn-ea"/>
+                <a:cs typeface="+mn-cs"/>
+              </a:defRPr>
+            </a:lvl3pPr>
+            <a:lvl4pPr marL="1280160" indent="-228600" algn="l" defTabSz="914400" rtl="0" eaLnBrk="1" latinLnBrk="0" hangingPunct="1">
+              <a:spcBef>
+                <a:spcPct val="20000"/>
+              </a:spcBef>
+              <a:buClr>
+                <a:schemeClr val="accent4"/>
+              </a:buClr>
+              <a:buFont typeface="Arial" pitchFamily="34" charset="0"/>
+              <a:buChar char="•"/>
+              <a:defRPr sz="1600" kern="1200">
+                <a:solidFill>
+                  <a:schemeClr val="tx1"/>
+                </a:solidFill>
+                <a:latin typeface="+mn-lt"/>
+                <a:ea typeface="+mn-ea"/>
+                <a:cs typeface="+mn-cs"/>
+              </a:defRPr>
+            </a:lvl4pPr>
+            <a:lvl5pPr marL="1554480" indent="-228600" algn="l" defTabSz="914400" rtl="0" eaLnBrk="1" latinLnBrk="0" hangingPunct="1">
+              <a:spcBef>
+                <a:spcPct val="20000"/>
+              </a:spcBef>
+              <a:buClr>
+                <a:schemeClr val="accent5"/>
+              </a:buClr>
+              <a:buFont typeface="Arial" pitchFamily="34" charset="0"/>
+              <a:buChar char="•"/>
+              <a:defRPr sz="1400" kern="1200" baseline="0">
+                <a:solidFill>
+                  <a:schemeClr val="tx1"/>
+                </a:solidFill>
+                <a:latin typeface="+mn-lt"/>
+                <a:ea typeface="+mn-ea"/>
+                <a:cs typeface="+mn-cs"/>
+              </a:defRPr>
+            </a:lvl5pPr>
+            <a:lvl6pPr marL="1737360" indent="-182880" algn="l" defTabSz="914400" rtl="0" eaLnBrk="1" latinLnBrk="0" hangingPunct="1">
+              <a:spcBef>
+                <a:spcPct val="20000"/>
+              </a:spcBef>
+              <a:buClr>
+                <a:schemeClr val="accent1"/>
+              </a:buClr>
+              <a:buFont typeface="Arial" pitchFamily="34" charset="0"/>
+              <a:buChar char="•"/>
+              <a:defRPr sz="1400" kern="1200" baseline="0">
+                <a:solidFill>
+                  <a:schemeClr val="tx1"/>
+                </a:solidFill>
+                <a:latin typeface="+mn-lt"/>
+                <a:ea typeface="+mn-ea"/>
+                <a:cs typeface="+mn-cs"/>
+              </a:defRPr>
+            </a:lvl6pPr>
+            <a:lvl7pPr marL="1920240" indent="-182880" algn="l" defTabSz="914400" rtl="0" eaLnBrk="1" latinLnBrk="0" hangingPunct="1">
+              <a:spcBef>
+                <a:spcPct val="20000"/>
+              </a:spcBef>
+              <a:buClr>
+                <a:schemeClr val="accent2"/>
+              </a:buClr>
+              <a:buFont typeface="Arial" pitchFamily="34" charset="0"/>
+              <a:buChar char="•"/>
+              <a:defRPr sz="1400" kern="1200">
+                <a:solidFill>
+                  <a:schemeClr val="tx1"/>
+                </a:solidFill>
+                <a:latin typeface="+mn-lt"/>
+                <a:ea typeface="+mn-ea"/>
+                <a:cs typeface="+mn-cs"/>
+              </a:defRPr>
+            </a:lvl7pPr>
+            <a:lvl8pPr marL="2103120" indent="-182880" algn="l" defTabSz="914400" rtl="0" eaLnBrk="1" latinLnBrk="0" hangingPunct="1">
+              <a:spcBef>
+                <a:spcPct val="20000"/>
+              </a:spcBef>
+              <a:buClr>
+                <a:schemeClr val="accent3"/>
+              </a:buClr>
+              <a:buFont typeface="Arial" pitchFamily="34" charset="0"/>
+              <a:buChar char="•"/>
+              <a:defRPr sz="1400" kern="1200">
+                <a:solidFill>
+                  <a:schemeClr val="tx1"/>
+                </a:solidFill>
+                <a:latin typeface="+mn-lt"/>
+                <a:ea typeface="+mn-ea"/>
+                <a:cs typeface="+mn-cs"/>
+              </a:defRPr>
+            </a:lvl8pPr>
+            <a:lvl9pPr marL="2286000" indent="-182880" algn="l" defTabSz="914400" rtl="0" eaLnBrk="1" latinLnBrk="0" hangingPunct="1">
+              <a:spcBef>
+                <a:spcPct val="20000"/>
+              </a:spcBef>
+              <a:buClr>
+                <a:schemeClr val="accent4"/>
+              </a:buClr>
+              <a:buFont typeface="Arial" pitchFamily="34" charset="0"/>
+              <a:buChar char="•"/>
+              <a:defRPr sz="1400" kern="1200">
+                <a:solidFill>
+                  <a:schemeClr val="tx1"/>
+                </a:solidFill>
+                <a:latin typeface="+mn-lt"/>
+                <a:ea typeface="+mn-ea"/>
+                <a:cs typeface="+mn-cs"/>
+              </a:defRPr>
+            </a:lvl9pPr>
+          </a:lstStyle>
+          <a:p>
+            <a:r>
+              <a:rPr lang="el-GR" dirty="0" smtClean="0"/>
+              <a:t>α</a:t>
+            </a:r>
+            <a:r>
+              <a:rPr lang="en-US" dirty="0" smtClean="0"/>
+              <a:t>: Meta heuristic value relating to the favoring of pheromone</a:t>
+            </a:r>
+          </a:p>
+          <a:p>
+            <a:r>
+              <a:rPr lang="el-GR" dirty="0" smtClean="0"/>
+              <a:t>β</a:t>
+            </a:r>
+            <a:r>
+              <a:rPr lang="en-US" dirty="0" smtClean="0"/>
+              <a:t>: Meta </a:t>
+            </a:r>
+            <a:r>
+              <a:rPr lang="en-US" dirty="0"/>
+              <a:t>heuristic value relating to the favoring of </a:t>
+            </a:r>
+            <a:r>
+              <a:rPr lang="en-US" dirty="0" smtClean="0"/>
+              <a:t>shorter distance</a:t>
+            </a:r>
+            <a:endParaRPr lang="en-US" dirty="0" smtClean="0"/>
+          </a:p>
+          <a:p>
+            <a:r>
+              <a:rPr lang="en-US" dirty="0" smtClean="0"/>
+              <a:t>η: 1/distance from current to node </a:t>
+            </a:r>
+            <a:r>
+              <a:rPr lang="en-US" dirty="0" err="1" smtClean="0"/>
+              <a:t>xy</a:t>
+            </a:r>
+            <a:r>
+              <a:rPr lang="en-US" dirty="0" smtClean="0"/>
+              <a:t> </a:t>
+            </a:r>
+            <a:endParaRPr lang="en-GB" dirty="0" smtClean="0"/>
+          </a:p>
+          <a:p>
+            <a:endParaRPr lang="en-US" dirty="0" smtClean="0"/>
+          </a:p>
+        </p:txBody>
+      </p:sp>
+      <p:pic>
+        <p:nvPicPr>
+          <p:cNvPr id="5" name="Picture 4"/>
+          <p:cNvPicPr>
+            <a:picLocks noChangeAspect="1"/>
+          </p:cNvPicPr>
+          <p:nvPr/>
+        </p:nvPicPr>
+        <p:blipFill>
+          <a:blip r:embed="rId2">
+            <a:extLst>
+              <a:ext uri="{28A0092B-C50C-407E-A947-70E740481C1C}">
+                <a14:useLocalDpi xmlns:a14="http://schemas.microsoft.com/office/drawing/2010/main" val="0"/>
+              </a:ext>
+            </a:extLst>
+          </a:blip>
+          <a:stretch>
+            <a:fillRect/>
+          </a:stretch>
+        </p:blipFill>
+        <p:spPr>
+          <a:xfrm>
+            <a:off x="2051720" y="2214345"/>
+            <a:ext cx="3888432" cy="1718711"/>
+          </a:xfrm>
+          <a:prstGeom prst="rect">
+            <a:avLst/>
+          </a:prstGeom>
+        </p:spPr>
+      </p:pic>
     </p:spTree>
     <p:extLst>
       <p:ext uri="{BB962C8B-B14F-4D97-AF65-F5344CB8AC3E}">
-        <p14:creationId xmlns:p14="http://schemas.microsoft.com/office/powerpoint/2010/main" val="3212574978"/>
+        <p14:creationId xmlns:p14="http://schemas.microsoft.com/office/powerpoint/2010/main" val="1606708163"/>
       </p:ext>
     </p:extLst>
   </p:cSld>
@@ -4658,7 +4935,7 @@
           <a:p>
             <a:r>
               <a:rPr lang="en-US" dirty="0" smtClean="0"/>
-              <a:t>Technical issues(2)</a:t>
+              <a:t>Pheromone deposit</a:t>
             </a:r>
             <a:endParaRPr lang="en-GB" dirty="0"/>
           </a:p>
@@ -4674,70 +4951,219 @@
             <p:ph idx="1"/>
           </p:nvPr>
         </p:nvSpPr>
-        <p:spPr/>
-        <p:txBody>
-          <a:bodyPr/>
-          <a:lstStyle/>
-          <a:p>
-            <a:r>
-              <a:rPr lang="en-US" dirty="0" smtClean="0"/>
-              <a:t>Use of </a:t>
-            </a:r>
-            <a:r>
-              <a:rPr lang="en-US" dirty="0" err="1" smtClean="0"/>
-              <a:t>SwingWorker</a:t>
-            </a:r>
-            <a:r>
-              <a:rPr lang="en-US" dirty="0" smtClean="0"/>
-              <a:t> to execute the algorithm in its own thread</a:t>
-            </a:r>
-          </a:p>
-          <a:p>
-            <a:pPr lvl="1"/>
-            <a:r>
-              <a:rPr lang="en-US" dirty="0" smtClean="0"/>
-              <a:t>Allows updated to the view without it ‘freezing up’</a:t>
-            </a:r>
-            <a:endParaRPr lang="en-GB" dirty="0" smtClean="0"/>
-          </a:p>
-          <a:p>
-            <a:pPr marL="114300" indent="0">
-              <a:buNone/>
-            </a:pPr>
-            <a:endParaRPr lang="en-US" dirty="0" smtClean="0"/>
-          </a:p>
-          <a:p>
-            <a:r>
-              <a:rPr lang="en-US" dirty="0" smtClean="0"/>
-              <a:t>Simulate ants moving on the ‘paths’</a:t>
-            </a:r>
-          </a:p>
-          <a:p>
-            <a:pPr lvl="1"/>
-            <a:r>
-              <a:rPr lang="en-US" dirty="0" smtClean="0"/>
-              <a:t>Get the location the ant started and its destination</a:t>
-            </a:r>
-          </a:p>
-          <a:p>
-            <a:pPr lvl="1"/>
-            <a:r>
-              <a:rPr lang="en-US" dirty="0" smtClean="0"/>
-              <a:t>Use linear interpolation </a:t>
-            </a:r>
-          </a:p>
-          <a:p>
-            <a:pPr lvl="2"/>
-            <a:r>
-              <a:rPr lang="en-US" dirty="0" smtClean="0"/>
-              <a:t>Given the x /y of the start and finish</a:t>
-            </a:r>
-          </a:p>
-          <a:p>
-            <a:pPr lvl="2"/>
-            <a:r>
-              <a:rPr lang="en-US" dirty="0" smtClean="0"/>
-              <a:t>Linear interpolation can be used to get the value of any </a:t>
+        <p:spPr>
+          <a:xfrm>
+            <a:off x="457200" y="1600200"/>
+            <a:ext cx="7620000" cy="1252736"/>
+          </a:xfrm>
+        </p:spPr>
+        <p:txBody>
+          <a:bodyPr/>
+          <a:lstStyle/>
+          <a:p>
+            <a:r>
+              <a:rPr lang="en-US" dirty="0" smtClean="0"/>
+              <a:t>The pheromone trails are updated as the agents traverse the graph</a:t>
+            </a:r>
+          </a:p>
+          <a:p>
+            <a:r>
+              <a:rPr lang="en-US" dirty="0" smtClean="0"/>
+              <a:t>The equation to model this behavior is:</a:t>
+            </a:r>
+            <a:endParaRPr lang="en-GB" dirty="0"/>
+          </a:p>
+        </p:txBody>
+      </p:sp>
+      <p:sp>
+        <p:nvSpPr>
+          <p:cNvPr id="6" name="Content Placeholder 2"/>
+          <p:cNvSpPr txBox="1">
+            <a:spLocks/>
+          </p:cNvSpPr>
+          <p:nvPr/>
+        </p:nvSpPr>
+        <p:spPr>
+          <a:xfrm>
+            <a:off x="609600" y="4797152"/>
+            <a:ext cx="7620000" cy="1252736"/>
+          </a:xfrm>
+          <a:prstGeom prst="rect">
+            <a:avLst/>
+          </a:prstGeom>
+        </p:spPr>
+        <p:txBody>
+          <a:bodyPr vert="horz" lIns="91440" tIns="45720" rIns="91440" bIns="45720" rtlCol="0">
+            <a:normAutofit/>
+          </a:bodyPr>
+          <a:lstStyle>
+            <a:lvl1pPr marL="342900" indent="-228600" algn="l" defTabSz="914400" rtl="0" eaLnBrk="1" latinLnBrk="0" hangingPunct="1">
+              <a:spcBef>
+                <a:spcPct val="20000"/>
+              </a:spcBef>
+              <a:buClr>
+                <a:schemeClr val="accent1"/>
+              </a:buClr>
+              <a:buFont typeface="Arial" pitchFamily="34" charset="0"/>
+              <a:buChar char="•"/>
+              <a:defRPr sz="2200" kern="1200">
+                <a:solidFill>
+                  <a:schemeClr val="tx1"/>
+                </a:solidFill>
+                <a:latin typeface="+mn-lt"/>
+                <a:ea typeface="+mn-ea"/>
+                <a:cs typeface="+mn-cs"/>
+              </a:defRPr>
+            </a:lvl1pPr>
+            <a:lvl2pPr marL="640080" indent="-228600" algn="l" defTabSz="914400" rtl="0" eaLnBrk="1" latinLnBrk="0" hangingPunct="1">
+              <a:spcBef>
+                <a:spcPct val="20000"/>
+              </a:spcBef>
+              <a:buClr>
+                <a:schemeClr val="accent2"/>
+              </a:buClr>
+              <a:buFont typeface="Arial" pitchFamily="34" charset="0"/>
+              <a:buChar char="•"/>
+              <a:defRPr sz="2000" kern="1200">
+                <a:solidFill>
+                  <a:schemeClr val="tx1"/>
+                </a:solidFill>
+                <a:latin typeface="+mn-lt"/>
+                <a:ea typeface="+mn-ea"/>
+                <a:cs typeface="+mn-cs"/>
+              </a:defRPr>
+            </a:lvl2pPr>
+            <a:lvl3pPr marL="1005840" indent="-228600" algn="l" defTabSz="914400" rtl="0" eaLnBrk="1" latinLnBrk="0" hangingPunct="1">
+              <a:spcBef>
+                <a:spcPct val="20000"/>
+              </a:spcBef>
+              <a:buClr>
+                <a:schemeClr val="accent3"/>
+              </a:buClr>
+              <a:buFont typeface="Arial" pitchFamily="34" charset="0"/>
+              <a:buChar char="•"/>
+              <a:defRPr sz="1800" kern="1200">
+                <a:solidFill>
+                  <a:schemeClr val="tx1"/>
+                </a:solidFill>
+                <a:latin typeface="+mn-lt"/>
+                <a:ea typeface="+mn-ea"/>
+                <a:cs typeface="+mn-cs"/>
+              </a:defRPr>
+            </a:lvl3pPr>
+            <a:lvl4pPr marL="1280160" indent="-228600" algn="l" defTabSz="914400" rtl="0" eaLnBrk="1" latinLnBrk="0" hangingPunct="1">
+              <a:spcBef>
+                <a:spcPct val="20000"/>
+              </a:spcBef>
+              <a:buClr>
+                <a:schemeClr val="accent4"/>
+              </a:buClr>
+              <a:buFont typeface="Arial" pitchFamily="34" charset="0"/>
+              <a:buChar char="•"/>
+              <a:defRPr sz="1600" kern="1200">
+                <a:solidFill>
+                  <a:schemeClr val="tx1"/>
+                </a:solidFill>
+                <a:latin typeface="+mn-lt"/>
+                <a:ea typeface="+mn-ea"/>
+                <a:cs typeface="+mn-cs"/>
+              </a:defRPr>
+            </a:lvl4pPr>
+            <a:lvl5pPr marL="1554480" indent="-228600" algn="l" defTabSz="914400" rtl="0" eaLnBrk="1" latinLnBrk="0" hangingPunct="1">
+              <a:spcBef>
+                <a:spcPct val="20000"/>
+              </a:spcBef>
+              <a:buClr>
+                <a:schemeClr val="accent5"/>
+              </a:buClr>
+              <a:buFont typeface="Arial" pitchFamily="34" charset="0"/>
+              <a:buChar char="•"/>
+              <a:defRPr sz="1400" kern="1200" baseline="0">
+                <a:solidFill>
+                  <a:schemeClr val="tx1"/>
+                </a:solidFill>
+                <a:latin typeface="+mn-lt"/>
+                <a:ea typeface="+mn-ea"/>
+                <a:cs typeface="+mn-cs"/>
+              </a:defRPr>
+            </a:lvl5pPr>
+            <a:lvl6pPr marL="1737360" indent="-182880" algn="l" defTabSz="914400" rtl="0" eaLnBrk="1" latinLnBrk="0" hangingPunct="1">
+              <a:spcBef>
+                <a:spcPct val="20000"/>
+              </a:spcBef>
+              <a:buClr>
+                <a:schemeClr val="accent1"/>
+              </a:buClr>
+              <a:buFont typeface="Arial" pitchFamily="34" charset="0"/>
+              <a:buChar char="•"/>
+              <a:defRPr sz="1400" kern="1200" baseline="0">
+                <a:solidFill>
+                  <a:schemeClr val="tx1"/>
+                </a:solidFill>
+                <a:latin typeface="+mn-lt"/>
+                <a:ea typeface="+mn-ea"/>
+                <a:cs typeface="+mn-cs"/>
+              </a:defRPr>
+            </a:lvl6pPr>
+            <a:lvl7pPr marL="1920240" indent="-182880" algn="l" defTabSz="914400" rtl="0" eaLnBrk="1" latinLnBrk="0" hangingPunct="1">
+              <a:spcBef>
+                <a:spcPct val="20000"/>
+              </a:spcBef>
+              <a:buClr>
+                <a:schemeClr val="accent2"/>
+              </a:buClr>
+              <a:buFont typeface="Arial" pitchFamily="34" charset="0"/>
+              <a:buChar char="•"/>
+              <a:defRPr sz="1400" kern="1200">
+                <a:solidFill>
+                  <a:schemeClr val="tx1"/>
+                </a:solidFill>
+                <a:latin typeface="+mn-lt"/>
+                <a:ea typeface="+mn-ea"/>
+                <a:cs typeface="+mn-cs"/>
+              </a:defRPr>
+            </a:lvl7pPr>
+            <a:lvl8pPr marL="2103120" indent="-182880" algn="l" defTabSz="914400" rtl="0" eaLnBrk="1" latinLnBrk="0" hangingPunct="1">
+              <a:spcBef>
+                <a:spcPct val="20000"/>
+              </a:spcBef>
+              <a:buClr>
+                <a:schemeClr val="accent3"/>
+              </a:buClr>
+              <a:buFont typeface="Arial" pitchFamily="34" charset="0"/>
+              <a:buChar char="•"/>
+              <a:defRPr sz="1400" kern="1200">
+                <a:solidFill>
+                  <a:schemeClr val="tx1"/>
+                </a:solidFill>
+                <a:latin typeface="+mn-lt"/>
+                <a:ea typeface="+mn-ea"/>
+                <a:cs typeface="+mn-cs"/>
+              </a:defRPr>
+            </a:lvl8pPr>
+            <a:lvl9pPr marL="2286000" indent="-182880" algn="l" defTabSz="914400" rtl="0" eaLnBrk="1" latinLnBrk="0" hangingPunct="1">
+              <a:spcBef>
+                <a:spcPct val="20000"/>
+              </a:spcBef>
+              <a:buClr>
+                <a:schemeClr val="accent4"/>
+              </a:buClr>
+              <a:buFont typeface="Arial" pitchFamily="34" charset="0"/>
+              <a:buChar char="•"/>
+              <a:defRPr sz="1400" kern="1200">
+                <a:solidFill>
+                  <a:schemeClr val="tx1"/>
+                </a:solidFill>
+                <a:latin typeface="+mn-lt"/>
+                <a:ea typeface="+mn-ea"/>
+                <a:cs typeface="+mn-cs"/>
+              </a:defRPr>
+            </a:lvl9pPr>
+          </a:lstStyle>
+          <a:p>
+            <a:r>
+              <a:rPr lang="en-US" dirty="0" smtClean="0"/>
+              <a:t>This correctly factors in decay and allows for any ant moving through node </a:t>
             </a:r>
             <a:r>
               <a:rPr lang="en-US" dirty="0" err="1" smtClean="0"/>
@@ -4745,69 +5171,84 @@
             </a:r>
             <a:r>
               <a:rPr lang="en-US" dirty="0" smtClean="0"/>
-              <a:t> on the path between these two points</a:t>
-            </a:r>
-          </a:p>
-          <a:p>
-            <a:pPr lvl="2"/>
-            <a:r>
-              <a:rPr lang="en-GB" dirty="0" smtClean="0"/>
-              <a:t>value1</a:t>
-            </a:r>
-            <a:r>
-              <a:rPr lang="en-GB" dirty="0"/>
-              <a:t>*(1-mu</a:t>
-            </a:r>
-            <a:r>
-              <a:rPr lang="en-GB" dirty="0" smtClean="0"/>
-              <a:t>)+vlaue2*mu);</a:t>
-            </a:r>
-            <a:endParaRPr lang="en-US" dirty="0" smtClean="0"/>
-          </a:p>
-          <a:p>
-            <a:pPr lvl="3"/>
-            <a:r>
-              <a:rPr lang="en-US" dirty="0" smtClean="0"/>
-              <a:t>Value1/2 is the X or Y value (</a:t>
+              <a:t> to add to the pheromone concentration at node </a:t>
             </a:r>
             <a:r>
               <a:rPr lang="en-US" dirty="0" err="1" smtClean="0"/>
-              <a:t>e.g</a:t>
-            </a:r>
-            <a:r>
-              <a:rPr lang="en-US" dirty="0" smtClean="0"/>
-              <a:t> value1 = start x, value2 = destination x)</a:t>
-            </a:r>
-          </a:p>
-          <a:p>
-            <a:pPr lvl="3"/>
-            <a:r>
-              <a:rPr lang="en-US" dirty="0" smtClean="0"/>
-              <a:t>Mu is how far on that path you want (</a:t>
-            </a:r>
-            <a:r>
-              <a:rPr lang="en-US" dirty="0" err="1" smtClean="0"/>
-              <a:t>e.g</a:t>
-            </a:r>
-            <a:r>
-              <a:rPr lang="en-US" dirty="0" smtClean="0"/>
-              <a:t> mu 0.5 = half way between the points)</a:t>
-            </a:r>
-          </a:p>
-          <a:p>
-            <a:pPr lvl="1"/>
-            <a:endParaRPr lang="en-US" dirty="0"/>
-          </a:p>
-          <a:p>
-            <a:pPr lvl="1"/>
-            <a:endParaRPr lang="en-US" dirty="0" smtClean="0"/>
-          </a:p>
-        </p:txBody>
-      </p:sp>
+              <a:t>xy</a:t>
+            </a:r>
+            <a:r>
+              <a:rPr lang="en-US" dirty="0" smtClean="0"/>
+              <a:t> </a:t>
+            </a:r>
+            <a:endParaRPr lang="en-GB" dirty="0"/>
+          </a:p>
+        </p:txBody>
+      </p:sp>
+      <p:pic>
+        <p:nvPicPr>
+          <p:cNvPr id="7" name="Picture 6"/>
+          <p:cNvPicPr>
+            <a:picLocks noChangeAspect="1"/>
+          </p:cNvPicPr>
+          <p:nvPr/>
+        </p:nvPicPr>
+        <p:blipFill>
+          <a:blip r:embed="rId2">
+            <a:extLst>
+              <a:ext uri="{28A0092B-C50C-407E-A947-70E740481C1C}">
+                <a14:useLocalDpi xmlns:a14="http://schemas.microsoft.com/office/drawing/2010/main" val="0"/>
+              </a:ext>
+            </a:extLst>
+          </a:blip>
+          <a:stretch>
+            <a:fillRect/>
+          </a:stretch>
+        </p:blipFill>
+        <p:spPr>
+          <a:xfrm>
+            <a:off x="1331640" y="2727367"/>
+            <a:ext cx="5580112" cy="1030809"/>
+          </a:xfrm>
+          <a:prstGeom prst="rect">
+            <a:avLst/>
+          </a:prstGeom>
+        </p:spPr>
+      </p:pic>
+      <p:pic>
+        <p:nvPicPr>
+          <p:cNvPr id="8" name="Picture 7"/>
+          <p:cNvPicPr>
+            <a:picLocks noChangeAspect="1"/>
+          </p:cNvPicPr>
+          <p:nvPr/>
+        </p:nvPicPr>
+        <p:blipFill>
+          <a:blip r:embed="rId3" cstate="print">
+            <a:extLst>
+              <a:ext uri="{28A0092B-C50C-407E-A947-70E740481C1C}">
+                <a14:useLocalDpi xmlns:a14="http://schemas.microsoft.com/office/drawing/2010/main" val="0"/>
+              </a:ext>
+            </a:extLst>
+          </a:blip>
+          <a:stretch>
+            <a:fillRect/>
+          </a:stretch>
+        </p:blipFill>
+        <p:spPr>
+          <a:xfrm>
+            <a:off x="1326152" y="3682526"/>
+            <a:ext cx="6516216" cy="1127089"/>
+          </a:xfrm>
+          <a:prstGeom prst="rect">
+            <a:avLst/>
+          </a:prstGeom>
+        </p:spPr>
+      </p:pic>
     </p:spTree>
     <p:extLst>
       <p:ext uri="{BB962C8B-B14F-4D97-AF65-F5344CB8AC3E}">
-        <p14:creationId xmlns:p14="http://schemas.microsoft.com/office/powerpoint/2010/main" val="1907725925"/>
+        <p14:creationId xmlns:p14="http://schemas.microsoft.com/office/powerpoint/2010/main" val="841121288"/>
       </p:ext>
     </p:extLst>
   </p:cSld>
@@ -4851,7 +5292,7 @@
           <a:p>
             <a:r>
               <a:rPr lang="en-US" dirty="0" smtClean="0"/>
-              <a:t>Current algorithm</a:t>
+              <a:t>Technical Implementation</a:t>
             </a:r>
             <a:endParaRPr lang="en-GB" dirty="0"/>
           </a:p>
@@ -4867,495 +5308,86 @@
             <p:ph idx="1"/>
           </p:nvPr>
         </p:nvSpPr>
-        <p:spPr>
-          <a:xfrm>
-            <a:off x="457200" y="1600200"/>
-            <a:ext cx="7620000" cy="4205064"/>
-          </a:xfrm>
-        </p:spPr>
-        <p:txBody>
-          <a:bodyPr/>
-          <a:lstStyle/>
-          <a:p>
-            <a:r>
-              <a:rPr lang="en-US" dirty="0" smtClean="0"/>
-              <a:t>To update the view to reflect the current state</a:t>
-            </a:r>
-          </a:p>
-          <a:p>
-            <a:r>
-              <a:rPr lang="en-US" dirty="0" smtClean="0"/>
-              <a:t>For every ant(agent)</a:t>
+        <p:spPr/>
+        <p:txBody>
+          <a:bodyPr/>
+          <a:lstStyle/>
+          <a:p>
+            <a:r>
+              <a:rPr lang="en-US" dirty="0" smtClean="0"/>
+              <a:t>Implemented in Java and its Swing packages</a:t>
             </a:r>
           </a:p>
           <a:p>
             <a:pPr lvl="1"/>
             <a:r>
               <a:rPr lang="en-US" dirty="0" smtClean="0"/>
-              <a:t>Draw the ant at their current location</a:t>
+              <a:t>Cross-platform</a:t>
             </a:r>
           </a:p>
           <a:p>
             <a:pPr lvl="1"/>
             <a:r>
               <a:rPr lang="en-US" dirty="0" smtClean="0"/>
-              <a:t>If they aren’t finished, move them</a:t>
-            </a:r>
+              <a:t>JUnit tests</a:t>
+            </a:r>
+          </a:p>
+          <a:p>
+            <a:pPr lvl="1"/>
+            <a:endParaRPr lang="en-US" dirty="0"/>
+          </a:p>
+          <a:p>
+            <a:r>
+              <a:rPr lang="en-US" dirty="0" smtClean="0"/>
+              <a:t>Visualising the algorithm is difficult</a:t>
+            </a:r>
+            <a:endParaRPr lang="en-US" dirty="0"/>
+          </a:p>
+          <a:p>
+            <a:pPr lvl="1"/>
+            <a:r>
+              <a:rPr lang="en-US" dirty="0" smtClean="0"/>
+              <a:t>Easy to implement, difficult to visualise</a:t>
+            </a:r>
+            <a:endParaRPr lang="en-US" dirty="0"/>
           </a:p>
           <a:p>
             <a:pPr lvl="2"/>
             <a:r>
               <a:rPr lang="en-US" dirty="0" smtClean="0"/>
-              <a:t>During this move, get their current X and the destination</a:t>
-            </a:r>
-          </a:p>
-          <a:p>
-            <a:pPr lvl="3"/>
-            <a:r>
-              <a:rPr lang="en-US" dirty="0" smtClean="0"/>
-              <a:t>Linear interpolate these two locations to show the ant moving</a:t>
-            </a:r>
-          </a:p>
-          <a:p>
-            <a:pPr lvl="3"/>
-            <a:r>
-              <a:rPr lang="en-US" dirty="0" smtClean="0"/>
-              <a:t>Update pheromone</a:t>
-            </a:r>
+              <a:t>Showing pheromone levels to the user</a:t>
+            </a:r>
+            <a:endParaRPr lang="en-US" dirty="0"/>
           </a:p>
           <a:p>
             <a:pPr lvl="2"/>
             <a:r>
               <a:rPr lang="en-US" dirty="0" smtClean="0"/>
-              <a:t>If the ant has the current best path, set its path as best</a:t>
-            </a:r>
-          </a:p>
-          <a:p>
-            <a:pPr lvl="3"/>
-            <a:r>
-              <a:rPr lang="en-US" dirty="0" smtClean="0"/>
-              <a:t>Loop through the cities visited in order and draw a line between them</a:t>
-            </a:r>
-          </a:p>
-          <a:p>
-            <a:pPr lvl="3"/>
-            <a:r>
-              <a:rPr lang="en-US" dirty="0" smtClean="0"/>
-              <a:t>paint the updated pheromone</a:t>
-            </a:r>
+              <a:t>Showing the agents moving</a:t>
+            </a:r>
+          </a:p>
+          <a:p>
+            <a:pPr lvl="2"/>
+            <a:r>
+              <a:rPr lang="en-US" dirty="0" smtClean="0"/>
+              <a:t>Show the best route</a:t>
+            </a:r>
+          </a:p>
+          <a:p>
+            <a:pPr lvl="2"/>
             <a:endParaRPr lang="en-US" dirty="0"/>
           </a:p>
           <a:p>
-            <a:pPr lvl="1"/>
-            <a:r>
-              <a:rPr lang="en-US" dirty="0" smtClean="0"/>
-              <a:t>Once all ants have finished</a:t>
+            <a:r>
+              <a:rPr lang="en-US" dirty="0" smtClean="0"/>
+              <a:t>Do all this in a reasonable time</a:t>
             </a:r>
             <a:endParaRPr lang="en-US" dirty="0"/>
           </a:p>
           <a:p>
-            <a:pPr lvl="2"/>
-            <a:r>
-              <a:rPr lang="en-US" dirty="0" smtClean="0"/>
-              <a:t>Remove all pheromone trails and only show the best path</a:t>
-            </a:r>
-            <a:endParaRPr lang="en-US" dirty="0"/>
-          </a:p>
-          <a:p>
-            <a:pPr marL="1051560" lvl="3" indent="0">
+            <a:pPr marL="411480" lvl="1" indent="0">
               <a:buNone/>
             </a:pPr>
-            <a:endParaRPr lang="en-US" i="1" dirty="0" smtClean="0"/>
-          </a:p>
-        </p:txBody>
-      </p:sp>
-      <p:sp>
-        <p:nvSpPr>
-          <p:cNvPr id="4" name="Content Placeholder 2"/>
-          <p:cNvSpPr txBox="1">
-            <a:spLocks/>
-          </p:cNvSpPr>
-          <p:nvPr/>
-        </p:nvSpPr>
-        <p:spPr>
-          <a:xfrm>
-            <a:off x="535815" y="5980161"/>
-            <a:ext cx="7272808" cy="892696"/>
-          </a:xfrm>
-          <a:prstGeom prst="rect">
-            <a:avLst/>
-          </a:prstGeom>
-        </p:spPr>
-        <p:txBody>
-          <a:bodyPr vert="horz" lIns="91440" tIns="45720" rIns="91440" bIns="45720" rtlCol="0">
-            <a:normAutofit/>
-          </a:bodyPr>
-          <a:lstStyle>
-            <a:lvl1pPr marL="342900" indent="-228600" algn="l" defTabSz="914400" rtl="0" eaLnBrk="1" latinLnBrk="0" hangingPunct="1">
-              <a:spcBef>
-                <a:spcPct val="20000"/>
-              </a:spcBef>
-              <a:buClr>
-                <a:schemeClr val="accent1"/>
-              </a:buClr>
-              <a:buFont typeface="Arial" pitchFamily="34" charset="0"/>
-              <a:buChar char="•"/>
-              <a:defRPr sz="2200" kern="1200">
-                <a:solidFill>
-                  <a:schemeClr val="tx1"/>
-                </a:solidFill>
-                <a:latin typeface="+mn-lt"/>
-                <a:ea typeface="+mn-ea"/>
-                <a:cs typeface="+mn-cs"/>
-              </a:defRPr>
-            </a:lvl1pPr>
-            <a:lvl2pPr marL="640080" indent="-228600" algn="l" defTabSz="914400" rtl="0" eaLnBrk="1" latinLnBrk="0" hangingPunct="1">
-              <a:spcBef>
-                <a:spcPct val="20000"/>
-              </a:spcBef>
-              <a:buClr>
-                <a:schemeClr val="accent2"/>
-              </a:buClr>
-              <a:buFont typeface="Arial" pitchFamily="34" charset="0"/>
-              <a:buChar char="•"/>
-              <a:defRPr sz="2000" kern="1200">
-                <a:solidFill>
-                  <a:schemeClr val="tx1"/>
-                </a:solidFill>
-                <a:latin typeface="+mn-lt"/>
-                <a:ea typeface="+mn-ea"/>
-                <a:cs typeface="+mn-cs"/>
-              </a:defRPr>
-            </a:lvl2pPr>
-            <a:lvl3pPr marL="1005840" indent="-228600" algn="l" defTabSz="914400" rtl="0" eaLnBrk="1" latinLnBrk="0" hangingPunct="1">
-              <a:spcBef>
-                <a:spcPct val="20000"/>
-              </a:spcBef>
-              <a:buClr>
-                <a:schemeClr val="accent3"/>
-              </a:buClr>
-              <a:buFont typeface="Arial" pitchFamily="34" charset="0"/>
-              <a:buChar char="•"/>
-              <a:defRPr sz="1800" kern="1200">
-                <a:solidFill>
-                  <a:schemeClr val="tx1"/>
-                </a:solidFill>
-                <a:latin typeface="+mn-lt"/>
-                <a:ea typeface="+mn-ea"/>
-                <a:cs typeface="+mn-cs"/>
-              </a:defRPr>
-            </a:lvl3pPr>
-            <a:lvl4pPr marL="1280160" indent="-228600" algn="l" defTabSz="914400" rtl="0" eaLnBrk="1" latinLnBrk="0" hangingPunct="1">
-              <a:spcBef>
-                <a:spcPct val="20000"/>
-              </a:spcBef>
-              <a:buClr>
-                <a:schemeClr val="accent4"/>
-              </a:buClr>
-              <a:buFont typeface="Arial" pitchFamily="34" charset="0"/>
-              <a:buChar char="•"/>
-              <a:defRPr sz="1600" kern="1200">
-                <a:solidFill>
-                  <a:schemeClr val="tx1"/>
-                </a:solidFill>
-                <a:latin typeface="+mn-lt"/>
-                <a:ea typeface="+mn-ea"/>
-                <a:cs typeface="+mn-cs"/>
-              </a:defRPr>
-            </a:lvl4pPr>
-            <a:lvl5pPr marL="1554480" indent="-228600" algn="l" defTabSz="914400" rtl="0" eaLnBrk="1" latinLnBrk="0" hangingPunct="1">
-              <a:spcBef>
-                <a:spcPct val="20000"/>
-              </a:spcBef>
-              <a:buClr>
-                <a:schemeClr val="accent5"/>
-              </a:buClr>
-              <a:buFont typeface="Arial" pitchFamily="34" charset="0"/>
-              <a:buChar char="•"/>
-              <a:defRPr sz="1400" kern="1200" baseline="0">
-                <a:solidFill>
-                  <a:schemeClr val="tx1"/>
-                </a:solidFill>
-                <a:latin typeface="+mn-lt"/>
-                <a:ea typeface="+mn-ea"/>
-                <a:cs typeface="+mn-cs"/>
-              </a:defRPr>
-            </a:lvl5pPr>
-            <a:lvl6pPr marL="1737360" indent="-182880" algn="l" defTabSz="914400" rtl="0" eaLnBrk="1" latinLnBrk="0" hangingPunct="1">
-              <a:spcBef>
-                <a:spcPct val="20000"/>
-              </a:spcBef>
-              <a:buClr>
-                <a:schemeClr val="accent1"/>
-              </a:buClr>
-              <a:buFont typeface="Arial" pitchFamily="34" charset="0"/>
-              <a:buChar char="•"/>
-              <a:defRPr sz="1400" kern="1200" baseline="0">
-                <a:solidFill>
-                  <a:schemeClr val="tx1"/>
-                </a:solidFill>
-                <a:latin typeface="+mn-lt"/>
-                <a:ea typeface="+mn-ea"/>
-                <a:cs typeface="+mn-cs"/>
-              </a:defRPr>
-            </a:lvl6pPr>
-            <a:lvl7pPr marL="1920240" indent="-182880" algn="l" defTabSz="914400" rtl="0" eaLnBrk="1" latinLnBrk="0" hangingPunct="1">
-              <a:spcBef>
-                <a:spcPct val="20000"/>
-              </a:spcBef>
-              <a:buClr>
-                <a:schemeClr val="accent2"/>
-              </a:buClr>
-              <a:buFont typeface="Arial" pitchFamily="34" charset="0"/>
-              <a:buChar char="•"/>
-              <a:defRPr sz="1400" kern="1200">
-                <a:solidFill>
-                  <a:schemeClr val="tx1"/>
-                </a:solidFill>
-                <a:latin typeface="+mn-lt"/>
-                <a:ea typeface="+mn-ea"/>
-                <a:cs typeface="+mn-cs"/>
-              </a:defRPr>
-            </a:lvl7pPr>
-            <a:lvl8pPr marL="2103120" indent="-182880" algn="l" defTabSz="914400" rtl="0" eaLnBrk="1" latinLnBrk="0" hangingPunct="1">
-              <a:spcBef>
-                <a:spcPct val="20000"/>
-              </a:spcBef>
-              <a:buClr>
-                <a:schemeClr val="accent3"/>
-              </a:buClr>
-              <a:buFont typeface="Arial" pitchFamily="34" charset="0"/>
-              <a:buChar char="•"/>
-              <a:defRPr sz="1400" kern="1200">
-                <a:solidFill>
-                  <a:schemeClr val="tx1"/>
-                </a:solidFill>
-                <a:latin typeface="+mn-lt"/>
-                <a:ea typeface="+mn-ea"/>
-                <a:cs typeface="+mn-cs"/>
-              </a:defRPr>
-            </a:lvl8pPr>
-            <a:lvl9pPr marL="2286000" indent="-182880" algn="l" defTabSz="914400" rtl="0" eaLnBrk="1" latinLnBrk="0" hangingPunct="1">
-              <a:spcBef>
-                <a:spcPct val="20000"/>
-              </a:spcBef>
-              <a:buClr>
-                <a:schemeClr val="accent4"/>
-              </a:buClr>
-              <a:buFont typeface="Arial" pitchFamily="34" charset="0"/>
-              <a:buChar char="•"/>
-              <a:defRPr sz="1400" kern="1200">
-                <a:solidFill>
-                  <a:schemeClr val="tx1"/>
-                </a:solidFill>
-                <a:latin typeface="+mn-lt"/>
-                <a:ea typeface="+mn-ea"/>
-                <a:cs typeface="+mn-cs"/>
-              </a:defRPr>
-            </a:lvl9pPr>
-          </a:lstStyle>
-          <a:p>
-            <a:pPr marL="1051560" lvl="3" indent="0">
-              <a:buNone/>
-            </a:pPr>
-            <a:endParaRPr lang="en-US" i="1" dirty="0" smtClean="0"/>
-          </a:p>
-        </p:txBody>
-      </p:sp>
-      <p:sp>
-        <p:nvSpPr>
-          <p:cNvPr id="5" name="Content Placeholder 2"/>
-          <p:cNvSpPr txBox="1">
-            <a:spLocks/>
-          </p:cNvSpPr>
-          <p:nvPr/>
-        </p:nvSpPr>
-        <p:spPr>
-          <a:xfrm>
-            <a:off x="535815" y="5877272"/>
-            <a:ext cx="7010172" cy="868321"/>
-          </a:xfrm>
-          <a:prstGeom prst="rect">
-            <a:avLst/>
-          </a:prstGeom>
-        </p:spPr>
-        <p:txBody>
-          <a:bodyPr vert="horz" lIns="91440" tIns="45720" rIns="91440" bIns="45720" rtlCol="0">
-            <a:normAutofit/>
-          </a:bodyPr>
-          <a:lstStyle>
-            <a:lvl1pPr marL="342900" indent="-228600" algn="l" defTabSz="914400" rtl="0" eaLnBrk="1" latinLnBrk="0" hangingPunct="1">
-              <a:spcBef>
-                <a:spcPct val="20000"/>
-              </a:spcBef>
-              <a:buClr>
-                <a:schemeClr val="accent1"/>
-              </a:buClr>
-              <a:buFont typeface="Arial" pitchFamily="34" charset="0"/>
-              <a:buChar char="•"/>
-              <a:defRPr sz="2200" kern="1200">
-                <a:solidFill>
-                  <a:schemeClr val="tx1"/>
-                </a:solidFill>
-                <a:latin typeface="+mn-lt"/>
-                <a:ea typeface="+mn-ea"/>
-                <a:cs typeface="+mn-cs"/>
-              </a:defRPr>
-            </a:lvl1pPr>
-            <a:lvl2pPr marL="640080" indent="-228600" algn="l" defTabSz="914400" rtl="0" eaLnBrk="1" latinLnBrk="0" hangingPunct="1">
-              <a:spcBef>
-                <a:spcPct val="20000"/>
-              </a:spcBef>
-              <a:buClr>
-                <a:schemeClr val="accent2"/>
-              </a:buClr>
-              <a:buFont typeface="Arial" pitchFamily="34" charset="0"/>
-              <a:buChar char="•"/>
-              <a:defRPr sz="2000" kern="1200">
-                <a:solidFill>
-                  <a:schemeClr val="tx1"/>
-                </a:solidFill>
-                <a:latin typeface="+mn-lt"/>
-                <a:ea typeface="+mn-ea"/>
-                <a:cs typeface="+mn-cs"/>
-              </a:defRPr>
-            </a:lvl2pPr>
-            <a:lvl3pPr marL="1005840" indent="-228600" algn="l" defTabSz="914400" rtl="0" eaLnBrk="1" latinLnBrk="0" hangingPunct="1">
-              <a:spcBef>
-                <a:spcPct val="20000"/>
-              </a:spcBef>
-              <a:buClr>
-                <a:schemeClr val="accent3"/>
-              </a:buClr>
-              <a:buFont typeface="Arial" pitchFamily="34" charset="0"/>
-              <a:buChar char="•"/>
-              <a:defRPr sz="1800" kern="1200">
-                <a:solidFill>
-                  <a:schemeClr val="tx1"/>
-                </a:solidFill>
-                <a:latin typeface="+mn-lt"/>
-                <a:ea typeface="+mn-ea"/>
-                <a:cs typeface="+mn-cs"/>
-              </a:defRPr>
-            </a:lvl3pPr>
-            <a:lvl4pPr marL="1280160" indent="-228600" algn="l" defTabSz="914400" rtl="0" eaLnBrk="1" latinLnBrk="0" hangingPunct="1">
-              <a:spcBef>
-                <a:spcPct val="20000"/>
-              </a:spcBef>
-              <a:buClr>
-                <a:schemeClr val="accent4"/>
-              </a:buClr>
-              <a:buFont typeface="Arial" pitchFamily="34" charset="0"/>
-              <a:buChar char="•"/>
-              <a:defRPr sz="1600" kern="1200">
-                <a:solidFill>
-                  <a:schemeClr val="tx1"/>
-                </a:solidFill>
-                <a:latin typeface="+mn-lt"/>
-                <a:ea typeface="+mn-ea"/>
-                <a:cs typeface="+mn-cs"/>
-              </a:defRPr>
-            </a:lvl4pPr>
-            <a:lvl5pPr marL="1554480" indent="-228600" algn="l" defTabSz="914400" rtl="0" eaLnBrk="1" latinLnBrk="0" hangingPunct="1">
-              <a:spcBef>
-                <a:spcPct val="20000"/>
-              </a:spcBef>
-              <a:buClr>
-                <a:schemeClr val="accent5"/>
-              </a:buClr>
-              <a:buFont typeface="Arial" pitchFamily="34" charset="0"/>
-              <a:buChar char="•"/>
-              <a:defRPr sz="1400" kern="1200" baseline="0">
-                <a:solidFill>
-                  <a:schemeClr val="tx1"/>
-                </a:solidFill>
-                <a:latin typeface="+mn-lt"/>
-                <a:ea typeface="+mn-ea"/>
-                <a:cs typeface="+mn-cs"/>
-              </a:defRPr>
-            </a:lvl5pPr>
-            <a:lvl6pPr marL="1737360" indent="-182880" algn="l" defTabSz="914400" rtl="0" eaLnBrk="1" latinLnBrk="0" hangingPunct="1">
-              <a:spcBef>
-                <a:spcPct val="20000"/>
-              </a:spcBef>
-              <a:buClr>
-                <a:schemeClr val="accent1"/>
-              </a:buClr>
-              <a:buFont typeface="Arial" pitchFamily="34" charset="0"/>
-              <a:buChar char="•"/>
-              <a:defRPr sz="1400" kern="1200" baseline="0">
-                <a:solidFill>
-                  <a:schemeClr val="tx1"/>
-                </a:solidFill>
-                <a:latin typeface="+mn-lt"/>
-                <a:ea typeface="+mn-ea"/>
-                <a:cs typeface="+mn-cs"/>
-              </a:defRPr>
-            </a:lvl6pPr>
-            <a:lvl7pPr marL="1920240" indent="-182880" algn="l" defTabSz="914400" rtl="0" eaLnBrk="1" latinLnBrk="0" hangingPunct="1">
-              <a:spcBef>
-                <a:spcPct val="20000"/>
-              </a:spcBef>
-              <a:buClr>
-                <a:schemeClr val="accent2"/>
-              </a:buClr>
-              <a:buFont typeface="Arial" pitchFamily="34" charset="0"/>
-              <a:buChar char="•"/>
-              <a:defRPr sz="1400" kern="1200">
-                <a:solidFill>
-                  <a:schemeClr val="tx1"/>
-                </a:solidFill>
-                <a:latin typeface="+mn-lt"/>
-                <a:ea typeface="+mn-ea"/>
-                <a:cs typeface="+mn-cs"/>
-              </a:defRPr>
-            </a:lvl7pPr>
-            <a:lvl8pPr marL="2103120" indent="-182880" algn="l" defTabSz="914400" rtl="0" eaLnBrk="1" latinLnBrk="0" hangingPunct="1">
-              <a:spcBef>
-                <a:spcPct val="20000"/>
-              </a:spcBef>
-              <a:buClr>
-                <a:schemeClr val="accent3"/>
-              </a:buClr>
-              <a:buFont typeface="Arial" pitchFamily="34" charset="0"/>
-              <a:buChar char="•"/>
-              <a:defRPr sz="1400" kern="1200">
-                <a:solidFill>
-                  <a:schemeClr val="tx1"/>
-                </a:solidFill>
-                <a:latin typeface="+mn-lt"/>
-                <a:ea typeface="+mn-ea"/>
-                <a:cs typeface="+mn-cs"/>
-              </a:defRPr>
-            </a:lvl8pPr>
-            <a:lvl9pPr marL="2286000" indent="-182880" algn="l" defTabSz="914400" rtl="0" eaLnBrk="1" latinLnBrk="0" hangingPunct="1">
-              <a:spcBef>
-                <a:spcPct val="20000"/>
-              </a:spcBef>
-              <a:buClr>
-                <a:schemeClr val="accent4"/>
-              </a:buClr>
-              <a:buFont typeface="Arial" pitchFamily="34" charset="0"/>
-              <a:buChar char="•"/>
-              <a:defRPr sz="1400" kern="1200">
-                <a:solidFill>
-                  <a:schemeClr val="tx1"/>
-                </a:solidFill>
-                <a:latin typeface="+mn-lt"/>
-                <a:ea typeface="+mn-ea"/>
-                <a:cs typeface="+mn-cs"/>
-              </a:defRPr>
-            </a:lvl9pPr>
-          </a:lstStyle>
-          <a:p>
-            <a:r>
-              <a:rPr lang="en-US" dirty="0" smtClean="0"/>
-              <a:t>This is the general form there are other </a:t>
-            </a:r>
-            <a:r>
-              <a:rPr lang="en-GB" dirty="0" smtClean="0"/>
-              <a:t>intricacies</a:t>
-            </a:r>
             <a:endParaRPr lang="en-US" dirty="0" smtClean="0"/>
           </a:p>
         </p:txBody>
@@ -5363,7 +5395,7 @@
     </p:spTree>
     <p:extLst>
       <p:ext uri="{BB962C8B-B14F-4D97-AF65-F5344CB8AC3E}">
-        <p14:creationId xmlns:p14="http://schemas.microsoft.com/office/powerpoint/2010/main" val="3748626934"/>
+        <p14:creationId xmlns:p14="http://schemas.microsoft.com/office/powerpoint/2010/main" val="3212574978"/>
       </p:ext>
     </p:extLst>
   </p:cSld>
@@ -5407,7 +5439,7 @@
           <a:p>
             <a:r>
               <a:rPr lang="en-US" dirty="0" smtClean="0"/>
-              <a:t>Demos	</a:t>
+              <a:t>Technical Challenges</a:t>
             </a:r>
             <a:endParaRPr lang="en-GB" dirty="0"/>
           </a:p>
@@ -5430,80 +5462,165 @@
           <a:p>
             <a:r>
               <a:rPr lang="en-US" dirty="0" smtClean="0"/>
-              <a:t>3 </a:t>
-            </a:r>
-            <a:r>
-              <a:rPr lang="en-US" dirty="0" smtClean="0"/>
-              <a:t>demos (all 1 iteration):</a:t>
-            </a:r>
+              <a:t>Use of </a:t>
+            </a:r>
+            <a:r>
+              <a:rPr lang="en-US" dirty="0" err="1" smtClean="0"/>
+              <a:t>SwingWorker</a:t>
+            </a:r>
+            <a:r>
+              <a:rPr lang="en-US" dirty="0" smtClean="0"/>
+              <a:t> to execute the algorithm in its own thread</a:t>
+            </a:r>
+          </a:p>
+          <a:p>
+            <a:pPr lvl="1"/>
+            <a:r>
+              <a:rPr lang="en-US" dirty="0" smtClean="0"/>
+              <a:t>Allows updates of the view without it ‘freezing up’</a:t>
+            </a:r>
+            <a:endParaRPr lang="en-GB" dirty="0" smtClean="0"/>
+          </a:p>
+          <a:p>
+            <a:pPr marL="114300" indent="0">
+              <a:buNone/>
+            </a:pPr>
             <a:endParaRPr lang="en-US" dirty="0" smtClean="0"/>
           </a:p>
           <a:p>
             <a:r>
               <a:rPr lang="en-US" dirty="0" smtClean="0"/>
-              <a:t>Demo 1: 10 cities 1 ant (slowed down)</a:t>
-            </a:r>
-          </a:p>
-          <a:p>
-            <a:r>
-              <a:rPr lang="en-US" dirty="0" smtClean="0"/>
-              <a:t>Demo 2: 10 cities 20 ants</a:t>
-            </a:r>
-          </a:p>
-          <a:p>
-            <a:r>
-              <a:rPr lang="en-US" dirty="0" smtClean="0"/>
-              <a:t>Demo 3: 20 cities 200 ants (sped up to show it solves</a:t>
-            </a:r>
-            <a:r>
-              <a:rPr lang="en-US" dirty="0" smtClean="0"/>
-              <a:t>)</a:t>
-            </a:r>
-          </a:p>
-          <a:p>
+              <a:t>Simulate ants moving on the ‘paths’</a:t>
+            </a:r>
+          </a:p>
+          <a:p>
+            <a:pPr lvl="1"/>
+            <a:r>
+              <a:rPr lang="en-US" dirty="0" smtClean="0"/>
+              <a:t>Get the location the ant started and its destination</a:t>
+            </a:r>
+          </a:p>
+          <a:p>
+            <a:pPr lvl="1"/>
+            <a:r>
+              <a:rPr lang="en-US" dirty="0" smtClean="0"/>
+              <a:t>Use linear interpolation </a:t>
+            </a:r>
+          </a:p>
+          <a:p>
+            <a:pPr lvl="2"/>
+            <a:r>
+              <a:rPr lang="en-US" dirty="0" smtClean="0"/>
+              <a:t>Given the x /y co-ordinate of the start and finish</a:t>
+            </a:r>
+          </a:p>
+          <a:p>
+            <a:pPr lvl="2"/>
+            <a:r>
+              <a:rPr lang="en-US" dirty="0" smtClean="0"/>
+              <a:t>get the value of any </a:t>
+            </a:r>
+            <a:r>
+              <a:rPr lang="en-US" dirty="0"/>
+              <a:t>x/y co-ordinate </a:t>
+            </a:r>
+            <a:r>
+              <a:rPr lang="en-US" dirty="0" smtClean="0"/>
+              <a:t>on the path between these two points</a:t>
+            </a:r>
+          </a:p>
+          <a:p>
+            <a:pPr lvl="2"/>
+            <a:r>
+              <a:rPr lang="en-GB" dirty="0" smtClean="0"/>
+              <a:t>value1</a:t>
+            </a:r>
+            <a:r>
+              <a:rPr lang="en-GB" dirty="0"/>
+              <a:t>*(</a:t>
+            </a:r>
+            <a:r>
+              <a:rPr lang="en-GB" dirty="0" smtClean="0"/>
+              <a:t>1-</a:t>
+            </a:r>
+            <a:r>
+              <a:rPr lang="el-GR" dirty="0" smtClean="0"/>
+              <a:t>μ</a:t>
+            </a:r>
+            <a:r>
+              <a:rPr lang="en-GB" dirty="0" smtClean="0"/>
+              <a:t>)+value2*</a:t>
+            </a:r>
+            <a:r>
+              <a:rPr lang="el-GR" dirty="0"/>
+              <a:t> μ</a:t>
+            </a:r>
+            <a:r>
+              <a:rPr lang="en-GB" dirty="0" smtClean="0"/>
+              <a:t>);</a:t>
+            </a:r>
+            <a:endParaRPr lang="en-US" dirty="0" smtClean="0"/>
+          </a:p>
+          <a:p>
+            <a:pPr lvl="3"/>
+            <a:r>
+              <a:rPr lang="en-US" dirty="0"/>
+              <a:t>v</a:t>
+            </a:r>
+            <a:r>
+              <a:rPr lang="en-US" dirty="0" smtClean="0"/>
+              <a:t>alue1/2 is the X or Y value (</a:t>
+            </a:r>
+            <a:r>
+              <a:rPr lang="en-US" dirty="0" err="1" smtClean="0"/>
+              <a:t>e.g</a:t>
+            </a:r>
+            <a:r>
+              <a:rPr lang="en-US" dirty="0" smtClean="0"/>
+              <a:t> value1 = start x, value2 = destination x)</a:t>
+            </a:r>
+          </a:p>
+          <a:p>
+            <a:pPr lvl="3"/>
+            <a:r>
+              <a:rPr lang="el-GR" dirty="0"/>
+              <a:t>μ</a:t>
+            </a:r>
+            <a:r>
+              <a:rPr lang="en-US" dirty="0" smtClean="0"/>
+              <a:t> is how far on that path you want (</a:t>
+            </a:r>
+            <a:r>
+              <a:rPr lang="en-US" dirty="0" err="1" smtClean="0"/>
+              <a:t>e.g</a:t>
+            </a:r>
+            <a:r>
+              <a:rPr lang="en-US" dirty="0" smtClean="0"/>
+              <a:t> </a:t>
+            </a:r>
+            <a:r>
+              <a:rPr lang="el-GR" dirty="0"/>
+              <a:t>μ</a:t>
+            </a:r>
+            <a:r>
+              <a:rPr lang="en-US" dirty="0" smtClean="0"/>
+              <a:t> 0.5 = half way between the points)</a:t>
+            </a:r>
+          </a:p>
+          <a:p>
+            <a:pPr lvl="1"/>
             <a:endParaRPr lang="en-US" dirty="0"/>
           </a:p>
           <a:p>
-            <a:r>
-              <a:rPr lang="en-US" dirty="0" smtClean="0"/>
-              <a:t>Iterations demo</a:t>
-            </a:r>
-          </a:p>
-          <a:p>
-            <a:r>
-              <a:rPr lang="en-US" dirty="0" smtClean="0"/>
-              <a:t>Demo 1: 10 cities, 5 ants, 1 iteration</a:t>
-            </a:r>
-          </a:p>
-          <a:p>
-            <a:r>
-              <a:rPr lang="en-US" dirty="0" smtClean="0"/>
-              <a:t>Demo 2: 10 cities, 5 ants, 10 iterations</a:t>
-            </a:r>
-          </a:p>
-          <a:p>
-            <a:r>
-              <a:rPr lang="en-US" dirty="0" smtClean="0"/>
-              <a:t>Demo 3: 10 cities, 5 ants, 25 iterations</a:t>
-            </a:r>
-          </a:p>
-          <a:p>
-            <a:r>
-              <a:rPr lang="en-US" dirty="0" smtClean="0"/>
-              <a:t>All of the iteration demos are sped up for demo purposes</a:t>
-            </a:r>
-            <a:r>
-              <a:rPr lang="en-US" dirty="0" smtClean="0"/>
-              <a:t> </a:t>
-            </a:r>
-            <a:endParaRPr lang="en-GB" dirty="0"/>
+            <a:pPr lvl="1"/>
+            <a:endParaRPr lang="en-US" dirty="0" smtClean="0"/>
           </a:p>
         </p:txBody>
       </p:sp>
     </p:spTree>
     <p:extLst>
       <p:ext uri="{BB962C8B-B14F-4D97-AF65-F5344CB8AC3E}">
-        <p14:creationId xmlns:p14="http://schemas.microsoft.com/office/powerpoint/2010/main" val="3952263693"/>
+        <p14:creationId xmlns:p14="http://schemas.microsoft.com/office/powerpoint/2010/main" val="1907725925"/>
       </p:ext>
     </p:extLst>
   </p:cSld>

</xml_diff>